<commit_message>
PI BPCA SA figures
</commit_message>
<xml_diff>
--- a/documents/Figures editing.pptx
+++ b/documents/Figures editing.pptx
@@ -7,6 +7,7 @@
   <p:sldIdLst>
     <p:sldId id="256" r:id="rId2"/>
     <p:sldId id="257" r:id="rId3"/>
+    <p:sldId id="258" r:id="rId4"/>
   </p:sldIdLst>
   <p:sldSz cx="12192000" cy="6858000"/>
   <p:notesSz cx="6858000" cy="9144000"/>
@@ -262,7 +263,7 @@
           <a:p>
             <a:fld id="{F6E9F5A1-C99C-41F9-B991-61D99245B2FF}" type="datetimeFigureOut">
               <a:rPr lang="en-PH" smtClean="0"/>
-              <a:t>05/14/2024</a:t>
+              <a:t>05/17/2024</a:t>
             </a:fld>
             <a:endParaRPr lang="en-PH"/>
           </a:p>
@@ -462,7 +463,7 @@
           <a:p>
             <a:fld id="{F6E9F5A1-C99C-41F9-B991-61D99245B2FF}" type="datetimeFigureOut">
               <a:rPr lang="en-PH" smtClean="0"/>
-              <a:t>05/14/2024</a:t>
+              <a:t>05/17/2024</a:t>
             </a:fld>
             <a:endParaRPr lang="en-PH"/>
           </a:p>
@@ -672,7 +673,7 @@
           <a:p>
             <a:fld id="{F6E9F5A1-C99C-41F9-B991-61D99245B2FF}" type="datetimeFigureOut">
               <a:rPr lang="en-PH" smtClean="0"/>
-              <a:t>05/14/2024</a:t>
+              <a:t>05/17/2024</a:t>
             </a:fld>
             <a:endParaRPr lang="en-PH"/>
           </a:p>
@@ -872,7 +873,7 @@
           <a:p>
             <a:fld id="{F6E9F5A1-C99C-41F9-B991-61D99245B2FF}" type="datetimeFigureOut">
               <a:rPr lang="en-PH" smtClean="0"/>
-              <a:t>05/14/2024</a:t>
+              <a:t>05/17/2024</a:t>
             </a:fld>
             <a:endParaRPr lang="en-PH"/>
           </a:p>
@@ -1148,7 +1149,7 @@
           <a:p>
             <a:fld id="{F6E9F5A1-C99C-41F9-B991-61D99245B2FF}" type="datetimeFigureOut">
               <a:rPr lang="en-PH" smtClean="0"/>
-              <a:t>05/14/2024</a:t>
+              <a:t>05/17/2024</a:t>
             </a:fld>
             <a:endParaRPr lang="en-PH"/>
           </a:p>
@@ -1416,7 +1417,7 @@
           <a:p>
             <a:fld id="{F6E9F5A1-C99C-41F9-B991-61D99245B2FF}" type="datetimeFigureOut">
               <a:rPr lang="en-PH" smtClean="0"/>
-              <a:t>05/14/2024</a:t>
+              <a:t>05/17/2024</a:t>
             </a:fld>
             <a:endParaRPr lang="en-PH"/>
           </a:p>
@@ -1831,7 +1832,7 @@
           <a:p>
             <a:fld id="{F6E9F5A1-C99C-41F9-B991-61D99245B2FF}" type="datetimeFigureOut">
               <a:rPr lang="en-PH" smtClean="0"/>
-              <a:t>05/14/2024</a:t>
+              <a:t>05/17/2024</a:t>
             </a:fld>
             <a:endParaRPr lang="en-PH"/>
           </a:p>
@@ -1973,7 +1974,7 @@
           <a:p>
             <a:fld id="{F6E9F5A1-C99C-41F9-B991-61D99245B2FF}" type="datetimeFigureOut">
               <a:rPr lang="en-PH" smtClean="0"/>
-              <a:t>05/14/2024</a:t>
+              <a:t>05/17/2024</a:t>
             </a:fld>
             <a:endParaRPr lang="en-PH"/>
           </a:p>
@@ -2086,7 +2087,7 @@
           <a:p>
             <a:fld id="{F6E9F5A1-C99C-41F9-B991-61D99245B2FF}" type="datetimeFigureOut">
               <a:rPr lang="en-PH" smtClean="0"/>
-              <a:t>05/14/2024</a:t>
+              <a:t>05/17/2024</a:t>
             </a:fld>
             <a:endParaRPr lang="en-PH"/>
           </a:p>
@@ -2399,7 +2400,7 @@
           <a:p>
             <a:fld id="{F6E9F5A1-C99C-41F9-B991-61D99245B2FF}" type="datetimeFigureOut">
               <a:rPr lang="en-PH" smtClean="0"/>
-              <a:t>05/14/2024</a:t>
+              <a:t>05/17/2024</a:t>
             </a:fld>
             <a:endParaRPr lang="en-PH"/>
           </a:p>
@@ -2688,7 +2689,7 @@
           <a:p>
             <a:fld id="{F6E9F5A1-C99C-41F9-B991-61D99245B2FF}" type="datetimeFigureOut">
               <a:rPr lang="en-PH" smtClean="0"/>
-              <a:t>05/14/2024</a:t>
+              <a:t>05/17/2024</a:t>
             </a:fld>
             <a:endParaRPr lang="en-PH"/>
           </a:p>
@@ -2931,7 +2932,7 @@
           <a:p>
             <a:fld id="{F6E9F5A1-C99C-41F9-B991-61D99245B2FF}" type="datetimeFigureOut">
               <a:rPr lang="en-PH" smtClean="0"/>
-              <a:t>05/14/2024</a:t>
+              <a:t>05/17/2024</a:t>
             </a:fld>
             <a:endParaRPr lang="en-PH"/>
           </a:p>
@@ -3677,8 +3678,8 @@
                 <a:chExt cx="1758883" cy="1323439"/>
               </a:xfrm>
             </p:grpSpPr>
-            <mc:AlternateContent xmlns:mc="http://schemas.openxmlformats.org/markup-compatibility/2006">
-              <mc:Choice xmlns:a14="http://schemas.microsoft.com/office/drawing/2010/main" Requires="a14">
+            <mc:AlternateContent xmlns:mc="http://schemas.openxmlformats.org/markup-compatibility/2006" xmlns:a14="http://schemas.microsoft.com/office/drawing/2010/main">
+              <mc:Choice Requires="a14">
                 <p:sp>
                   <p:nvSpPr>
                     <p:cNvPr id="15" name="TextBox 14">
@@ -3799,7 +3800,7 @@
                   </p:txBody>
                 </p:sp>
               </mc:Choice>
-              <mc:Fallback>
+              <mc:Fallback xmlns="">
                 <p:sp>
                   <p:nvSpPr>
                     <p:cNvPr id="15" name="TextBox 14">
@@ -4172,10 +4173,2440 @@
           <a:chExt cx="0" cy="0"/>
         </a:xfrm>
       </p:grpSpPr>
+      <p:sp>
+        <p:nvSpPr>
+          <p:cNvPr id="2" name="Rectangle 1">
+            <a:extLst>
+              <a:ext uri="{FF2B5EF4-FFF2-40B4-BE49-F238E27FC236}">
+                <a16:creationId xmlns:a16="http://schemas.microsoft.com/office/drawing/2014/main" id="{91A9068F-CA68-51F8-6FFD-463982A25DA3}"/>
+              </a:ext>
+            </a:extLst>
+          </p:cNvPr>
+          <p:cNvSpPr/>
+          <p:nvPr/>
+        </p:nvSpPr>
+        <p:spPr>
+          <a:xfrm>
+            <a:off x="575733" y="2007810"/>
+            <a:ext cx="3600000" cy="3600000"/>
+          </a:xfrm>
+          <a:prstGeom prst="rect">
+            <a:avLst/>
+          </a:prstGeom>
+          <a:noFill/>
+          <a:ln>
+            <a:solidFill>
+              <a:schemeClr val="accent1"/>
+            </a:solidFill>
+          </a:ln>
+        </p:spPr>
+        <p:style>
+          <a:lnRef idx="2">
+            <a:schemeClr val="accent1">
+              <a:shade val="15000"/>
+            </a:schemeClr>
+          </a:lnRef>
+          <a:fillRef idx="1">
+            <a:schemeClr val="accent1"/>
+          </a:fillRef>
+          <a:effectRef idx="0">
+            <a:schemeClr val="accent1"/>
+          </a:effectRef>
+          <a:fontRef idx="minor">
+            <a:schemeClr val="lt1"/>
+          </a:fontRef>
+        </p:style>
+        <p:txBody>
+          <a:bodyPr rtlCol="0" anchor="ctr"/>
+          <a:lstStyle/>
+          <a:p>
+            <a:pPr algn="ctr"/>
+            <a:endParaRPr lang="en-PH"/>
+          </a:p>
+        </p:txBody>
+      </p:sp>
+      <p:sp>
+        <p:nvSpPr>
+          <p:cNvPr id="3" name="Rectangle 2">
+            <a:extLst>
+              <a:ext uri="{FF2B5EF4-FFF2-40B4-BE49-F238E27FC236}">
+                <a16:creationId xmlns:a16="http://schemas.microsoft.com/office/drawing/2014/main" id="{8A5F81CC-2722-0ED8-303D-42480B408F13}"/>
+              </a:ext>
+            </a:extLst>
+          </p:cNvPr>
+          <p:cNvSpPr/>
+          <p:nvPr/>
+        </p:nvSpPr>
+        <p:spPr>
+          <a:xfrm>
+            <a:off x="4376810" y="2007810"/>
+            <a:ext cx="3600000" cy="3600000"/>
+          </a:xfrm>
+          <a:prstGeom prst="rect">
+            <a:avLst/>
+          </a:prstGeom>
+          <a:noFill/>
+          <a:ln>
+            <a:solidFill>
+              <a:schemeClr val="accent1"/>
+            </a:solidFill>
+          </a:ln>
+        </p:spPr>
+        <p:style>
+          <a:lnRef idx="2">
+            <a:schemeClr val="accent1">
+              <a:shade val="15000"/>
+            </a:schemeClr>
+          </a:lnRef>
+          <a:fillRef idx="1">
+            <a:schemeClr val="accent1"/>
+          </a:fillRef>
+          <a:effectRef idx="0">
+            <a:schemeClr val="accent1"/>
+          </a:effectRef>
+          <a:fontRef idx="minor">
+            <a:schemeClr val="lt1"/>
+          </a:fontRef>
+        </p:style>
+        <p:txBody>
+          <a:bodyPr rtlCol="0" anchor="ctr"/>
+          <a:lstStyle/>
+          <a:p>
+            <a:pPr algn="ctr"/>
+            <a:endParaRPr lang="en-PH"/>
+          </a:p>
+        </p:txBody>
+      </p:sp>
+      <p:sp>
+        <p:nvSpPr>
+          <p:cNvPr id="4" name="Rectangle 3">
+            <a:extLst>
+              <a:ext uri="{FF2B5EF4-FFF2-40B4-BE49-F238E27FC236}">
+                <a16:creationId xmlns:a16="http://schemas.microsoft.com/office/drawing/2014/main" id="{B1B1F4B4-B261-F312-35CC-AC5B0D2C4CA9}"/>
+              </a:ext>
+            </a:extLst>
+          </p:cNvPr>
+          <p:cNvSpPr/>
+          <p:nvPr/>
+        </p:nvSpPr>
+        <p:spPr>
+          <a:xfrm>
+            <a:off x="8177888" y="2007810"/>
+            <a:ext cx="3600000" cy="3600000"/>
+          </a:xfrm>
+          <a:prstGeom prst="rect">
+            <a:avLst/>
+          </a:prstGeom>
+          <a:noFill/>
+          <a:ln>
+            <a:solidFill>
+              <a:schemeClr val="accent1"/>
+            </a:solidFill>
+          </a:ln>
+        </p:spPr>
+        <p:style>
+          <a:lnRef idx="2">
+            <a:schemeClr val="accent1">
+              <a:shade val="15000"/>
+            </a:schemeClr>
+          </a:lnRef>
+          <a:fillRef idx="1">
+            <a:schemeClr val="accent1"/>
+          </a:fillRef>
+          <a:effectRef idx="0">
+            <a:schemeClr val="accent1"/>
+          </a:effectRef>
+          <a:fontRef idx="minor">
+            <a:schemeClr val="lt1"/>
+          </a:fontRef>
+        </p:style>
+        <p:txBody>
+          <a:bodyPr rtlCol="0" anchor="ctr"/>
+          <a:lstStyle/>
+          <a:p>
+            <a:pPr algn="ctr"/>
+            <a:endParaRPr lang="en-PH"/>
+          </a:p>
+        </p:txBody>
+      </p:sp>
+      <p:sp>
+        <p:nvSpPr>
+          <p:cNvPr id="5" name="Oval 4">
+            <a:extLst>
+              <a:ext uri="{FF2B5EF4-FFF2-40B4-BE49-F238E27FC236}">
+                <a16:creationId xmlns:a16="http://schemas.microsoft.com/office/drawing/2014/main" id="{20FF252F-EB0A-3EA2-1C69-1E4DDD4AAFB3}"/>
+              </a:ext>
+            </a:extLst>
+          </p:cNvPr>
+          <p:cNvSpPr/>
+          <p:nvPr/>
+        </p:nvSpPr>
+        <p:spPr>
+          <a:xfrm>
+            <a:off x="1475733" y="2907810"/>
+            <a:ext cx="168388" cy="172286"/>
+          </a:xfrm>
+          <a:prstGeom prst="ellipse">
+            <a:avLst/>
+          </a:prstGeom>
+        </p:spPr>
+        <p:style>
+          <a:lnRef idx="2">
+            <a:schemeClr val="accent1">
+              <a:shade val="15000"/>
+            </a:schemeClr>
+          </a:lnRef>
+          <a:fillRef idx="1">
+            <a:schemeClr val="accent1"/>
+          </a:fillRef>
+          <a:effectRef idx="0">
+            <a:schemeClr val="accent1"/>
+          </a:effectRef>
+          <a:fontRef idx="minor">
+            <a:schemeClr val="lt1"/>
+          </a:fontRef>
+        </p:style>
+        <p:txBody>
+          <a:bodyPr rtlCol="0" anchor="ctr"/>
+          <a:lstStyle/>
+          <a:p>
+            <a:pPr algn="ctr"/>
+            <a:endParaRPr lang="en-PH"/>
+          </a:p>
+        </p:txBody>
+      </p:sp>
+      <p:sp>
+        <p:nvSpPr>
+          <p:cNvPr id="6" name="Oval 5">
+            <a:extLst>
+              <a:ext uri="{FF2B5EF4-FFF2-40B4-BE49-F238E27FC236}">
+                <a16:creationId xmlns:a16="http://schemas.microsoft.com/office/drawing/2014/main" id="{18C2E593-A8A6-B49D-CDFF-8CE755D82B6C}"/>
+              </a:ext>
+            </a:extLst>
+          </p:cNvPr>
+          <p:cNvSpPr/>
+          <p:nvPr/>
+        </p:nvSpPr>
+        <p:spPr>
+          <a:xfrm>
+            <a:off x="3107345" y="4535524"/>
+            <a:ext cx="168388" cy="172286"/>
+          </a:xfrm>
+          <a:prstGeom prst="ellipse">
+            <a:avLst/>
+          </a:prstGeom>
+        </p:spPr>
+        <p:style>
+          <a:lnRef idx="2">
+            <a:schemeClr val="accent1">
+              <a:shade val="15000"/>
+            </a:schemeClr>
+          </a:lnRef>
+          <a:fillRef idx="1">
+            <a:schemeClr val="accent1"/>
+          </a:fillRef>
+          <a:effectRef idx="0">
+            <a:schemeClr val="accent1"/>
+          </a:effectRef>
+          <a:fontRef idx="minor">
+            <a:schemeClr val="lt1"/>
+          </a:fontRef>
+        </p:style>
+        <p:txBody>
+          <a:bodyPr rtlCol="0" anchor="ctr"/>
+          <a:lstStyle/>
+          <a:p>
+            <a:pPr algn="ctr"/>
+            <a:endParaRPr lang="en-PH"/>
+          </a:p>
+        </p:txBody>
+      </p:sp>
+      <p:cxnSp>
+        <p:nvCxnSpPr>
+          <p:cNvPr id="7" name="Straight Arrow Connector 6">
+            <a:extLst>
+              <a:ext uri="{FF2B5EF4-FFF2-40B4-BE49-F238E27FC236}">
+                <a16:creationId xmlns:a16="http://schemas.microsoft.com/office/drawing/2014/main" id="{9ADE819C-1FF7-A7B0-6D98-8CB3420B2E52}"/>
+              </a:ext>
+            </a:extLst>
+          </p:cNvPr>
+          <p:cNvCxnSpPr>
+            <a:cxnSpLocks/>
+            <a:stCxn id="5" idx="1"/>
+          </p:cNvCxnSpPr>
+          <p:nvPr/>
+        </p:nvCxnSpPr>
+        <p:spPr>
+          <a:xfrm flipH="1" flipV="1">
+            <a:off x="575733" y="2007810"/>
+            <a:ext cx="924660" cy="925231"/>
+          </a:xfrm>
+          <a:prstGeom prst="straightConnector1">
+            <a:avLst/>
+          </a:prstGeom>
+          <a:ln>
+            <a:tailEnd type="triangle"/>
+          </a:ln>
+        </p:spPr>
+        <p:style>
+          <a:lnRef idx="2">
+            <a:schemeClr val="accent1"/>
+          </a:lnRef>
+          <a:fillRef idx="0">
+            <a:schemeClr val="accent1"/>
+          </a:fillRef>
+          <a:effectRef idx="1">
+            <a:schemeClr val="accent1"/>
+          </a:effectRef>
+          <a:fontRef idx="minor">
+            <a:schemeClr val="tx1"/>
+          </a:fontRef>
+        </p:style>
+      </p:cxnSp>
+      <p:cxnSp>
+        <p:nvCxnSpPr>
+          <p:cNvPr id="8" name="Straight Arrow Connector 7">
+            <a:extLst>
+              <a:ext uri="{FF2B5EF4-FFF2-40B4-BE49-F238E27FC236}">
+                <a16:creationId xmlns:a16="http://schemas.microsoft.com/office/drawing/2014/main" id="{25D86978-D59C-834A-2001-79B1022E8736}"/>
+              </a:ext>
+            </a:extLst>
+          </p:cNvPr>
+          <p:cNvCxnSpPr>
+            <a:cxnSpLocks/>
+            <a:stCxn id="5" idx="5"/>
+          </p:cNvCxnSpPr>
+          <p:nvPr/>
+        </p:nvCxnSpPr>
+        <p:spPr>
+          <a:xfrm>
+            <a:off x="1619461" y="3054865"/>
+            <a:ext cx="756271" cy="752944"/>
+          </a:xfrm>
+          <a:prstGeom prst="straightConnector1">
+            <a:avLst/>
+          </a:prstGeom>
+          <a:ln>
+            <a:tailEnd type="triangle"/>
+          </a:ln>
+        </p:spPr>
+        <p:style>
+          <a:lnRef idx="2">
+            <a:schemeClr val="accent1"/>
+          </a:lnRef>
+          <a:fillRef idx="0">
+            <a:schemeClr val="accent1"/>
+          </a:fillRef>
+          <a:effectRef idx="1">
+            <a:schemeClr val="accent1"/>
+          </a:effectRef>
+          <a:fontRef idx="minor">
+            <a:schemeClr val="tx1"/>
+          </a:fontRef>
+        </p:style>
+      </p:cxnSp>
+      <p:cxnSp>
+        <p:nvCxnSpPr>
+          <p:cNvPr id="9" name="Straight Arrow Connector 8">
+            <a:extLst>
+              <a:ext uri="{FF2B5EF4-FFF2-40B4-BE49-F238E27FC236}">
+                <a16:creationId xmlns:a16="http://schemas.microsoft.com/office/drawing/2014/main" id="{D043654D-F6B9-2C34-4008-24B66741FEC3}"/>
+              </a:ext>
+            </a:extLst>
+          </p:cNvPr>
+          <p:cNvCxnSpPr>
+            <a:cxnSpLocks/>
+            <a:stCxn id="6" idx="1"/>
+          </p:cNvCxnSpPr>
+          <p:nvPr/>
+        </p:nvCxnSpPr>
+        <p:spPr>
+          <a:xfrm flipH="1" flipV="1">
+            <a:off x="2375732" y="3807809"/>
+            <a:ext cx="756273" cy="752946"/>
+          </a:xfrm>
+          <a:prstGeom prst="straightConnector1">
+            <a:avLst/>
+          </a:prstGeom>
+          <a:ln>
+            <a:tailEnd type="triangle"/>
+          </a:ln>
+        </p:spPr>
+        <p:style>
+          <a:lnRef idx="2">
+            <a:schemeClr val="accent1"/>
+          </a:lnRef>
+          <a:fillRef idx="0">
+            <a:schemeClr val="accent1"/>
+          </a:fillRef>
+          <a:effectRef idx="1">
+            <a:schemeClr val="accent1"/>
+          </a:effectRef>
+          <a:fontRef idx="minor">
+            <a:schemeClr val="tx1"/>
+          </a:fontRef>
+        </p:style>
+      </p:cxnSp>
+      <p:cxnSp>
+        <p:nvCxnSpPr>
+          <p:cNvPr id="10" name="Straight Arrow Connector 9">
+            <a:extLst>
+              <a:ext uri="{FF2B5EF4-FFF2-40B4-BE49-F238E27FC236}">
+                <a16:creationId xmlns:a16="http://schemas.microsoft.com/office/drawing/2014/main" id="{5FC0406D-0B73-29A8-0603-3EC74A070FBC}"/>
+              </a:ext>
+            </a:extLst>
+          </p:cNvPr>
+          <p:cNvCxnSpPr>
+            <a:cxnSpLocks/>
+            <a:stCxn id="6" idx="5"/>
+          </p:cNvCxnSpPr>
+          <p:nvPr/>
+        </p:nvCxnSpPr>
+        <p:spPr>
+          <a:xfrm>
+            <a:off x="3251073" y="4682579"/>
+            <a:ext cx="924660" cy="925231"/>
+          </a:xfrm>
+          <a:prstGeom prst="straightConnector1">
+            <a:avLst/>
+          </a:prstGeom>
+          <a:ln>
+            <a:tailEnd type="triangle"/>
+          </a:ln>
+        </p:spPr>
+        <p:style>
+          <a:lnRef idx="2">
+            <a:schemeClr val="accent1"/>
+          </a:lnRef>
+          <a:fillRef idx="0">
+            <a:schemeClr val="accent1"/>
+          </a:fillRef>
+          <a:effectRef idx="1">
+            <a:schemeClr val="accent1"/>
+          </a:effectRef>
+          <a:fontRef idx="minor">
+            <a:schemeClr val="tx1"/>
+          </a:fontRef>
+        </p:style>
+      </p:cxnSp>
+      <p:grpSp>
+        <p:nvGrpSpPr>
+          <p:cNvPr id="11" name="Group 10">
+            <a:extLst>
+              <a:ext uri="{FF2B5EF4-FFF2-40B4-BE49-F238E27FC236}">
+                <a16:creationId xmlns:a16="http://schemas.microsoft.com/office/drawing/2014/main" id="{39B59187-5EA0-78F3-6996-B5858FCDAF62}"/>
+              </a:ext>
+            </a:extLst>
+          </p:cNvPr>
+          <p:cNvGrpSpPr/>
+          <p:nvPr/>
+        </p:nvGrpSpPr>
+        <p:grpSpPr>
+          <a:xfrm rot="16200000">
+            <a:off x="558892" y="2010270"/>
+            <a:ext cx="3600000" cy="3600000"/>
+            <a:chOff x="728133" y="2160210"/>
+            <a:chExt cx="3600000" cy="3600000"/>
+          </a:xfrm>
+        </p:grpSpPr>
+        <p:sp>
+          <p:nvSpPr>
+            <p:cNvPr id="12" name="Oval 11">
+              <a:extLst>
+                <a:ext uri="{FF2B5EF4-FFF2-40B4-BE49-F238E27FC236}">
+                  <a16:creationId xmlns:a16="http://schemas.microsoft.com/office/drawing/2014/main" id="{087176AD-AE63-C7DD-60BB-5CD6662C3971}"/>
+                </a:ext>
+              </a:extLst>
+            </p:cNvPr>
+            <p:cNvSpPr/>
+            <p:nvPr/>
+          </p:nvSpPr>
+          <p:spPr>
+            <a:xfrm>
+              <a:off x="1628133" y="3060210"/>
+              <a:ext cx="168388" cy="172286"/>
+            </a:xfrm>
+            <a:prstGeom prst="ellipse">
+              <a:avLst/>
+            </a:prstGeom>
+          </p:spPr>
+          <p:style>
+            <a:lnRef idx="2">
+              <a:schemeClr val="accent1">
+                <a:shade val="15000"/>
+              </a:schemeClr>
+            </a:lnRef>
+            <a:fillRef idx="1">
+              <a:schemeClr val="accent1"/>
+            </a:fillRef>
+            <a:effectRef idx="0">
+              <a:schemeClr val="accent1"/>
+            </a:effectRef>
+            <a:fontRef idx="minor">
+              <a:schemeClr val="lt1"/>
+            </a:fontRef>
+          </p:style>
+          <p:txBody>
+            <a:bodyPr rtlCol="0" anchor="ctr"/>
+            <a:lstStyle/>
+            <a:p>
+              <a:pPr algn="ctr"/>
+              <a:endParaRPr lang="en-PH"/>
+            </a:p>
+          </p:txBody>
+        </p:sp>
+        <p:sp>
+          <p:nvSpPr>
+            <p:cNvPr id="13" name="Oval 12">
+              <a:extLst>
+                <a:ext uri="{FF2B5EF4-FFF2-40B4-BE49-F238E27FC236}">
+                  <a16:creationId xmlns:a16="http://schemas.microsoft.com/office/drawing/2014/main" id="{88603B28-DBCF-431F-969E-2B909D7E1391}"/>
+                </a:ext>
+              </a:extLst>
+            </p:cNvPr>
+            <p:cNvSpPr/>
+            <p:nvPr/>
+          </p:nvSpPr>
+          <p:spPr>
+            <a:xfrm>
+              <a:off x="3259745" y="4687924"/>
+              <a:ext cx="168388" cy="172286"/>
+            </a:xfrm>
+            <a:prstGeom prst="ellipse">
+              <a:avLst/>
+            </a:prstGeom>
+          </p:spPr>
+          <p:style>
+            <a:lnRef idx="2">
+              <a:schemeClr val="accent1">
+                <a:shade val="15000"/>
+              </a:schemeClr>
+            </a:lnRef>
+            <a:fillRef idx="1">
+              <a:schemeClr val="accent1"/>
+            </a:fillRef>
+            <a:effectRef idx="0">
+              <a:schemeClr val="accent1"/>
+            </a:effectRef>
+            <a:fontRef idx="minor">
+              <a:schemeClr val="lt1"/>
+            </a:fontRef>
+          </p:style>
+          <p:txBody>
+            <a:bodyPr rtlCol="0" anchor="ctr"/>
+            <a:lstStyle/>
+            <a:p>
+              <a:pPr algn="ctr"/>
+              <a:endParaRPr lang="en-PH"/>
+            </a:p>
+          </p:txBody>
+        </p:sp>
+        <p:cxnSp>
+          <p:nvCxnSpPr>
+            <p:cNvPr id="14" name="Straight Arrow Connector 13">
+              <a:extLst>
+                <a:ext uri="{FF2B5EF4-FFF2-40B4-BE49-F238E27FC236}">
+                  <a16:creationId xmlns:a16="http://schemas.microsoft.com/office/drawing/2014/main" id="{1D1FD65D-9448-6B8F-07BF-C1981CD986F0}"/>
+                </a:ext>
+              </a:extLst>
+            </p:cNvPr>
+            <p:cNvCxnSpPr>
+              <a:cxnSpLocks/>
+              <a:stCxn id="12" idx="1"/>
+            </p:cNvCxnSpPr>
+            <p:nvPr/>
+          </p:nvCxnSpPr>
+          <p:spPr>
+            <a:xfrm flipH="1" flipV="1">
+              <a:off x="728133" y="2160210"/>
+              <a:ext cx="924660" cy="925231"/>
+            </a:xfrm>
+            <a:prstGeom prst="straightConnector1">
+              <a:avLst/>
+            </a:prstGeom>
+            <a:ln>
+              <a:tailEnd type="triangle"/>
+            </a:ln>
+          </p:spPr>
+          <p:style>
+            <a:lnRef idx="2">
+              <a:schemeClr val="accent1"/>
+            </a:lnRef>
+            <a:fillRef idx="0">
+              <a:schemeClr val="accent1"/>
+            </a:fillRef>
+            <a:effectRef idx="1">
+              <a:schemeClr val="accent1"/>
+            </a:effectRef>
+            <a:fontRef idx="minor">
+              <a:schemeClr val="tx1"/>
+            </a:fontRef>
+          </p:style>
+        </p:cxnSp>
+        <p:cxnSp>
+          <p:nvCxnSpPr>
+            <p:cNvPr id="15" name="Straight Arrow Connector 14">
+              <a:extLst>
+                <a:ext uri="{FF2B5EF4-FFF2-40B4-BE49-F238E27FC236}">
+                  <a16:creationId xmlns:a16="http://schemas.microsoft.com/office/drawing/2014/main" id="{A9D4461A-FD0B-61BE-565B-E5EC027AE3A8}"/>
+                </a:ext>
+              </a:extLst>
+            </p:cNvPr>
+            <p:cNvCxnSpPr>
+              <a:cxnSpLocks/>
+              <a:stCxn id="12" idx="5"/>
+            </p:cNvCxnSpPr>
+            <p:nvPr/>
+          </p:nvCxnSpPr>
+          <p:spPr>
+            <a:xfrm>
+              <a:off x="1771861" y="3207265"/>
+              <a:ext cx="756271" cy="752944"/>
+            </a:xfrm>
+            <a:prstGeom prst="straightConnector1">
+              <a:avLst/>
+            </a:prstGeom>
+            <a:ln>
+              <a:tailEnd type="triangle"/>
+            </a:ln>
+          </p:spPr>
+          <p:style>
+            <a:lnRef idx="2">
+              <a:schemeClr val="accent1"/>
+            </a:lnRef>
+            <a:fillRef idx="0">
+              <a:schemeClr val="accent1"/>
+            </a:fillRef>
+            <a:effectRef idx="1">
+              <a:schemeClr val="accent1"/>
+            </a:effectRef>
+            <a:fontRef idx="minor">
+              <a:schemeClr val="tx1"/>
+            </a:fontRef>
+          </p:style>
+        </p:cxnSp>
+        <p:cxnSp>
+          <p:nvCxnSpPr>
+            <p:cNvPr id="16" name="Straight Arrow Connector 15">
+              <a:extLst>
+                <a:ext uri="{FF2B5EF4-FFF2-40B4-BE49-F238E27FC236}">
+                  <a16:creationId xmlns:a16="http://schemas.microsoft.com/office/drawing/2014/main" id="{043816CF-49F8-5532-FC25-AA5E7B18216B}"/>
+                </a:ext>
+              </a:extLst>
+            </p:cNvPr>
+            <p:cNvCxnSpPr>
+              <a:cxnSpLocks/>
+              <a:stCxn id="13" idx="1"/>
+            </p:cNvCxnSpPr>
+            <p:nvPr/>
+          </p:nvCxnSpPr>
+          <p:spPr>
+            <a:xfrm flipH="1" flipV="1">
+              <a:off x="2528132" y="3960209"/>
+              <a:ext cx="756273" cy="752946"/>
+            </a:xfrm>
+            <a:prstGeom prst="straightConnector1">
+              <a:avLst/>
+            </a:prstGeom>
+            <a:ln>
+              <a:tailEnd type="triangle"/>
+            </a:ln>
+          </p:spPr>
+          <p:style>
+            <a:lnRef idx="2">
+              <a:schemeClr val="accent1"/>
+            </a:lnRef>
+            <a:fillRef idx="0">
+              <a:schemeClr val="accent1"/>
+            </a:fillRef>
+            <a:effectRef idx="1">
+              <a:schemeClr val="accent1"/>
+            </a:effectRef>
+            <a:fontRef idx="minor">
+              <a:schemeClr val="tx1"/>
+            </a:fontRef>
+          </p:style>
+        </p:cxnSp>
+        <p:cxnSp>
+          <p:nvCxnSpPr>
+            <p:cNvPr id="17" name="Straight Arrow Connector 16">
+              <a:extLst>
+                <a:ext uri="{FF2B5EF4-FFF2-40B4-BE49-F238E27FC236}">
+                  <a16:creationId xmlns:a16="http://schemas.microsoft.com/office/drawing/2014/main" id="{E285EC25-59C5-8553-FA7D-87057E562D7E}"/>
+                </a:ext>
+              </a:extLst>
+            </p:cNvPr>
+            <p:cNvCxnSpPr>
+              <a:cxnSpLocks/>
+              <a:stCxn id="13" idx="5"/>
+            </p:cNvCxnSpPr>
+            <p:nvPr/>
+          </p:nvCxnSpPr>
+          <p:spPr>
+            <a:xfrm>
+              <a:off x="3403473" y="4834979"/>
+              <a:ext cx="924660" cy="925231"/>
+            </a:xfrm>
+            <a:prstGeom prst="straightConnector1">
+              <a:avLst/>
+            </a:prstGeom>
+            <a:ln>
+              <a:tailEnd type="triangle"/>
+            </a:ln>
+          </p:spPr>
+          <p:style>
+            <a:lnRef idx="2">
+              <a:schemeClr val="accent1"/>
+            </a:lnRef>
+            <a:fillRef idx="0">
+              <a:schemeClr val="accent1"/>
+            </a:fillRef>
+            <a:effectRef idx="1">
+              <a:schemeClr val="accent1"/>
+            </a:effectRef>
+            <a:fontRef idx="minor">
+              <a:schemeClr val="tx1"/>
+            </a:fontRef>
+          </p:style>
+        </p:cxnSp>
+      </p:grpSp>
+      <p:sp>
+        <p:nvSpPr>
+          <p:cNvPr id="19" name="Oval 18">
+            <a:extLst>
+              <a:ext uri="{FF2B5EF4-FFF2-40B4-BE49-F238E27FC236}">
+                <a16:creationId xmlns:a16="http://schemas.microsoft.com/office/drawing/2014/main" id="{565EF036-2AD5-C40A-8A88-1776DA4F9076}"/>
+              </a:ext>
+            </a:extLst>
+          </p:cNvPr>
+          <p:cNvSpPr/>
+          <p:nvPr/>
+        </p:nvSpPr>
+        <p:spPr>
+          <a:xfrm>
+            <a:off x="5916000" y="3627809"/>
+            <a:ext cx="360000" cy="360000"/>
+          </a:xfrm>
+          <a:prstGeom prst="ellipse">
+            <a:avLst/>
+          </a:prstGeom>
+        </p:spPr>
+        <p:style>
+          <a:lnRef idx="2">
+            <a:schemeClr val="accent1">
+              <a:shade val="15000"/>
+            </a:schemeClr>
+          </a:lnRef>
+          <a:fillRef idx="1">
+            <a:schemeClr val="accent1"/>
+          </a:fillRef>
+          <a:effectRef idx="0">
+            <a:schemeClr val="accent1"/>
+          </a:effectRef>
+          <a:fontRef idx="minor">
+            <a:schemeClr val="lt1"/>
+          </a:fontRef>
+        </p:style>
+        <p:txBody>
+          <a:bodyPr rtlCol="0" anchor="ctr"/>
+          <a:lstStyle/>
+          <a:p>
+            <a:pPr algn="ctr"/>
+            <a:endParaRPr lang="en-PH"/>
+          </a:p>
+        </p:txBody>
+      </p:sp>
+      <p:cxnSp>
+        <p:nvCxnSpPr>
+          <p:cNvPr id="20" name="Straight Arrow Connector 19">
+            <a:extLst>
+              <a:ext uri="{FF2B5EF4-FFF2-40B4-BE49-F238E27FC236}">
+                <a16:creationId xmlns:a16="http://schemas.microsoft.com/office/drawing/2014/main" id="{0A0DD4B1-6E57-954F-8C64-F2B33F56A92D}"/>
+              </a:ext>
+            </a:extLst>
+          </p:cNvPr>
+          <p:cNvCxnSpPr>
+            <a:stCxn id="19" idx="1"/>
+          </p:cNvCxnSpPr>
+          <p:nvPr/>
+        </p:nvCxnSpPr>
+        <p:spPr>
+          <a:xfrm flipH="1" flipV="1">
+            <a:off x="4376810" y="2007810"/>
+            <a:ext cx="1591911" cy="1672720"/>
+          </a:xfrm>
+          <a:prstGeom prst="straightConnector1">
+            <a:avLst/>
+          </a:prstGeom>
+          <a:ln>
+            <a:tailEnd type="triangle"/>
+          </a:ln>
+        </p:spPr>
+        <p:style>
+          <a:lnRef idx="2">
+            <a:schemeClr val="accent1"/>
+          </a:lnRef>
+          <a:fillRef idx="0">
+            <a:schemeClr val="accent1"/>
+          </a:fillRef>
+          <a:effectRef idx="1">
+            <a:schemeClr val="accent1"/>
+          </a:effectRef>
+          <a:fontRef idx="minor">
+            <a:schemeClr val="tx1"/>
+          </a:fontRef>
+        </p:style>
+      </p:cxnSp>
+      <p:cxnSp>
+        <p:nvCxnSpPr>
+          <p:cNvPr id="21" name="Straight Arrow Connector 20">
+            <a:extLst>
+              <a:ext uri="{FF2B5EF4-FFF2-40B4-BE49-F238E27FC236}">
+                <a16:creationId xmlns:a16="http://schemas.microsoft.com/office/drawing/2014/main" id="{E13A16F7-87F9-D227-4F0C-C175CE1F8E9F}"/>
+              </a:ext>
+            </a:extLst>
+          </p:cNvPr>
+          <p:cNvCxnSpPr>
+            <a:stCxn id="19" idx="7"/>
+          </p:cNvCxnSpPr>
+          <p:nvPr/>
+        </p:nvCxnSpPr>
+        <p:spPr>
+          <a:xfrm flipV="1">
+            <a:off x="6223279" y="2007810"/>
+            <a:ext cx="1719809" cy="1672720"/>
+          </a:xfrm>
+          <a:prstGeom prst="straightConnector1">
+            <a:avLst/>
+          </a:prstGeom>
+          <a:ln>
+            <a:tailEnd type="triangle"/>
+          </a:ln>
+        </p:spPr>
+        <p:style>
+          <a:lnRef idx="2">
+            <a:schemeClr val="accent1"/>
+          </a:lnRef>
+          <a:fillRef idx="0">
+            <a:schemeClr val="accent1"/>
+          </a:fillRef>
+          <a:effectRef idx="1">
+            <a:schemeClr val="accent1"/>
+          </a:effectRef>
+          <a:fontRef idx="minor">
+            <a:schemeClr val="tx1"/>
+          </a:fontRef>
+        </p:style>
+      </p:cxnSp>
+      <p:cxnSp>
+        <p:nvCxnSpPr>
+          <p:cNvPr id="22" name="Straight Arrow Connector 21">
+            <a:extLst>
+              <a:ext uri="{FF2B5EF4-FFF2-40B4-BE49-F238E27FC236}">
+                <a16:creationId xmlns:a16="http://schemas.microsoft.com/office/drawing/2014/main" id="{0FDD580E-C8B6-C372-9A01-8CD49FB945CE}"/>
+              </a:ext>
+            </a:extLst>
+          </p:cNvPr>
+          <p:cNvCxnSpPr>
+            <a:stCxn id="19" idx="3"/>
+          </p:cNvCxnSpPr>
+          <p:nvPr/>
+        </p:nvCxnSpPr>
+        <p:spPr>
+          <a:xfrm flipH="1">
+            <a:off x="4413504" y="3935088"/>
+            <a:ext cx="1555217" cy="1645800"/>
+          </a:xfrm>
+          <a:prstGeom prst="straightConnector1">
+            <a:avLst/>
+          </a:prstGeom>
+          <a:ln>
+            <a:tailEnd type="triangle"/>
+          </a:ln>
+        </p:spPr>
+        <p:style>
+          <a:lnRef idx="2">
+            <a:schemeClr val="accent1"/>
+          </a:lnRef>
+          <a:fillRef idx="0">
+            <a:schemeClr val="accent1"/>
+          </a:fillRef>
+          <a:effectRef idx="1">
+            <a:schemeClr val="accent1"/>
+          </a:effectRef>
+          <a:fontRef idx="minor">
+            <a:schemeClr val="tx1"/>
+          </a:fontRef>
+        </p:style>
+      </p:cxnSp>
+      <p:cxnSp>
+        <p:nvCxnSpPr>
+          <p:cNvPr id="23" name="Straight Arrow Connector 22">
+            <a:extLst>
+              <a:ext uri="{FF2B5EF4-FFF2-40B4-BE49-F238E27FC236}">
+                <a16:creationId xmlns:a16="http://schemas.microsoft.com/office/drawing/2014/main" id="{22FF0F42-CFFF-BB0B-2BCA-EF6A6ED3788D}"/>
+              </a:ext>
+            </a:extLst>
+          </p:cNvPr>
+          <p:cNvCxnSpPr>
+            <a:cxnSpLocks/>
+            <a:stCxn id="19" idx="5"/>
+          </p:cNvCxnSpPr>
+          <p:nvPr/>
+        </p:nvCxnSpPr>
+        <p:spPr>
+          <a:xfrm>
+            <a:off x="6223279" y="3935088"/>
+            <a:ext cx="1727171" cy="1652811"/>
+          </a:xfrm>
+          <a:prstGeom prst="straightConnector1">
+            <a:avLst/>
+          </a:prstGeom>
+          <a:ln>
+            <a:tailEnd type="triangle"/>
+          </a:ln>
+        </p:spPr>
+        <p:style>
+          <a:lnRef idx="2">
+            <a:schemeClr val="accent1"/>
+          </a:lnRef>
+          <a:fillRef idx="0">
+            <a:schemeClr val="accent1"/>
+          </a:fillRef>
+          <a:effectRef idx="1">
+            <a:schemeClr val="accent1"/>
+          </a:effectRef>
+          <a:fontRef idx="minor">
+            <a:schemeClr val="tx1"/>
+          </a:fontRef>
+        </p:style>
+      </p:cxnSp>
+      <p:sp>
+        <p:nvSpPr>
+          <p:cNvPr id="25" name="Oval 24">
+            <a:extLst>
+              <a:ext uri="{FF2B5EF4-FFF2-40B4-BE49-F238E27FC236}">
+                <a16:creationId xmlns:a16="http://schemas.microsoft.com/office/drawing/2014/main" id="{DB945A88-3D67-D254-0D8F-61DE87F8FFE5}"/>
+              </a:ext>
+            </a:extLst>
+          </p:cNvPr>
+          <p:cNvSpPr/>
+          <p:nvPr/>
+        </p:nvSpPr>
+        <p:spPr>
+          <a:xfrm>
+            <a:off x="8087887" y="1917810"/>
+            <a:ext cx="180000" cy="180000"/>
+          </a:xfrm>
+          <a:prstGeom prst="ellipse">
+            <a:avLst/>
+          </a:prstGeom>
+        </p:spPr>
+        <p:style>
+          <a:lnRef idx="2">
+            <a:schemeClr val="accent1">
+              <a:shade val="15000"/>
+            </a:schemeClr>
+          </a:lnRef>
+          <a:fillRef idx="1">
+            <a:schemeClr val="accent1"/>
+          </a:fillRef>
+          <a:effectRef idx="0">
+            <a:schemeClr val="accent1"/>
+          </a:effectRef>
+          <a:fontRef idx="minor">
+            <a:schemeClr val="lt1"/>
+          </a:fontRef>
+        </p:style>
+        <p:txBody>
+          <a:bodyPr rtlCol="0" anchor="ctr"/>
+          <a:lstStyle/>
+          <a:p>
+            <a:pPr algn="ctr"/>
+            <a:endParaRPr lang="en-PH"/>
+          </a:p>
+        </p:txBody>
+      </p:sp>
+      <p:sp>
+        <p:nvSpPr>
+          <p:cNvPr id="26" name="Oval 25">
+            <a:extLst>
+              <a:ext uri="{FF2B5EF4-FFF2-40B4-BE49-F238E27FC236}">
+                <a16:creationId xmlns:a16="http://schemas.microsoft.com/office/drawing/2014/main" id="{972DAEA7-AB5C-66B2-15CE-7333D9AAEB51}"/>
+              </a:ext>
+            </a:extLst>
+          </p:cNvPr>
+          <p:cNvSpPr/>
+          <p:nvPr/>
+        </p:nvSpPr>
+        <p:spPr>
+          <a:xfrm>
+            <a:off x="8087887" y="5497899"/>
+            <a:ext cx="180000" cy="180000"/>
+          </a:xfrm>
+          <a:prstGeom prst="ellipse">
+            <a:avLst/>
+          </a:prstGeom>
+        </p:spPr>
+        <p:style>
+          <a:lnRef idx="2">
+            <a:schemeClr val="accent1">
+              <a:shade val="15000"/>
+            </a:schemeClr>
+          </a:lnRef>
+          <a:fillRef idx="1">
+            <a:schemeClr val="accent1"/>
+          </a:fillRef>
+          <a:effectRef idx="0">
+            <a:schemeClr val="accent1"/>
+          </a:effectRef>
+          <a:fontRef idx="minor">
+            <a:schemeClr val="lt1"/>
+          </a:fontRef>
+        </p:style>
+        <p:txBody>
+          <a:bodyPr rtlCol="0" anchor="ctr"/>
+          <a:lstStyle/>
+          <a:p>
+            <a:pPr algn="ctr"/>
+            <a:endParaRPr lang="en-PH"/>
+          </a:p>
+        </p:txBody>
+      </p:sp>
+      <p:sp>
+        <p:nvSpPr>
+          <p:cNvPr id="27" name="Oval 26">
+            <a:extLst>
+              <a:ext uri="{FF2B5EF4-FFF2-40B4-BE49-F238E27FC236}">
+                <a16:creationId xmlns:a16="http://schemas.microsoft.com/office/drawing/2014/main" id="{A1C16AAE-B7B7-9E61-4CA3-CFEF3A41AFF3}"/>
+              </a:ext>
+            </a:extLst>
+          </p:cNvPr>
+          <p:cNvSpPr/>
+          <p:nvPr/>
+        </p:nvSpPr>
+        <p:spPr>
+          <a:xfrm>
+            <a:off x="11682604" y="5517810"/>
+            <a:ext cx="180000" cy="180000"/>
+          </a:xfrm>
+          <a:prstGeom prst="ellipse">
+            <a:avLst/>
+          </a:prstGeom>
+        </p:spPr>
+        <p:style>
+          <a:lnRef idx="2">
+            <a:schemeClr val="accent1">
+              <a:shade val="15000"/>
+            </a:schemeClr>
+          </a:lnRef>
+          <a:fillRef idx="1">
+            <a:schemeClr val="accent1"/>
+          </a:fillRef>
+          <a:effectRef idx="0">
+            <a:schemeClr val="accent1"/>
+          </a:effectRef>
+          <a:fontRef idx="minor">
+            <a:schemeClr val="lt1"/>
+          </a:fontRef>
+        </p:style>
+        <p:txBody>
+          <a:bodyPr rtlCol="0" anchor="ctr"/>
+          <a:lstStyle/>
+          <a:p>
+            <a:pPr algn="ctr"/>
+            <a:endParaRPr lang="en-PH"/>
+          </a:p>
+        </p:txBody>
+      </p:sp>
+      <p:sp>
+        <p:nvSpPr>
+          <p:cNvPr id="28" name="Oval 27">
+            <a:extLst>
+              <a:ext uri="{FF2B5EF4-FFF2-40B4-BE49-F238E27FC236}">
+                <a16:creationId xmlns:a16="http://schemas.microsoft.com/office/drawing/2014/main" id="{6BEDD6C5-FC60-8672-F243-C44B9C038E8F}"/>
+              </a:ext>
+            </a:extLst>
+          </p:cNvPr>
+          <p:cNvSpPr/>
+          <p:nvPr/>
+        </p:nvSpPr>
+        <p:spPr>
+          <a:xfrm>
+            <a:off x="11682604" y="1925430"/>
+            <a:ext cx="180000" cy="180000"/>
+          </a:xfrm>
+          <a:prstGeom prst="ellipse">
+            <a:avLst/>
+          </a:prstGeom>
+        </p:spPr>
+        <p:style>
+          <a:lnRef idx="2">
+            <a:schemeClr val="accent1">
+              <a:shade val="15000"/>
+            </a:schemeClr>
+          </a:lnRef>
+          <a:fillRef idx="1">
+            <a:schemeClr val="accent1"/>
+          </a:fillRef>
+          <a:effectRef idx="0">
+            <a:schemeClr val="accent1"/>
+          </a:effectRef>
+          <a:fontRef idx="minor">
+            <a:schemeClr val="lt1"/>
+          </a:fontRef>
+        </p:style>
+        <p:txBody>
+          <a:bodyPr rtlCol="0" anchor="ctr"/>
+          <a:lstStyle/>
+          <a:p>
+            <a:pPr algn="ctr"/>
+            <a:endParaRPr lang="en-PH"/>
+          </a:p>
+        </p:txBody>
+      </p:sp>
+      <p:cxnSp>
+        <p:nvCxnSpPr>
+          <p:cNvPr id="29" name="Straight Arrow Connector 28">
+            <a:extLst>
+              <a:ext uri="{FF2B5EF4-FFF2-40B4-BE49-F238E27FC236}">
+                <a16:creationId xmlns:a16="http://schemas.microsoft.com/office/drawing/2014/main" id="{D06591B7-F67E-5AEB-CE05-BCF816178908}"/>
+              </a:ext>
+            </a:extLst>
+          </p:cNvPr>
+          <p:cNvCxnSpPr>
+            <a:cxnSpLocks/>
+            <a:stCxn id="25" idx="5"/>
+          </p:cNvCxnSpPr>
+          <p:nvPr/>
+        </p:nvCxnSpPr>
+        <p:spPr>
+          <a:xfrm>
+            <a:off x="8241527" y="2071450"/>
+            <a:ext cx="1736361" cy="1736359"/>
+          </a:xfrm>
+          <a:prstGeom prst="straightConnector1">
+            <a:avLst/>
+          </a:prstGeom>
+          <a:ln>
+            <a:tailEnd type="triangle"/>
+          </a:ln>
+        </p:spPr>
+        <p:style>
+          <a:lnRef idx="2">
+            <a:schemeClr val="accent1"/>
+          </a:lnRef>
+          <a:fillRef idx="0">
+            <a:schemeClr val="accent1"/>
+          </a:fillRef>
+          <a:effectRef idx="1">
+            <a:schemeClr val="accent1"/>
+          </a:effectRef>
+          <a:fontRef idx="minor">
+            <a:schemeClr val="tx1"/>
+          </a:fontRef>
+        </p:style>
+      </p:cxnSp>
+      <p:cxnSp>
+        <p:nvCxnSpPr>
+          <p:cNvPr id="30" name="Straight Arrow Connector 29">
+            <a:extLst>
+              <a:ext uri="{FF2B5EF4-FFF2-40B4-BE49-F238E27FC236}">
+                <a16:creationId xmlns:a16="http://schemas.microsoft.com/office/drawing/2014/main" id="{39E4B417-9D3D-274F-DA60-D68A773197AC}"/>
+              </a:ext>
+            </a:extLst>
+          </p:cNvPr>
+          <p:cNvCxnSpPr>
+            <a:stCxn id="26" idx="7"/>
+          </p:cNvCxnSpPr>
+          <p:nvPr/>
+        </p:nvCxnSpPr>
+        <p:spPr>
+          <a:xfrm flipV="1">
+            <a:off x="8241527" y="3794631"/>
+            <a:ext cx="1731075" cy="1729628"/>
+          </a:xfrm>
+          <a:prstGeom prst="straightConnector1">
+            <a:avLst/>
+          </a:prstGeom>
+          <a:ln>
+            <a:tailEnd type="triangle"/>
+          </a:ln>
+        </p:spPr>
+        <p:style>
+          <a:lnRef idx="2">
+            <a:schemeClr val="accent1"/>
+          </a:lnRef>
+          <a:fillRef idx="0">
+            <a:schemeClr val="accent1"/>
+          </a:fillRef>
+          <a:effectRef idx="1">
+            <a:schemeClr val="accent1"/>
+          </a:effectRef>
+          <a:fontRef idx="minor">
+            <a:schemeClr val="tx1"/>
+          </a:fontRef>
+        </p:style>
+      </p:cxnSp>
+      <p:cxnSp>
+        <p:nvCxnSpPr>
+          <p:cNvPr id="31" name="Straight Arrow Connector 30">
+            <a:extLst>
+              <a:ext uri="{FF2B5EF4-FFF2-40B4-BE49-F238E27FC236}">
+                <a16:creationId xmlns:a16="http://schemas.microsoft.com/office/drawing/2014/main" id="{9BD96F9A-058E-1362-6345-D25652237610}"/>
+              </a:ext>
+            </a:extLst>
+          </p:cNvPr>
+          <p:cNvCxnSpPr>
+            <a:cxnSpLocks/>
+            <a:stCxn id="28" idx="3"/>
+          </p:cNvCxnSpPr>
+          <p:nvPr/>
+        </p:nvCxnSpPr>
+        <p:spPr>
+          <a:xfrm flipH="1">
+            <a:off x="9983174" y="2079070"/>
+            <a:ext cx="1725790" cy="1728739"/>
+          </a:xfrm>
+          <a:prstGeom prst="straightConnector1">
+            <a:avLst/>
+          </a:prstGeom>
+          <a:ln>
+            <a:tailEnd type="triangle"/>
+          </a:ln>
+        </p:spPr>
+        <p:style>
+          <a:lnRef idx="2">
+            <a:schemeClr val="accent1"/>
+          </a:lnRef>
+          <a:fillRef idx="0">
+            <a:schemeClr val="accent1"/>
+          </a:fillRef>
+          <a:effectRef idx="1">
+            <a:schemeClr val="accent1"/>
+          </a:effectRef>
+          <a:fontRef idx="minor">
+            <a:schemeClr val="tx1"/>
+          </a:fontRef>
+        </p:style>
+      </p:cxnSp>
+      <p:cxnSp>
+        <p:nvCxnSpPr>
+          <p:cNvPr id="32" name="Straight Arrow Connector 31">
+            <a:extLst>
+              <a:ext uri="{FF2B5EF4-FFF2-40B4-BE49-F238E27FC236}">
+                <a16:creationId xmlns:a16="http://schemas.microsoft.com/office/drawing/2014/main" id="{0E334835-E3F1-0EA9-D6CC-D73BC5B62186}"/>
+              </a:ext>
+            </a:extLst>
+          </p:cNvPr>
+          <p:cNvCxnSpPr>
+            <a:stCxn id="27" idx="1"/>
+          </p:cNvCxnSpPr>
+          <p:nvPr/>
+        </p:nvCxnSpPr>
+        <p:spPr>
+          <a:xfrm flipH="1" flipV="1">
+            <a:off x="9972602" y="3794631"/>
+            <a:ext cx="1736362" cy="1749539"/>
+          </a:xfrm>
+          <a:prstGeom prst="straightConnector1">
+            <a:avLst/>
+          </a:prstGeom>
+          <a:ln>
+            <a:tailEnd type="triangle"/>
+          </a:ln>
+        </p:spPr>
+        <p:style>
+          <a:lnRef idx="2">
+            <a:schemeClr val="accent1"/>
+          </a:lnRef>
+          <a:fillRef idx="0">
+            <a:schemeClr val="accent1"/>
+          </a:fillRef>
+          <a:effectRef idx="1">
+            <a:schemeClr val="accent1"/>
+          </a:effectRef>
+          <a:fontRef idx="minor">
+            <a:schemeClr val="tx1"/>
+          </a:fontRef>
+        </p:style>
+      </p:cxnSp>
+      <p:sp>
+        <p:nvSpPr>
+          <p:cNvPr id="33" name="TextBox 32">
+            <a:extLst>
+              <a:ext uri="{FF2B5EF4-FFF2-40B4-BE49-F238E27FC236}">
+                <a16:creationId xmlns:a16="http://schemas.microsoft.com/office/drawing/2014/main" id="{A1A6F537-8A84-BD14-80B3-C93C5F3BB147}"/>
+              </a:ext>
+            </a:extLst>
+          </p:cNvPr>
+          <p:cNvSpPr txBox="1"/>
+          <p:nvPr/>
+        </p:nvSpPr>
+        <p:spPr>
+          <a:xfrm>
+            <a:off x="558892" y="1458469"/>
+            <a:ext cx="3616841" cy="523220"/>
+          </a:xfrm>
+          <a:prstGeom prst="rect">
+            <a:avLst/>
+          </a:prstGeom>
+          <a:noFill/>
+        </p:spPr>
+        <p:txBody>
+          <a:bodyPr wrap="square" rtlCol="0">
+            <a:spAutoFit/>
+          </a:bodyPr>
+          <a:lstStyle/>
+          <a:p>
+            <a:pPr algn="ctr"/>
+            <a:r>
+              <a:rPr lang="en-PH" sz="2800" dirty="0"/>
+              <a:t>Inner corner</a:t>
+            </a:r>
+          </a:p>
+        </p:txBody>
+      </p:sp>
+      <p:sp>
+        <p:nvSpPr>
+          <p:cNvPr id="34" name="TextBox 33">
+            <a:extLst>
+              <a:ext uri="{FF2B5EF4-FFF2-40B4-BE49-F238E27FC236}">
+                <a16:creationId xmlns:a16="http://schemas.microsoft.com/office/drawing/2014/main" id="{88374645-87A3-4FAA-446A-5702AEDAF4BC}"/>
+              </a:ext>
+            </a:extLst>
+          </p:cNvPr>
+          <p:cNvSpPr txBox="1"/>
+          <p:nvPr/>
+        </p:nvSpPr>
+        <p:spPr>
+          <a:xfrm>
+            <a:off x="4376810" y="1458469"/>
+            <a:ext cx="3566278" cy="523220"/>
+          </a:xfrm>
+          <a:prstGeom prst="rect">
+            <a:avLst/>
+          </a:prstGeom>
+          <a:noFill/>
+        </p:spPr>
+        <p:txBody>
+          <a:bodyPr wrap="square" rtlCol="0">
+            <a:spAutoFit/>
+          </a:bodyPr>
+          <a:lstStyle/>
+          <a:p>
+            <a:pPr algn="ctr"/>
+            <a:r>
+              <a:rPr lang="en-PH" sz="2800" dirty="0"/>
+              <a:t>Center</a:t>
+            </a:r>
+          </a:p>
+        </p:txBody>
+      </p:sp>
+      <p:sp>
+        <p:nvSpPr>
+          <p:cNvPr id="35" name="TextBox 34">
+            <a:extLst>
+              <a:ext uri="{FF2B5EF4-FFF2-40B4-BE49-F238E27FC236}">
+                <a16:creationId xmlns:a16="http://schemas.microsoft.com/office/drawing/2014/main" id="{D387BC27-5805-86B2-548B-CE0A237F7E57}"/>
+              </a:ext>
+            </a:extLst>
+          </p:cNvPr>
+          <p:cNvSpPr txBox="1"/>
+          <p:nvPr/>
+        </p:nvSpPr>
+        <p:spPr>
+          <a:xfrm>
+            <a:off x="8217636" y="1458469"/>
+            <a:ext cx="3600000" cy="523220"/>
+          </a:xfrm>
+          <a:prstGeom prst="rect">
+            <a:avLst/>
+          </a:prstGeom>
+          <a:noFill/>
+        </p:spPr>
+        <p:txBody>
+          <a:bodyPr wrap="square" rtlCol="0">
+            <a:spAutoFit/>
+          </a:bodyPr>
+          <a:lstStyle/>
+          <a:p>
+            <a:pPr algn="ctr"/>
+            <a:r>
+              <a:rPr lang="en-PH" sz="2800" dirty="0"/>
+              <a:t>Outer corner</a:t>
+            </a:r>
+          </a:p>
+        </p:txBody>
+      </p:sp>
     </p:spTree>
     <p:extLst>
       <p:ext uri="{BB962C8B-B14F-4D97-AF65-F5344CB8AC3E}">
         <p14:creationId xmlns:p14="http://schemas.microsoft.com/office/powerpoint/2010/main" val="2922023225"/>
+      </p:ext>
+    </p:extLst>
+  </p:cSld>
+  <p:clrMapOvr>
+    <a:masterClrMapping/>
+  </p:clrMapOvr>
+</p:sld>
+</file>
+
+<file path=ppt/slides/slide3.xml><?xml version="1.0" encoding="utf-8"?>
+<p:sld xmlns:a="http://schemas.openxmlformats.org/drawingml/2006/main" xmlns:r="http://schemas.openxmlformats.org/officeDocument/2006/relationships" xmlns:p="http://schemas.openxmlformats.org/presentationml/2006/main">
+  <p:cSld>
+    <p:spTree>
+      <p:nvGrpSpPr>
+        <p:cNvPr id="1" name=""/>
+        <p:cNvGrpSpPr/>
+        <p:nvPr/>
+      </p:nvGrpSpPr>
+      <p:grpSpPr>
+        <a:xfrm>
+          <a:off x="0" y="0"/>
+          <a:ext cx="0" cy="0"/>
+          <a:chOff x="0" y="0"/>
+          <a:chExt cx="0" cy="0"/>
+        </a:xfrm>
+      </p:grpSpPr>
+      <p:grpSp>
+        <p:nvGrpSpPr>
+          <p:cNvPr id="18" name="Group 17">
+            <a:extLst>
+              <a:ext uri="{FF2B5EF4-FFF2-40B4-BE49-F238E27FC236}">
+                <a16:creationId xmlns:a16="http://schemas.microsoft.com/office/drawing/2014/main" id="{024ABE80-B688-EAFB-2E1A-25206AB8EFBA}"/>
+              </a:ext>
+            </a:extLst>
+          </p:cNvPr>
+          <p:cNvGrpSpPr/>
+          <p:nvPr/>
+        </p:nvGrpSpPr>
+        <p:grpSpPr>
+          <a:xfrm>
+            <a:off x="1724392" y="48425"/>
+            <a:ext cx="2833282" cy="3250419"/>
+            <a:chOff x="558891" y="1458469"/>
+            <a:chExt cx="3616842" cy="4149341"/>
+          </a:xfrm>
+        </p:grpSpPr>
+        <p:sp>
+          <p:nvSpPr>
+            <p:cNvPr id="2" name="Rectangle 1">
+              <a:extLst>
+                <a:ext uri="{FF2B5EF4-FFF2-40B4-BE49-F238E27FC236}">
+                  <a16:creationId xmlns:a16="http://schemas.microsoft.com/office/drawing/2014/main" id="{91A9068F-CA68-51F8-6FFD-463982A25DA3}"/>
+                </a:ext>
+              </a:extLst>
+            </p:cNvPr>
+            <p:cNvSpPr/>
+            <p:nvPr/>
+          </p:nvSpPr>
+          <p:spPr>
+            <a:xfrm>
+              <a:off x="575733" y="2007810"/>
+              <a:ext cx="3600000" cy="3600000"/>
+            </a:xfrm>
+            <a:prstGeom prst="rect">
+              <a:avLst/>
+            </a:prstGeom>
+            <a:noFill/>
+            <a:ln>
+              <a:solidFill>
+                <a:schemeClr val="accent1"/>
+              </a:solidFill>
+            </a:ln>
+          </p:spPr>
+          <p:style>
+            <a:lnRef idx="2">
+              <a:schemeClr val="accent1">
+                <a:shade val="15000"/>
+              </a:schemeClr>
+            </a:lnRef>
+            <a:fillRef idx="1">
+              <a:schemeClr val="accent1"/>
+            </a:fillRef>
+            <a:effectRef idx="0">
+              <a:schemeClr val="accent1"/>
+            </a:effectRef>
+            <a:fontRef idx="minor">
+              <a:schemeClr val="lt1"/>
+            </a:fontRef>
+          </p:style>
+          <p:txBody>
+            <a:bodyPr rtlCol="0" anchor="ctr"/>
+            <a:lstStyle/>
+            <a:p>
+              <a:pPr algn="ctr"/>
+              <a:endParaRPr lang="en-PH"/>
+            </a:p>
+          </p:txBody>
+        </p:sp>
+        <p:sp>
+          <p:nvSpPr>
+            <p:cNvPr id="5" name="Oval 4">
+              <a:extLst>
+                <a:ext uri="{FF2B5EF4-FFF2-40B4-BE49-F238E27FC236}">
+                  <a16:creationId xmlns:a16="http://schemas.microsoft.com/office/drawing/2014/main" id="{20FF252F-EB0A-3EA2-1C69-1E4DDD4AAFB3}"/>
+                </a:ext>
+              </a:extLst>
+            </p:cNvPr>
+            <p:cNvSpPr/>
+            <p:nvPr/>
+          </p:nvSpPr>
+          <p:spPr>
+            <a:xfrm>
+              <a:off x="1475733" y="2907810"/>
+              <a:ext cx="168388" cy="172286"/>
+            </a:xfrm>
+            <a:prstGeom prst="ellipse">
+              <a:avLst/>
+            </a:prstGeom>
+          </p:spPr>
+          <p:style>
+            <a:lnRef idx="2">
+              <a:schemeClr val="accent1">
+                <a:shade val="15000"/>
+              </a:schemeClr>
+            </a:lnRef>
+            <a:fillRef idx="1">
+              <a:schemeClr val="accent1"/>
+            </a:fillRef>
+            <a:effectRef idx="0">
+              <a:schemeClr val="accent1"/>
+            </a:effectRef>
+            <a:fontRef idx="minor">
+              <a:schemeClr val="lt1"/>
+            </a:fontRef>
+          </p:style>
+          <p:txBody>
+            <a:bodyPr rtlCol="0" anchor="ctr"/>
+            <a:lstStyle/>
+            <a:p>
+              <a:pPr algn="ctr"/>
+              <a:endParaRPr lang="en-PH"/>
+            </a:p>
+          </p:txBody>
+        </p:sp>
+        <p:sp>
+          <p:nvSpPr>
+            <p:cNvPr id="6" name="Oval 5">
+              <a:extLst>
+                <a:ext uri="{FF2B5EF4-FFF2-40B4-BE49-F238E27FC236}">
+                  <a16:creationId xmlns:a16="http://schemas.microsoft.com/office/drawing/2014/main" id="{18C2E593-A8A6-B49D-CDFF-8CE755D82B6C}"/>
+                </a:ext>
+              </a:extLst>
+            </p:cNvPr>
+            <p:cNvSpPr/>
+            <p:nvPr/>
+          </p:nvSpPr>
+          <p:spPr>
+            <a:xfrm>
+              <a:off x="3107345" y="4535524"/>
+              <a:ext cx="168388" cy="172286"/>
+            </a:xfrm>
+            <a:prstGeom prst="ellipse">
+              <a:avLst/>
+            </a:prstGeom>
+          </p:spPr>
+          <p:style>
+            <a:lnRef idx="2">
+              <a:schemeClr val="accent1">
+                <a:shade val="15000"/>
+              </a:schemeClr>
+            </a:lnRef>
+            <a:fillRef idx="1">
+              <a:schemeClr val="accent1"/>
+            </a:fillRef>
+            <a:effectRef idx="0">
+              <a:schemeClr val="accent1"/>
+            </a:effectRef>
+            <a:fontRef idx="minor">
+              <a:schemeClr val="lt1"/>
+            </a:fontRef>
+          </p:style>
+          <p:txBody>
+            <a:bodyPr rtlCol="0" anchor="ctr"/>
+            <a:lstStyle/>
+            <a:p>
+              <a:pPr algn="ctr"/>
+              <a:endParaRPr lang="en-PH"/>
+            </a:p>
+          </p:txBody>
+        </p:sp>
+        <p:grpSp>
+          <p:nvGrpSpPr>
+            <p:cNvPr id="11" name="Group 10">
+              <a:extLst>
+                <a:ext uri="{FF2B5EF4-FFF2-40B4-BE49-F238E27FC236}">
+                  <a16:creationId xmlns:a16="http://schemas.microsoft.com/office/drawing/2014/main" id="{39B59187-5EA0-78F3-6996-B5858FCDAF62}"/>
+                </a:ext>
+              </a:extLst>
+            </p:cNvPr>
+            <p:cNvGrpSpPr/>
+            <p:nvPr/>
+          </p:nvGrpSpPr>
+          <p:grpSpPr>
+            <a:xfrm rot="16200000">
+              <a:off x="1458892" y="2910270"/>
+              <a:ext cx="1800000" cy="1800000"/>
+              <a:chOff x="1628133" y="3060210"/>
+              <a:chExt cx="1800000" cy="1800000"/>
+            </a:xfrm>
+          </p:grpSpPr>
+          <p:sp>
+            <p:nvSpPr>
+              <p:cNvPr id="12" name="Oval 11">
+                <a:extLst>
+                  <a:ext uri="{FF2B5EF4-FFF2-40B4-BE49-F238E27FC236}">
+                    <a16:creationId xmlns:a16="http://schemas.microsoft.com/office/drawing/2014/main" id="{087176AD-AE63-C7DD-60BB-5CD6662C3971}"/>
+                  </a:ext>
+                </a:extLst>
+              </p:cNvPr>
+              <p:cNvSpPr/>
+              <p:nvPr/>
+            </p:nvSpPr>
+            <p:spPr>
+              <a:xfrm>
+                <a:off x="1628133" y="3060210"/>
+                <a:ext cx="168388" cy="172286"/>
+              </a:xfrm>
+              <a:prstGeom prst="ellipse">
+                <a:avLst/>
+              </a:prstGeom>
+            </p:spPr>
+            <p:style>
+              <a:lnRef idx="2">
+                <a:schemeClr val="accent1">
+                  <a:shade val="15000"/>
+                </a:schemeClr>
+              </a:lnRef>
+              <a:fillRef idx="1">
+                <a:schemeClr val="accent1"/>
+              </a:fillRef>
+              <a:effectRef idx="0">
+                <a:schemeClr val="accent1"/>
+              </a:effectRef>
+              <a:fontRef idx="minor">
+                <a:schemeClr val="lt1"/>
+              </a:fontRef>
+            </p:style>
+            <p:txBody>
+              <a:bodyPr rtlCol="0" anchor="ctr"/>
+              <a:lstStyle/>
+              <a:p>
+                <a:pPr algn="ctr"/>
+                <a:endParaRPr lang="en-PH"/>
+              </a:p>
+            </p:txBody>
+          </p:sp>
+          <p:sp>
+            <p:nvSpPr>
+              <p:cNvPr id="13" name="Oval 12">
+                <a:extLst>
+                  <a:ext uri="{FF2B5EF4-FFF2-40B4-BE49-F238E27FC236}">
+                    <a16:creationId xmlns:a16="http://schemas.microsoft.com/office/drawing/2014/main" id="{88603B28-DBCF-431F-969E-2B909D7E1391}"/>
+                  </a:ext>
+                </a:extLst>
+              </p:cNvPr>
+              <p:cNvSpPr/>
+              <p:nvPr/>
+            </p:nvSpPr>
+            <p:spPr>
+              <a:xfrm>
+                <a:off x="3259745" y="4687924"/>
+                <a:ext cx="168388" cy="172286"/>
+              </a:xfrm>
+              <a:prstGeom prst="ellipse">
+                <a:avLst/>
+              </a:prstGeom>
+            </p:spPr>
+            <p:style>
+              <a:lnRef idx="2">
+                <a:schemeClr val="accent1">
+                  <a:shade val="15000"/>
+                </a:schemeClr>
+              </a:lnRef>
+              <a:fillRef idx="1">
+                <a:schemeClr val="accent1"/>
+              </a:fillRef>
+              <a:effectRef idx="0">
+                <a:schemeClr val="accent1"/>
+              </a:effectRef>
+              <a:fontRef idx="minor">
+                <a:schemeClr val="lt1"/>
+              </a:fontRef>
+            </p:style>
+            <p:txBody>
+              <a:bodyPr rtlCol="0" anchor="ctr"/>
+              <a:lstStyle/>
+              <a:p>
+                <a:pPr algn="ctr"/>
+                <a:endParaRPr lang="en-PH"/>
+              </a:p>
+            </p:txBody>
+          </p:sp>
+        </p:grpSp>
+        <p:sp>
+          <p:nvSpPr>
+            <p:cNvPr id="33" name="TextBox 32">
+              <a:extLst>
+                <a:ext uri="{FF2B5EF4-FFF2-40B4-BE49-F238E27FC236}">
+                  <a16:creationId xmlns:a16="http://schemas.microsoft.com/office/drawing/2014/main" id="{A1A6F537-8A84-BD14-80B3-C93C5F3BB147}"/>
+                </a:ext>
+              </a:extLst>
+            </p:cNvPr>
+            <p:cNvSpPr txBox="1"/>
+            <p:nvPr/>
+          </p:nvSpPr>
+          <p:spPr>
+            <a:xfrm>
+              <a:off x="558891" y="1458469"/>
+              <a:ext cx="3616841" cy="523221"/>
+            </a:xfrm>
+            <a:prstGeom prst="rect">
+              <a:avLst/>
+            </a:prstGeom>
+            <a:noFill/>
+          </p:spPr>
+          <p:txBody>
+            <a:bodyPr wrap="square" rtlCol="0">
+              <a:spAutoFit/>
+            </a:bodyPr>
+            <a:lstStyle/>
+            <a:p>
+              <a:pPr algn="ctr"/>
+              <a:r>
+                <a:rPr lang="en-PH" sz="2800" dirty="0"/>
+                <a:t>Inner corner</a:t>
+              </a:r>
+            </a:p>
+          </p:txBody>
+        </p:sp>
+      </p:grpSp>
+      <p:grpSp>
+        <p:nvGrpSpPr>
+          <p:cNvPr id="24" name="Group 23">
+            <a:extLst>
+              <a:ext uri="{FF2B5EF4-FFF2-40B4-BE49-F238E27FC236}">
+                <a16:creationId xmlns:a16="http://schemas.microsoft.com/office/drawing/2014/main" id="{A96F8876-AC69-661B-5DCD-2307B4069371}"/>
+              </a:ext>
+            </a:extLst>
+          </p:cNvPr>
+          <p:cNvGrpSpPr/>
+          <p:nvPr/>
+        </p:nvGrpSpPr>
+        <p:grpSpPr>
+          <a:xfrm>
+            <a:off x="4801016" y="48425"/>
+            <a:ext cx="2820088" cy="3250419"/>
+            <a:chOff x="4376810" y="1458469"/>
+            <a:chExt cx="3600000" cy="4149341"/>
+          </a:xfrm>
+        </p:grpSpPr>
+        <p:sp>
+          <p:nvSpPr>
+            <p:cNvPr id="3" name="Rectangle 2">
+              <a:extLst>
+                <a:ext uri="{FF2B5EF4-FFF2-40B4-BE49-F238E27FC236}">
+                  <a16:creationId xmlns:a16="http://schemas.microsoft.com/office/drawing/2014/main" id="{8A5F81CC-2722-0ED8-303D-42480B408F13}"/>
+                </a:ext>
+              </a:extLst>
+            </p:cNvPr>
+            <p:cNvSpPr/>
+            <p:nvPr/>
+          </p:nvSpPr>
+          <p:spPr>
+            <a:xfrm>
+              <a:off x="4376810" y="2007810"/>
+              <a:ext cx="3600000" cy="3600000"/>
+            </a:xfrm>
+            <a:prstGeom prst="rect">
+              <a:avLst/>
+            </a:prstGeom>
+            <a:noFill/>
+            <a:ln>
+              <a:solidFill>
+                <a:schemeClr val="accent1"/>
+              </a:solidFill>
+            </a:ln>
+          </p:spPr>
+          <p:style>
+            <a:lnRef idx="2">
+              <a:schemeClr val="accent1">
+                <a:shade val="15000"/>
+              </a:schemeClr>
+            </a:lnRef>
+            <a:fillRef idx="1">
+              <a:schemeClr val="accent1"/>
+            </a:fillRef>
+            <a:effectRef idx="0">
+              <a:schemeClr val="accent1"/>
+            </a:effectRef>
+            <a:fontRef idx="minor">
+              <a:schemeClr val="lt1"/>
+            </a:fontRef>
+          </p:style>
+          <p:txBody>
+            <a:bodyPr rtlCol="0" anchor="ctr"/>
+            <a:lstStyle/>
+            <a:p>
+              <a:pPr algn="ctr"/>
+              <a:endParaRPr lang="en-PH"/>
+            </a:p>
+          </p:txBody>
+        </p:sp>
+        <p:sp>
+          <p:nvSpPr>
+            <p:cNvPr id="19" name="Oval 18">
+              <a:extLst>
+                <a:ext uri="{FF2B5EF4-FFF2-40B4-BE49-F238E27FC236}">
+                  <a16:creationId xmlns:a16="http://schemas.microsoft.com/office/drawing/2014/main" id="{565EF036-2AD5-C40A-8A88-1776DA4F9076}"/>
+                </a:ext>
+              </a:extLst>
+            </p:cNvPr>
+            <p:cNvSpPr/>
+            <p:nvPr/>
+          </p:nvSpPr>
+          <p:spPr>
+            <a:xfrm>
+              <a:off x="5916000" y="3627809"/>
+              <a:ext cx="360000" cy="360000"/>
+            </a:xfrm>
+            <a:prstGeom prst="ellipse">
+              <a:avLst/>
+            </a:prstGeom>
+          </p:spPr>
+          <p:style>
+            <a:lnRef idx="2">
+              <a:schemeClr val="accent1">
+                <a:shade val="15000"/>
+              </a:schemeClr>
+            </a:lnRef>
+            <a:fillRef idx="1">
+              <a:schemeClr val="accent1"/>
+            </a:fillRef>
+            <a:effectRef idx="0">
+              <a:schemeClr val="accent1"/>
+            </a:effectRef>
+            <a:fontRef idx="minor">
+              <a:schemeClr val="lt1"/>
+            </a:fontRef>
+          </p:style>
+          <p:txBody>
+            <a:bodyPr rtlCol="0" anchor="ctr"/>
+            <a:lstStyle/>
+            <a:p>
+              <a:pPr algn="ctr"/>
+              <a:endParaRPr lang="en-PH"/>
+            </a:p>
+          </p:txBody>
+        </p:sp>
+        <p:sp>
+          <p:nvSpPr>
+            <p:cNvPr id="34" name="TextBox 33">
+              <a:extLst>
+                <a:ext uri="{FF2B5EF4-FFF2-40B4-BE49-F238E27FC236}">
+                  <a16:creationId xmlns:a16="http://schemas.microsoft.com/office/drawing/2014/main" id="{88374645-87A3-4FAA-446A-5702AEDAF4BC}"/>
+                </a:ext>
+              </a:extLst>
+            </p:cNvPr>
+            <p:cNvSpPr txBox="1"/>
+            <p:nvPr/>
+          </p:nvSpPr>
+          <p:spPr>
+            <a:xfrm>
+              <a:off x="4376810" y="1458469"/>
+              <a:ext cx="3566278" cy="523220"/>
+            </a:xfrm>
+            <a:prstGeom prst="rect">
+              <a:avLst/>
+            </a:prstGeom>
+            <a:noFill/>
+          </p:spPr>
+          <p:txBody>
+            <a:bodyPr wrap="square" rtlCol="0">
+              <a:spAutoFit/>
+            </a:bodyPr>
+            <a:lstStyle/>
+            <a:p>
+              <a:pPr algn="ctr"/>
+              <a:r>
+                <a:rPr lang="en-PH" sz="2800" dirty="0"/>
+                <a:t>Center</a:t>
+              </a:r>
+            </a:p>
+          </p:txBody>
+        </p:sp>
+      </p:grpSp>
+      <p:grpSp>
+        <p:nvGrpSpPr>
+          <p:cNvPr id="36" name="Group 35">
+            <a:extLst>
+              <a:ext uri="{FF2B5EF4-FFF2-40B4-BE49-F238E27FC236}">
+                <a16:creationId xmlns:a16="http://schemas.microsoft.com/office/drawing/2014/main" id="{AA6BB1C2-FE82-FA47-FE33-2EFADA54B747}"/>
+              </a:ext>
+            </a:extLst>
+          </p:cNvPr>
+          <p:cNvGrpSpPr/>
+          <p:nvPr/>
+        </p:nvGrpSpPr>
+        <p:grpSpPr>
+          <a:xfrm>
+            <a:off x="1662555" y="3297717"/>
+            <a:ext cx="2956954" cy="3320921"/>
+            <a:chOff x="8087887" y="1458469"/>
+            <a:chExt cx="3774717" cy="4239341"/>
+          </a:xfrm>
+        </p:grpSpPr>
+        <p:sp>
+          <p:nvSpPr>
+            <p:cNvPr id="4" name="Rectangle 3">
+              <a:extLst>
+                <a:ext uri="{FF2B5EF4-FFF2-40B4-BE49-F238E27FC236}">
+                  <a16:creationId xmlns:a16="http://schemas.microsoft.com/office/drawing/2014/main" id="{B1B1F4B4-B261-F312-35CC-AC5B0D2C4CA9}"/>
+                </a:ext>
+              </a:extLst>
+            </p:cNvPr>
+            <p:cNvSpPr/>
+            <p:nvPr/>
+          </p:nvSpPr>
+          <p:spPr>
+            <a:xfrm>
+              <a:off x="8177888" y="2007810"/>
+              <a:ext cx="3600000" cy="3600000"/>
+            </a:xfrm>
+            <a:prstGeom prst="rect">
+              <a:avLst/>
+            </a:prstGeom>
+            <a:noFill/>
+            <a:ln>
+              <a:solidFill>
+                <a:schemeClr val="accent1"/>
+              </a:solidFill>
+            </a:ln>
+          </p:spPr>
+          <p:style>
+            <a:lnRef idx="2">
+              <a:schemeClr val="accent1">
+                <a:shade val="15000"/>
+              </a:schemeClr>
+            </a:lnRef>
+            <a:fillRef idx="1">
+              <a:schemeClr val="accent1"/>
+            </a:fillRef>
+            <a:effectRef idx="0">
+              <a:schemeClr val="accent1"/>
+            </a:effectRef>
+            <a:fontRef idx="minor">
+              <a:schemeClr val="lt1"/>
+            </a:fontRef>
+          </p:style>
+          <p:txBody>
+            <a:bodyPr rtlCol="0" anchor="ctr"/>
+            <a:lstStyle/>
+            <a:p>
+              <a:pPr algn="ctr"/>
+              <a:endParaRPr lang="en-PH"/>
+            </a:p>
+          </p:txBody>
+        </p:sp>
+        <p:sp>
+          <p:nvSpPr>
+            <p:cNvPr id="25" name="Oval 24">
+              <a:extLst>
+                <a:ext uri="{FF2B5EF4-FFF2-40B4-BE49-F238E27FC236}">
+                  <a16:creationId xmlns:a16="http://schemas.microsoft.com/office/drawing/2014/main" id="{DB945A88-3D67-D254-0D8F-61DE87F8FFE5}"/>
+                </a:ext>
+              </a:extLst>
+            </p:cNvPr>
+            <p:cNvSpPr/>
+            <p:nvPr/>
+          </p:nvSpPr>
+          <p:spPr>
+            <a:xfrm>
+              <a:off x="8087887" y="1917810"/>
+              <a:ext cx="180000" cy="180000"/>
+            </a:xfrm>
+            <a:prstGeom prst="ellipse">
+              <a:avLst/>
+            </a:prstGeom>
+          </p:spPr>
+          <p:style>
+            <a:lnRef idx="2">
+              <a:schemeClr val="accent1">
+                <a:shade val="15000"/>
+              </a:schemeClr>
+            </a:lnRef>
+            <a:fillRef idx="1">
+              <a:schemeClr val="accent1"/>
+            </a:fillRef>
+            <a:effectRef idx="0">
+              <a:schemeClr val="accent1"/>
+            </a:effectRef>
+            <a:fontRef idx="minor">
+              <a:schemeClr val="lt1"/>
+            </a:fontRef>
+          </p:style>
+          <p:txBody>
+            <a:bodyPr rtlCol="0" anchor="ctr"/>
+            <a:lstStyle/>
+            <a:p>
+              <a:pPr algn="ctr"/>
+              <a:endParaRPr lang="en-PH"/>
+            </a:p>
+          </p:txBody>
+        </p:sp>
+        <p:sp>
+          <p:nvSpPr>
+            <p:cNvPr id="26" name="Oval 25">
+              <a:extLst>
+                <a:ext uri="{FF2B5EF4-FFF2-40B4-BE49-F238E27FC236}">
+                  <a16:creationId xmlns:a16="http://schemas.microsoft.com/office/drawing/2014/main" id="{972DAEA7-AB5C-66B2-15CE-7333D9AAEB51}"/>
+                </a:ext>
+              </a:extLst>
+            </p:cNvPr>
+            <p:cNvSpPr/>
+            <p:nvPr/>
+          </p:nvSpPr>
+          <p:spPr>
+            <a:xfrm>
+              <a:off x="8087887" y="5497899"/>
+              <a:ext cx="180000" cy="180000"/>
+            </a:xfrm>
+            <a:prstGeom prst="ellipse">
+              <a:avLst/>
+            </a:prstGeom>
+          </p:spPr>
+          <p:style>
+            <a:lnRef idx="2">
+              <a:schemeClr val="accent1">
+                <a:shade val="15000"/>
+              </a:schemeClr>
+            </a:lnRef>
+            <a:fillRef idx="1">
+              <a:schemeClr val="accent1"/>
+            </a:fillRef>
+            <a:effectRef idx="0">
+              <a:schemeClr val="accent1"/>
+            </a:effectRef>
+            <a:fontRef idx="minor">
+              <a:schemeClr val="lt1"/>
+            </a:fontRef>
+          </p:style>
+          <p:txBody>
+            <a:bodyPr rtlCol="0" anchor="ctr"/>
+            <a:lstStyle/>
+            <a:p>
+              <a:pPr algn="ctr"/>
+              <a:endParaRPr lang="en-PH"/>
+            </a:p>
+          </p:txBody>
+        </p:sp>
+        <p:sp>
+          <p:nvSpPr>
+            <p:cNvPr id="27" name="Oval 26">
+              <a:extLst>
+                <a:ext uri="{FF2B5EF4-FFF2-40B4-BE49-F238E27FC236}">
+                  <a16:creationId xmlns:a16="http://schemas.microsoft.com/office/drawing/2014/main" id="{A1C16AAE-B7B7-9E61-4CA3-CFEF3A41AFF3}"/>
+                </a:ext>
+              </a:extLst>
+            </p:cNvPr>
+            <p:cNvSpPr/>
+            <p:nvPr/>
+          </p:nvSpPr>
+          <p:spPr>
+            <a:xfrm>
+              <a:off x="11682604" y="5517810"/>
+              <a:ext cx="180000" cy="180000"/>
+            </a:xfrm>
+            <a:prstGeom prst="ellipse">
+              <a:avLst/>
+            </a:prstGeom>
+          </p:spPr>
+          <p:style>
+            <a:lnRef idx="2">
+              <a:schemeClr val="accent1">
+                <a:shade val="15000"/>
+              </a:schemeClr>
+            </a:lnRef>
+            <a:fillRef idx="1">
+              <a:schemeClr val="accent1"/>
+            </a:fillRef>
+            <a:effectRef idx="0">
+              <a:schemeClr val="accent1"/>
+            </a:effectRef>
+            <a:fontRef idx="minor">
+              <a:schemeClr val="lt1"/>
+            </a:fontRef>
+          </p:style>
+          <p:txBody>
+            <a:bodyPr rtlCol="0" anchor="ctr"/>
+            <a:lstStyle/>
+            <a:p>
+              <a:pPr algn="ctr"/>
+              <a:endParaRPr lang="en-PH"/>
+            </a:p>
+          </p:txBody>
+        </p:sp>
+        <p:sp>
+          <p:nvSpPr>
+            <p:cNvPr id="28" name="Oval 27">
+              <a:extLst>
+                <a:ext uri="{FF2B5EF4-FFF2-40B4-BE49-F238E27FC236}">
+                  <a16:creationId xmlns:a16="http://schemas.microsoft.com/office/drawing/2014/main" id="{6BEDD6C5-FC60-8672-F243-C44B9C038E8F}"/>
+                </a:ext>
+              </a:extLst>
+            </p:cNvPr>
+            <p:cNvSpPr/>
+            <p:nvPr/>
+          </p:nvSpPr>
+          <p:spPr>
+            <a:xfrm>
+              <a:off x="11682604" y="1925430"/>
+              <a:ext cx="180000" cy="180000"/>
+            </a:xfrm>
+            <a:prstGeom prst="ellipse">
+              <a:avLst/>
+            </a:prstGeom>
+          </p:spPr>
+          <p:style>
+            <a:lnRef idx="2">
+              <a:schemeClr val="accent1">
+                <a:shade val="15000"/>
+              </a:schemeClr>
+            </a:lnRef>
+            <a:fillRef idx="1">
+              <a:schemeClr val="accent1"/>
+            </a:fillRef>
+            <a:effectRef idx="0">
+              <a:schemeClr val="accent1"/>
+            </a:effectRef>
+            <a:fontRef idx="minor">
+              <a:schemeClr val="lt1"/>
+            </a:fontRef>
+          </p:style>
+          <p:txBody>
+            <a:bodyPr rtlCol="0" anchor="ctr"/>
+            <a:lstStyle/>
+            <a:p>
+              <a:pPr algn="ctr"/>
+              <a:endParaRPr lang="en-PH"/>
+            </a:p>
+          </p:txBody>
+        </p:sp>
+        <p:sp>
+          <p:nvSpPr>
+            <p:cNvPr id="35" name="TextBox 34">
+              <a:extLst>
+                <a:ext uri="{FF2B5EF4-FFF2-40B4-BE49-F238E27FC236}">
+                  <a16:creationId xmlns:a16="http://schemas.microsoft.com/office/drawing/2014/main" id="{D387BC27-5805-86B2-548B-CE0A237F7E57}"/>
+                </a:ext>
+              </a:extLst>
+            </p:cNvPr>
+            <p:cNvSpPr txBox="1"/>
+            <p:nvPr/>
+          </p:nvSpPr>
+          <p:spPr>
+            <a:xfrm>
+              <a:off x="8217636" y="1458469"/>
+              <a:ext cx="3600000" cy="523220"/>
+            </a:xfrm>
+            <a:prstGeom prst="rect">
+              <a:avLst/>
+            </a:prstGeom>
+            <a:noFill/>
+          </p:spPr>
+          <p:txBody>
+            <a:bodyPr wrap="square" rtlCol="0">
+              <a:spAutoFit/>
+            </a:bodyPr>
+            <a:lstStyle/>
+            <a:p>
+              <a:pPr algn="ctr"/>
+              <a:r>
+                <a:rPr lang="en-PH" sz="2800" dirty="0"/>
+                <a:t>Outer corner</a:t>
+              </a:r>
+            </a:p>
+          </p:txBody>
+        </p:sp>
+      </p:grpSp>
+      <p:sp>
+        <p:nvSpPr>
+          <p:cNvPr id="38" name="Rectangle 37">
+            <a:extLst>
+              <a:ext uri="{FF2B5EF4-FFF2-40B4-BE49-F238E27FC236}">
+                <a16:creationId xmlns:a16="http://schemas.microsoft.com/office/drawing/2014/main" id="{A5F70AB6-97EC-C46A-AA15-4E2B3FA22565}"/>
+              </a:ext>
+            </a:extLst>
+          </p:cNvPr>
+          <p:cNvSpPr/>
+          <p:nvPr/>
+        </p:nvSpPr>
+        <p:spPr>
+          <a:xfrm>
+            <a:off x="4803086" y="3711159"/>
+            <a:ext cx="2820088" cy="2820088"/>
+          </a:xfrm>
+          <a:prstGeom prst="rect">
+            <a:avLst/>
+          </a:prstGeom>
+          <a:noFill/>
+          <a:ln>
+            <a:solidFill>
+              <a:schemeClr val="accent1"/>
+            </a:solidFill>
+          </a:ln>
+        </p:spPr>
+        <p:style>
+          <a:lnRef idx="2">
+            <a:schemeClr val="accent1">
+              <a:shade val="15000"/>
+            </a:schemeClr>
+          </a:lnRef>
+          <a:fillRef idx="1">
+            <a:schemeClr val="accent1"/>
+          </a:fillRef>
+          <a:effectRef idx="0">
+            <a:schemeClr val="accent1"/>
+          </a:effectRef>
+          <a:fontRef idx="minor">
+            <a:schemeClr val="lt1"/>
+          </a:fontRef>
+        </p:style>
+        <p:txBody>
+          <a:bodyPr rtlCol="0" anchor="ctr"/>
+          <a:lstStyle/>
+          <a:p>
+            <a:pPr algn="ctr"/>
+            <a:endParaRPr lang="en-PH"/>
+          </a:p>
+        </p:txBody>
+      </p:sp>
+      <p:sp>
+        <p:nvSpPr>
+          <p:cNvPr id="39" name="Oval 38">
+            <a:extLst>
+              <a:ext uri="{FF2B5EF4-FFF2-40B4-BE49-F238E27FC236}">
+                <a16:creationId xmlns:a16="http://schemas.microsoft.com/office/drawing/2014/main" id="{5F2F056E-6BCE-7C83-88BF-8FAC35381A96}"/>
+              </a:ext>
+            </a:extLst>
+          </p:cNvPr>
+          <p:cNvSpPr/>
+          <p:nvPr/>
+        </p:nvSpPr>
+        <p:spPr>
+          <a:xfrm>
+            <a:off x="6740453" y="4163877"/>
+            <a:ext cx="141004" cy="141004"/>
+          </a:xfrm>
+          <a:prstGeom prst="ellipse">
+            <a:avLst/>
+          </a:prstGeom>
+        </p:spPr>
+        <p:style>
+          <a:lnRef idx="2">
+            <a:schemeClr val="accent1">
+              <a:shade val="15000"/>
+            </a:schemeClr>
+          </a:lnRef>
+          <a:fillRef idx="1">
+            <a:schemeClr val="accent1"/>
+          </a:fillRef>
+          <a:effectRef idx="0">
+            <a:schemeClr val="accent1"/>
+          </a:effectRef>
+          <a:fontRef idx="minor">
+            <a:schemeClr val="lt1"/>
+          </a:fontRef>
+        </p:style>
+        <p:txBody>
+          <a:bodyPr rtlCol="0" anchor="ctr"/>
+          <a:lstStyle/>
+          <a:p>
+            <a:pPr algn="ctr"/>
+            <a:endParaRPr lang="en-PH"/>
+          </a:p>
+        </p:txBody>
+      </p:sp>
+      <p:sp>
+        <p:nvSpPr>
+          <p:cNvPr id="40" name="Oval 39">
+            <a:extLst>
+              <a:ext uri="{FF2B5EF4-FFF2-40B4-BE49-F238E27FC236}">
+                <a16:creationId xmlns:a16="http://schemas.microsoft.com/office/drawing/2014/main" id="{C6E2EDE4-04E9-D535-EB57-B671EF097EAC}"/>
+              </a:ext>
+            </a:extLst>
+          </p:cNvPr>
+          <p:cNvSpPr/>
+          <p:nvPr/>
+        </p:nvSpPr>
+        <p:spPr>
+          <a:xfrm>
+            <a:off x="5658413" y="5351677"/>
+            <a:ext cx="141004" cy="141004"/>
+          </a:xfrm>
+          <a:prstGeom prst="ellipse">
+            <a:avLst/>
+          </a:prstGeom>
+        </p:spPr>
+        <p:style>
+          <a:lnRef idx="2">
+            <a:schemeClr val="accent1">
+              <a:shade val="15000"/>
+            </a:schemeClr>
+          </a:lnRef>
+          <a:fillRef idx="1">
+            <a:schemeClr val="accent1"/>
+          </a:fillRef>
+          <a:effectRef idx="0">
+            <a:schemeClr val="accent1"/>
+          </a:effectRef>
+          <a:fontRef idx="minor">
+            <a:schemeClr val="lt1"/>
+          </a:fontRef>
+        </p:style>
+        <p:txBody>
+          <a:bodyPr rtlCol="0" anchor="ctr"/>
+          <a:lstStyle/>
+          <a:p>
+            <a:pPr algn="ctr"/>
+            <a:endParaRPr lang="en-PH"/>
+          </a:p>
+        </p:txBody>
+      </p:sp>
+      <p:sp>
+        <p:nvSpPr>
+          <p:cNvPr id="41" name="Oval 40">
+            <a:extLst>
+              <a:ext uri="{FF2B5EF4-FFF2-40B4-BE49-F238E27FC236}">
+                <a16:creationId xmlns:a16="http://schemas.microsoft.com/office/drawing/2014/main" id="{96789DF2-9CF2-DA27-28A2-21CB43988979}"/>
+              </a:ext>
+            </a:extLst>
+          </p:cNvPr>
+          <p:cNvSpPr/>
+          <p:nvPr/>
+        </p:nvSpPr>
+        <p:spPr>
+          <a:xfrm>
+            <a:off x="7178963" y="6133085"/>
+            <a:ext cx="141004" cy="141004"/>
+          </a:xfrm>
+          <a:prstGeom prst="ellipse">
+            <a:avLst/>
+          </a:prstGeom>
+        </p:spPr>
+        <p:style>
+          <a:lnRef idx="2">
+            <a:schemeClr val="accent1">
+              <a:shade val="15000"/>
+            </a:schemeClr>
+          </a:lnRef>
+          <a:fillRef idx="1">
+            <a:schemeClr val="accent1"/>
+          </a:fillRef>
+          <a:effectRef idx="0">
+            <a:schemeClr val="accent1"/>
+          </a:effectRef>
+          <a:fontRef idx="minor">
+            <a:schemeClr val="lt1"/>
+          </a:fontRef>
+        </p:style>
+        <p:txBody>
+          <a:bodyPr rtlCol="0" anchor="ctr"/>
+          <a:lstStyle/>
+          <a:p>
+            <a:pPr algn="ctr"/>
+            <a:endParaRPr lang="en-PH"/>
+          </a:p>
+        </p:txBody>
+      </p:sp>
+      <p:sp>
+        <p:nvSpPr>
+          <p:cNvPr id="42" name="Oval 41">
+            <a:extLst>
+              <a:ext uri="{FF2B5EF4-FFF2-40B4-BE49-F238E27FC236}">
+                <a16:creationId xmlns:a16="http://schemas.microsoft.com/office/drawing/2014/main" id="{42DB6914-E998-743F-5D8A-17D59D7D08CB}"/>
+              </a:ext>
+            </a:extLst>
+          </p:cNvPr>
+          <p:cNvSpPr/>
+          <p:nvPr/>
+        </p:nvSpPr>
+        <p:spPr>
+          <a:xfrm>
+            <a:off x="5461056" y="4898064"/>
+            <a:ext cx="141004" cy="141004"/>
+          </a:xfrm>
+          <a:prstGeom prst="ellipse">
+            <a:avLst/>
+          </a:prstGeom>
+        </p:spPr>
+        <p:style>
+          <a:lnRef idx="2">
+            <a:schemeClr val="accent1">
+              <a:shade val="15000"/>
+            </a:schemeClr>
+          </a:lnRef>
+          <a:fillRef idx="1">
+            <a:schemeClr val="accent1"/>
+          </a:fillRef>
+          <a:effectRef idx="0">
+            <a:schemeClr val="accent1"/>
+          </a:effectRef>
+          <a:fontRef idx="minor">
+            <a:schemeClr val="lt1"/>
+          </a:fontRef>
+        </p:style>
+        <p:txBody>
+          <a:bodyPr rtlCol="0" anchor="ctr"/>
+          <a:lstStyle/>
+          <a:p>
+            <a:pPr algn="ctr"/>
+            <a:endParaRPr lang="en-PH"/>
+          </a:p>
+        </p:txBody>
+      </p:sp>
+      <p:sp>
+        <p:nvSpPr>
+          <p:cNvPr id="43" name="TextBox 42">
+            <a:extLst>
+              <a:ext uri="{FF2B5EF4-FFF2-40B4-BE49-F238E27FC236}">
+                <a16:creationId xmlns:a16="http://schemas.microsoft.com/office/drawing/2014/main" id="{05ACC8E5-16C4-8C73-33B3-7841DF17B273}"/>
+              </a:ext>
+            </a:extLst>
+          </p:cNvPr>
+          <p:cNvSpPr txBox="1"/>
+          <p:nvPr/>
+        </p:nvSpPr>
+        <p:spPr>
+          <a:xfrm>
+            <a:off x="4834223" y="3280828"/>
+            <a:ext cx="2820088" cy="523220"/>
+          </a:xfrm>
+          <a:prstGeom prst="rect">
+            <a:avLst/>
+          </a:prstGeom>
+          <a:noFill/>
+        </p:spPr>
+        <p:txBody>
+          <a:bodyPr wrap="square" rtlCol="0">
+            <a:spAutoFit/>
+          </a:bodyPr>
+          <a:lstStyle/>
+          <a:p>
+            <a:pPr algn="ctr"/>
+            <a:r>
+              <a:rPr lang="en-PH" sz="2800" dirty="0"/>
+              <a:t>Random</a:t>
+            </a:r>
+          </a:p>
+        </p:txBody>
+      </p:sp>
+    </p:spTree>
+    <p:extLst>
+      <p:ext uri="{BB962C8B-B14F-4D97-AF65-F5344CB8AC3E}">
+        <p14:creationId xmlns:p14="http://schemas.microsoft.com/office/powerpoint/2010/main" val="2626063900"/>
       </p:ext>
     </p:extLst>
   </p:cSld>

</xml_diff>

<commit_message>
Added new general flowchart
</commit_message>
<xml_diff>
--- a/documents/Figures editing.pptx
+++ b/documents/Figures editing.pptx
@@ -11,7 +11,8 @@
     <p:sldId id="258" r:id="rId5"/>
     <p:sldId id="259" r:id="rId6"/>
     <p:sldId id="260" r:id="rId7"/>
-    <p:sldId id="262" r:id="rId8"/>
+    <p:sldId id="263" r:id="rId8"/>
+    <p:sldId id="262" r:id="rId9"/>
   </p:sldIdLst>
   <p:sldSz cx="12192000" cy="6858000"/>
   <p:notesSz cx="6858000" cy="9144000"/>
@@ -267,7 +268,7 @@
           <a:p>
             <a:fld id="{F6E9F5A1-C99C-41F9-B991-61D99245B2FF}" type="datetimeFigureOut">
               <a:rPr lang="en-PH" smtClean="0"/>
-              <a:t>03/20/2025</a:t>
+              <a:t>04/04/2025</a:t>
             </a:fld>
             <a:endParaRPr lang="en-PH"/>
           </a:p>
@@ -467,7 +468,7 @@
           <a:p>
             <a:fld id="{F6E9F5A1-C99C-41F9-B991-61D99245B2FF}" type="datetimeFigureOut">
               <a:rPr lang="en-PH" smtClean="0"/>
-              <a:t>03/20/2025</a:t>
+              <a:t>04/04/2025</a:t>
             </a:fld>
             <a:endParaRPr lang="en-PH"/>
           </a:p>
@@ -677,7 +678,7 @@
           <a:p>
             <a:fld id="{F6E9F5A1-C99C-41F9-B991-61D99245B2FF}" type="datetimeFigureOut">
               <a:rPr lang="en-PH" smtClean="0"/>
-              <a:t>03/20/2025</a:t>
+              <a:t>04/04/2025</a:t>
             </a:fld>
             <a:endParaRPr lang="en-PH"/>
           </a:p>
@@ -877,7 +878,7 @@
           <a:p>
             <a:fld id="{F6E9F5A1-C99C-41F9-B991-61D99245B2FF}" type="datetimeFigureOut">
               <a:rPr lang="en-PH" smtClean="0"/>
-              <a:t>03/20/2025</a:t>
+              <a:t>04/04/2025</a:t>
             </a:fld>
             <a:endParaRPr lang="en-PH"/>
           </a:p>
@@ -1153,7 +1154,7 @@
           <a:p>
             <a:fld id="{F6E9F5A1-C99C-41F9-B991-61D99245B2FF}" type="datetimeFigureOut">
               <a:rPr lang="en-PH" smtClean="0"/>
-              <a:t>03/20/2025</a:t>
+              <a:t>04/04/2025</a:t>
             </a:fld>
             <a:endParaRPr lang="en-PH"/>
           </a:p>
@@ -1421,7 +1422,7 @@
           <a:p>
             <a:fld id="{F6E9F5A1-C99C-41F9-B991-61D99245B2FF}" type="datetimeFigureOut">
               <a:rPr lang="en-PH" smtClean="0"/>
-              <a:t>03/20/2025</a:t>
+              <a:t>04/04/2025</a:t>
             </a:fld>
             <a:endParaRPr lang="en-PH"/>
           </a:p>
@@ -1836,7 +1837,7 @@
           <a:p>
             <a:fld id="{F6E9F5A1-C99C-41F9-B991-61D99245B2FF}" type="datetimeFigureOut">
               <a:rPr lang="en-PH" smtClean="0"/>
-              <a:t>03/20/2025</a:t>
+              <a:t>04/04/2025</a:t>
             </a:fld>
             <a:endParaRPr lang="en-PH"/>
           </a:p>
@@ -1978,7 +1979,7 @@
           <a:p>
             <a:fld id="{F6E9F5A1-C99C-41F9-B991-61D99245B2FF}" type="datetimeFigureOut">
               <a:rPr lang="en-PH" smtClean="0"/>
-              <a:t>03/20/2025</a:t>
+              <a:t>04/04/2025</a:t>
             </a:fld>
             <a:endParaRPr lang="en-PH"/>
           </a:p>
@@ -2091,7 +2092,7 @@
           <a:p>
             <a:fld id="{F6E9F5A1-C99C-41F9-B991-61D99245B2FF}" type="datetimeFigureOut">
               <a:rPr lang="en-PH" smtClean="0"/>
-              <a:t>03/20/2025</a:t>
+              <a:t>04/04/2025</a:t>
             </a:fld>
             <a:endParaRPr lang="en-PH"/>
           </a:p>
@@ -2404,7 +2405,7 @@
           <a:p>
             <a:fld id="{F6E9F5A1-C99C-41F9-B991-61D99245B2FF}" type="datetimeFigureOut">
               <a:rPr lang="en-PH" smtClean="0"/>
-              <a:t>03/20/2025</a:t>
+              <a:t>04/04/2025</a:t>
             </a:fld>
             <a:endParaRPr lang="en-PH"/>
           </a:p>
@@ -2693,7 +2694,7 @@
           <a:p>
             <a:fld id="{F6E9F5A1-C99C-41F9-B991-61D99245B2FF}" type="datetimeFigureOut">
               <a:rPr lang="en-PH" smtClean="0"/>
-              <a:t>03/20/2025</a:t>
+              <a:t>04/04/2025</a:t>
             </a:fld>
             <a:endParaRPr lang="en-PH"/>
           </a:p>
@@ -2936,7 +2937,7 @@
           <a:p>
             <a:fld id="{F6E9F5A1-C99C-41F9-B991-61D99245B2FF}" type="datetimeFigureOut">
               <a:rPr lang="en-PH" smtClean="0"/>
-              <a:t>03/20/2025</a:t>
+              <a:t>04/04/2025</a:t>
             </a:fld>
             <a:endParaRPr lang="en-PH"/>
           </a:p>
@@ -11053,8 +11054,8 @@
           </a:p>
         </p:txBody>
       </p:sp>
-      <mc:AlternateContent xmlns:mc="http://schemas.openxmlformats.org/markup-compatibility/2006">
-        <mc:Choice xmlns:a14="http://schemas.microsoft.com/office/drawing/2010/main" Requires="a14">
+      <mc:AlternateContent xmlns:mc="http://schemas.openxmlformats.org/markup-compatibility/2006" xmlns:a14="http://schemas.microsoft.com/office/drawing/2010/main">
+        <mc:Choice Requires="a14">
           <p:sp>
             <p:nvSpPr>
               <p:cNvPr id="2" name="Flowchart: Process 1">
@@ -11143,7 +11144,7 @@
             </p:txBody>
           </p:sp>
         </mc:Choice>
-        <mc:Fallback>
+        <mc:Fallback xmlns="">
           <p:sp>
             <p:nvSpPr>
               <p:cNvPr id="2" name="Flowchart: Process 1">
@@ -11232,8 +11233,8 @@
           </a:fontRef>
         </p:style>
       </p:cxnSp>
-      <mc:AlternateContent xmlns:mc="http://schemas.openxmlformats.org/markup-compatibility/2006">
-        <mc:Choice xmlns:a14="http://schemas.microsoft.com/office/drawing/2010/main" Requires="a14">
+      <mc:AlternateContent xmlns:mc="http://schemas.openxmlformats.org/markup-compatibility/2006" xmlns:a14="http://schemas.microsoft.com/office/drawing/2010/main">
+        <mc:Choice Requires="a14">
           <p:sp>
             <p:nvSpPr>
               <p:cNvPr id="4" name="Flowchart: Process 3">
@@ -11325,7 +11326,7 @@
             </p:txBody>
           </p:sp>
         </mc:Choice>
-        <mc:Fallback>
+        <mc:Fallback xmlns="">
           <p:sp>
             <p:nvSpPr>
               <p:cNvPr id="4" name="Flowchart: Process 3">
@@ -11414,8 +11415,8 @@
           </a:fontRef>
         </p:style>
       </p:cxnSp>
-      <mc:AlternateContent xmlns:mc="http://schemas.openxmlformats.org/markup-compatibility/2006">
-        <mc:Choice xmlns:a14="http://schemas.microsoft.com/office/drawing/2010/main" Requires="a14">
+      <mc:AlternateContent xmlns:mc="http://schemas.openxmlformats.org/markup-compatibility/2006" xmlns:a14="http://schemas.microsoft.com/office/drawing/2010/main">
+        <mc:Choice Requires="a14">
           <p:sp>
             <p:nvSpPr>
               <p:cNvPr id="7" name="Flowchart: Process 6">
@@ -11595,7 +11596,7 @@
             </p:txBody>
           </p:sp>
         </mc:Choice>
-        <mc:Fallback>
+        <mc:Fallback xmlns="">
           <p:sp>
             <p:nvSpPr>
               <p:cNvPr id="7" name="Flowchart: Process 6">
@@ -11641,8 +11642,8 @@
           </p:sp>
         </mc:Fallback>
       </mc:AlternateContent>
-      <mc:AlternateContent xmlns:mc="http://schemas.openxmlformats.org/markup-compatibility/2006">
-        <mc:Choice xmlns:a14="http://schemas.microsoft.com/office/drawing/2010/main" Requires="a14">
+      <mc:AlternateContent xmlns:mc="http://schemas.openxmlformats.org/markup-compatibility/2006" xmlns:a14="http://schemas.microsoft.com/office/drawing/2010/main">
+        <mc:Choice Requires="a14">
           <p:sp>
             <p:nvSpPr>
               <p:cNvPr id="9" name="Flowchart: Decision 8">
@@ -11759,7 +11760,7 @@
             </p:txBody>
           </p:sp>
         </mc:Choice>
-        <mc:Fallback>
+        <mc:Fallback xmlns="">
           <p:sp>
             <p:nvSpPr>
               <p:cNvPr id="9" name="Flowchart: Decision 8">
@@ -11805,8 +11806,8 @@
           </p:sp>
         </mc:Fallback>
       </mc:AlternateContent>
-      <mc:AlternateContent xmlns:mc="http://schemas.openxmlformats.org/markup-compatibility/2006">
-        <mc:Choice xmlns:a14="http://schemas.microsoft.com/office/drawing/2010/main" Requires="a14">
+      <mc:AlternateContent xmlns:mc="http://schemas.openxmlformats.org/markup-compatibility/2006" xmlns:a14="http://schemas.microsoft.com/office/drawing/2010/main">
+        <mc:Choice Requires="a14">
           <p:sp>
             <p:nvSpPr>
               <p:cNvPr id="10" name="Flowchart: Decision 9">
@@ -11905,7 +11906,7 @@
             </p:txBody>
           </p:sp>
         </mc:Choice>
-        <mc:Fallback>
+        <mc:Fallback xmlns="">
           <p:sp>
             <p:nvSpPr>
               <p:cNvPr id="10" name="Flowchart: Decision 9">
@@ -11994,8 +11995,8 @@
           </a:fontRef>
         </p:style>
       </p:cxnSp>
-      <mc:AlternateContent xmlns:mc="http://schemas.openxmlformats.org/markup-compatibility/2006">
-        <mc:Choice xmlns:a14="http://schemas.microsoft.com/office/drawing/2010/main" Requires="a14">
+      <mc:AlternateContent xmlns:mc="http://schemas.openxmlformats.org/markup-compatibility/2006" xmlns:a14="http://schemas.microsoft.com/office/drawing/2010/main">
+        <mc:Choice Requires="a14">
           <p:sp>
             <p:nvSpPr>
               <p:cNvPr id="12" name="Flowchart: Process 11">
@@ -12198,7 +12199,7 @@
             </p:txBody>
           </p:sp>
         </mc:Choice>
-        <mc:Fallback>
+        <mc:Fallback xmlns="">
           <p:sp>
             <p:nvSpPr>
               <p:cNvPr id="12" name="Flowchart: Process 11">
@@ -12244,8 +12245,8 @@
           </p:sp>
         </mc:Fallback>
       </mc:AlternateContent>
-      <mc:AlternateContent xmlns:mc="http://schemas.openxmlformats.org/markup-compatibility/2006">
-        <mc:Choice xmlns:a14="http://schemas.microsoft.com/office/drawing/2010/main" Requires="a14">
+      <mc:AlternateContent xmlns:mc="http://schemas.openxmlformats.org/markup-compatibility/2006" xmlns:a14="http://schemas.microsoft.com/office/drawing/2010/main">
+        <mc:Choice Requires="a14">
           <p:sp>
             <p:nvSpPr>
               <p:cNvPr id="13" name="Flowchart: Process 12">
@@ -12448,7 +12449,7 @@
             </p:txBody>
           </p:sp>
         </mc:Choice>
-        <mc:Fallback>
+        <mc:Fallback xmlns="">
           <p:sp>
             <p:nvSpPr>
               <p:cNvPr id="13" name="Flowchart: Process 12">
@@ -12894,8 +12895,8 @@
           </a:p>
         </p:txBody>
       </p:sp>
-      <mc:AlternateContent xmlns:mc="http://schemas.openxmlformats.org/markup-compatibility/2006">
-        <mc:Choice xmlns:a14="http://schemas.microsoft.com/office/drawing/2010/main" Requires="a14">
+      <mc:AlternateContent xmlns:mc="http://schemas.openxmlformats.org/markup-compatibility/2006" xmlns:a14="http://schemas.microsoft.com/office/drawing/2010/main">
+        <mc:Choice Requires="a14">
           <p:sp>
             <p:nvSpPr>
               <p:cNvPr id="34" name="Flowchart: Decision 33">
@@ -12968,7 +12969,7 @@
             </p:txBody>
           </p:sp>
         </mc:Choice>
-        <mc:Fallback>
+        <mc:Fallback xmlns="">
           <p:sp>
             <p:nvSpPr>
               <p:cNvPr id="34" name="Flowchart: Decision 33">
@@ -13592,6 +13593,2524 @@
         <p:cNvPr id="1" name="">
           <a:extLst>
             <a:ext uri="{FF2B5EF4-FFF2-40B4-BE49-F238E27FC236}">
+              <a16:creationId xmlns:a16="http://schemas.microsoft.com/office/drawing/2014/main" id="{B53EF081-6018-AEFD-51B9-0FFE33542042}"/>
+            </a:ext>
+          </a:extLst>
+        </p:cNvPr>
+        <p:cNvGrpSpPr/>
+        <p:nvPr/>
+      </p:nvGrpSpPr>
+      <p:grpSpPr>
+        <a:xfrm>
+          <a:off x="0" y="0"/>
+          <a:ext cx="0" cy="0"/>
+          <a:chOff x="0" y="0"/>
+          <a:chExt cx="0" cy="0"/>
+        </a:xfrm>
+      </p:grpSpPr>
+      <p:sp>
+        <p:nvSpPr>
+          <p:cNvPr id="37" name="Rectangle 36">
+            <a:extLst>
+              <a:ext uri="{FF2B5EF4-FFF2-40B4-BE49-F238E27FC236}">
+                <a16:creationId xmlns:a16="http://schemas.microsoft.com/office/drawing/2014/main" id="{6764DFD1-9A17-0D72-CE16-83DBC8F2FB78}"/>
+              </a:ext>
+            </a:extLst>
+          </p:cNvPr>
+          <p:cNvSpPr/>
+          <p:nvPr/>
+        </p:nvSpPr>
+        <p:spPr>
+          <a:xfrm>
+            <a:off x="607448" y="-793258"/>
+            <a:ext cx="11888655" cy="8444516"/>
+          </a:xfrm>
+          <a:prstGeom prst="rect">
+            <a:avLst/>
+          </a:prstGeom>
+          <a:solidFill>
+            <a:srgbClr val="0173B2">
+              <a:alpha val="10196"/>
+            </a:srgbClr>
+          </a:solidFill>
+          <a:ln w="57150"/>
+        </p:spPr>
+        <p:style>
+          <a:lnRef idx="2">
+            <a:schemeClr val="accent1">
+              <a:shade val="15000"/>
+            </a:schemeClr>
+          </a:lnRef>
+          <a:fillRef idx="1">
+            <a:schemeClr val="accent1"/>
+          </a:fillRef>
+          <a:effectRef idx="0">
+            <a:schemeClr val="accent1"/>
+          </a:effectRef>
+          <a:fontRef idx="minor">
+            <a:schemeClr val="lt1"/>
+          </a:fontRef>
+        </p:style>
+        <p:txBody>
+          <a:bodyPr rtlCol="0" anchor="ctr"/>
+          <a:lstStyle/>
+          <a:p>
+            <a:pPr algn="ctr"/>
+            <a:endParaRPr lang="en-PH"/>
+          </a:p>
+        </p:txBody>
+      </p:sp>
+      <mc:AlternateContent xmlns:mc="http://schemas.openxmlformats.org/markup-compatibility/2006">
+        <mc:Choice xmlns:a14="http://schemas.microsoft.com/office/drawing/2010/main" Requires="a14">
+          <p:sp>
+            <p:nvSpPr>
+              <p:cNvPr id="2" name="Flowchart: Process 1">
+                <a:extLst>
+                  <a:ext uri="{FF2B5EF4-FFF2-40B4-BE49-F238E27FC236}">
+                    <a16:creationId xmlns:a16="http://schemas.microsoft.com/office/drawing/2014/main" id="{7169FEF7-492C-826F-2190-1112FFDDCFD7}"/>
+                  </a:ext>
+                </a:extLst>
+              </p:cNvPr>
+              <p:cNvSpPr/>
+              <p:nvPr/>
+            </p:nvSpPr>
+            <p:spPr>
+              <a:xfrm>
+                <a:off x="-4547382" y="48182"/>
+                <a:ext cx="2577415" cy="1930140"/>
+              </a:xfrm>
+              <a:prstGeom prst="flowChartProcess">
+                <a:avLst/>
+              </a:prstGeom>
+              <a:ln w="57150"/>
+            </p:spPr>
+            <p:style>
+              <a:lnRef idx="2">
+                <a:schemeClr val="dk1"/>
+              </a:lnRef>
+              <a:fillRef idx="1">
+                <a:schemeClr val="lt1"/>
+              </a:fillRef>
+              <a:effectRef idx="0">
+                <a:schemeClr val="dk1"/>
+              </a:effectRef>
+              <a:fontRef idx="minor">
+                <a:schemeClr val="dk1"/>
+              </a:fontRef>
+            </p:style>
+            <p:txBody>
+              <a:bodyPr rtlCol="0" anchor="ctr"/>
+              <a:lstStyle/>
+              <a:p>
+                <a:pPr algn="ctr"/>
+                <a:r>
+                  <a:rPr lang="en-PH" sz="2800" dirty="0"/>
+                  <a:t>Initialize classroom with </a:t>
+                </a:r>
+                <a14:m>
+                  <m:oMath xmlns:m="http://schemas.openxmlformats.org/officeDocument/2006/math">
+                    <m:sSub>
+                      <m:sSubPr>
+                        <m:ctrlPr>
+                          <a:rPr lang="en-PH" sz="2800" b="0" i="1" smtClean="0">
+                            <a:latin typeface="Cambria Math" panose="02040503050406030204" pitchFamily="18" charset="0"/>
+                          </a:rPr>
+                        </m:ctrlPr>
+                      </m:sSubPr>
+                      <m:e>
+                        <m:r>
+                          <a:rPr lang="en-PH" sz="2800" b="0" i="1" smtClean="0">
+                            <a:latin typeface="Cambria Math" panose="02040503050406030204" pitchFamily="18" charset="0"/>
+                          </a:rPr>
+                          <m:t>𝑛</m:t>
+                        </m:r>
+                      </m:e>
+                      <m:sub>
+                        <m:r>
+                          <a:rPr lang="en-PH" sz="2800" b="0" i="1" smtClean="0">
+                            <a:latin typeface="Cambria Math" panose="02040503050406030204" pitchFamily="18" charset="0"/>
+                          </a:rPr>
+                          <m:t>0</m:t>
+                        </m:r>
+                      </m:sub>
+                    </m:sSub>
+                    <m:r>
+                      <a:rPr lang="en-PH" sz="2800" b="0" i="1" smtClean="0">
+                        <a:latin typeface="Cambria Math" panose="02040503050406030204" pitchFamily="18" charset="0"/>
+                      </a:rPr>
+                      <m:t>=0</m:t>
+                    </m:r>
+                  </m:oMath>
+                </a14:m>
+                <a:r>
+                  <a:rPr lang="en-PH" sz="2800" dirty="0"/>
+                  <a:t> learned students</a:t>
+                </a:r>
+              </a:p>
+            </p:txBody>
+          </p:sp>
+        </mc:Choice>
+        <mc:Fallback>
+          <p:sp>
+            <p:nvSpPr>
+              <p:cNvPr id="2" name="Flowchart: Process 1">
+                <a:extLst>
+                  <a:ext uri="{FF2B5EF4-FFF2-40B4-BE49-F238E27FC236}">
+                    <a16:creationId xmlns:a16="http://schemas.microsoft.com/office/drawing/2014/main" id="{7169FEF7-492C-826F-2190-1112FFDDCFD7}"/>
+                  </a:ext>
+                </a:extLst>
+              </p:cNvPr>
+              <p:cNvSpPr>
+                <a:spLocks noRot="1" noChangeAspect="1" noMove="1" noResize="1" noEditPoints="1" noAdjustHandles="1" noChangeArrowheads="1" noChangeShapeType="1" noTextEdit="1"/>
+              </p:cNvSpPr>
+              <p:nvPr/>
+            </p:nvSpPr>
+            <p:spPr>
+              <a:xfrm>
+                <a:off x="-4547382" y="48182"/>
+                <a:ext cx="2577415" cy="1930140"/>
+              </a:xfrm>
+              <a:prstGeom prst="flowChartProcess">
+                <a:avLst/>
+              </a:prstGeom>
+              <a:blipFill>
+                <a:blip r:embed="rId2"/>
+                <a:stretch>
+                  <a:fillRect l="-3009" r="-5324" b="-3681"/>
+                </a:stretch>
+              </a:blipFill>
+              <a:ln w="57150"/>
+            </p:spPr>
+            <p:txBody>
+              <a:bodyPr/>
+              <a:lstStyle/>
+              <a:p>
+                <a:r>
+                  <a:rPr lang="en-PH">
+                    <a:noFill/>
+                  </a:rPr>
+                  <a:t> </a:t>
+                </a:r>
+              </a:p>
+            </p:txBody>
+          </p:sp>
+        </mc:Fallback>
+      </mc:AlternateContent>
+      <p:cxnSp>
+        <p:nvCxnSpPr>
+          <p:cNvPr id="3" name="Straight Arrow Connector 2">
+            <a:extLst>
+              <a:ext uri="{FF2B5EF4-FFF2-40B4-BE49-F238E27FC236}">
+                <a16:creationId xmlns:a16="http://schemas.microsoft.com/office/drawing/2014/main" id="{A8E88806-40EC-4812-ECD4-4F4B33232091}"/>
+              </a:ext>
+            </a:extLst>
+          </p:cNvPr>
+          <p:cNvCxnSpPr>
+            <a:cxnSpLocks/>
+            <a:stCxn id="2" idx="3"/>
+            <a:endCxn id="4" idx="1"/>
+          </p:cNvCxnSpPr>
+          <p:nvPr/>
+        </p:nvCxnSpPr>
+        <p:spPr>
+          <a:xfrm>
+            <a:off x="-1969967" y="1013252"/>
+            <a:ext cx="4809915" cy="1"/>
+          </a:xfrm>
+          <a:prstGeom prst="straightConnector1">
+            <a:avLst/>
+          </a:prstGeom>
+          <a:ln w="57150">
+            <a:tailEnd type="triangle"/>
+          </a:ln>
+        </p:spPr>
+        <p:style>
+          <a:lnRef idx="2">
+            <a:schemeClr val="dk1"/>
+          </a:lnRef>
+          <a:fillRef idx="0">
+            <a:schemeClr val="dk1"/>
+          </a:fillRef>
+          <a:effectRef idx="1">
+            <a:schemeClr val="dk1"/>
+          </a:effectRef>
+          <a:fontRef idx="minor">
+            <a:schemeClr val="tx1"/>
+          </a:fontRef>
+        </p:style>
+      </p:cxnSp>
+      <mc:AlternateContent xmlns:mc="http://schemas.openxmlformats.org/markup-compatibility/2006">
+        <mc:Choice xmlns:a14="http://schemas.microsoft.com/office/drawing/2010/main" Requires="a14">
+          <p:sp>
+            <p:nvSpPr>
+              <p:cNvPr id="4" name="Flowchart: Process 3">
+                <a:extLst>
+                  <a:ext uri="{FF2B5EF4-FFF2-40B4-BE49-F238E27FC236}">
+                    <a16:creationId xmlns:a16="http://schemas.microsoft.com/office/drawing/2014/main" id="{F32E1849-9067-FA10-A9A4-5878C9B78905}"/>
+                  </a:ext>
+                </a:extLst>
+              </p:cNvPr>
+              <p:cNvSpPr/>
+              <p:nvPr/>
+            </p:nvSpPr>
+            <p:spPr>
+              <a:xfrm>
+                <a:off x="2839948" y="381657"/>
+                <a:ext cx="2460400" cy="1263192"/>
+              </a:xfrm>
+              <a:prstGeom prst="flowChartProcess">
+                <a:avLst/>
+              </a:prstGeom>
+              <a:ln w="57150"/>
+            </p:spPr>
+            <p:style>
+              <a:lnRef idx="2">
+                <a:schemeClr val="dk1"/>
+              </a:lnRef>
+              <a:fillRef idx="1">
+                <a:schemeClr val="lt1"/>
+              </a:fillRef>
+              <a:effectRef idx="0">
+                <a:schemeClr val="dk1"/>
+              </a:effectRef>
+              <a:fontRef idx="minor">
+                <a:schemeClr val="dk1"/>
+              </a:fontRef>
+            </p:style>
+            <p:txBody>
+              <a:bodyPr rtlCol="0" anchor="ctr"/>
+              <a:lstStyle/>
+              <a:p>
+                <a:pPr algn="ctr"/>
+                <a:r>
+                  <a:rPr lang="en-PH" sz="2800" dirty="0"/>
+                  <a:t>Choose a student </a:t>
+                </a:r>
+                <a14:m>
+                  <m:oMath xmlns:m="http://schemas.openxmlformats.org/officeDocument/2006/math">
+                    <m:sSub>
+                      <m:sSubPr>
+                        <m:ctrlPr>
+                          <a:rPr lang="en-PH" sz="2800" b="0" i="1" smtClean="0">
+                            <a:latin typeface="Cambria Math" panose="02040503050406030204" pitchFamily="18" charset="0"/>
+                          </a:rPr>
+                        </m:ctrlPr>
+                      </m:sSubPr>
+                      <m:e>
+                        <m:r>
+                          <a:rPr lang="en-PH" sz="2800" b="0" i="1" smtClean="0">
+                            <a:latin typeface="Cambria Math" panose="02040503050406030204" pitchFamily="18" charset="0"/>
+                          </a:rPr>
+                          <m:t>𝑐</m:t>
+                        </m:r>
+                      </m:e>
+                      <m:sub>
+                        <m:r>
+                          <a:rPr lang="en-PH" sz="2800" b="0" i="1" smtClean="0">
+                            <a:latin typeface="Cambria Math" panose="02040503050406030204" pitchFamily="18" charset="0"/>
+                          </a:rPr>
+                          <m:t>𝑖</m:t>
+                        </m:r>
+                        <m:r>
+                          <a:rPr lang="en-PH" sz="2800" b="0" i="1" smtClean="0">
+                            <a:latin typeface="Cambria Math" panose="02040503050406030204" pitchFamily="18" charset="0"/>
+                          </a:rPr>
+                          <m:t>,</m:t>
+                        </m:r>
+                        <m:r>
+                          <a:rPr lang="en-PH" sz="2800" b="0" i="1" smtClean="0">
+                            <a:latin typeface="Cambria Math" panose="02040503050406030204" pitchFamily="18" charset="0"/>
+                          </a:rPr>
+                          <m:t>𝑗</m:t>
+                        </m:r>
+                      </m:sub>
+                    </m:sSub>
+                  </m:oMath>
+                </a14:m>
+                <a:endParaRPr lang="en-PH" sz="2800" dirty="0"/>
+              </a:p>
+            </p:txBody>
+          </p:sp>
+        </mc:Choice>
+        <mc:Fallback>
+          <p:sp>
+            <p:nvSpPr>
+              <p:cNvPr id="4" name="Flowchart: Process 3">
+                <a:extLst>
+                  <a:ext uri="{FF2B5EF4-FFF2-40B4-BE49-F238E27FC236}">
+                    <a16:creationId xmlns:a16="http://schemas.microsoft.com/office/drawing/2014/main" id="{F32E1849-9067-FA10-A9A4-5878C9B78905}"/>
+                  </a:ext>
+                </a:extLst>
+              </p:cNvPr>
+              <p:cNvSpPr>
+                <a:spLocks noRot="1" noChangeAspect="1" noMove="1" noResize="1" noEditPoints="1" noAdjustHandles="1" noChangeArrowheads="1" noChangeShapeType="1" noTextEdit="1"/>
+              </p:cNvSpPr>
+              <p:nvPr/>
+            </p:nvSpPr>
+            <p:spPr>
+              <a:xfrm>
+                <a:off x="2839948" y="381657"/>
+                <a:ext cx="2460400" cy="1263192"/>
+              </a:xfrm>
+              <a:prstGeom prst="flowChartProcess">
+                <a:avLst/>
+              </a:prstGeom>
+              <a:blipFill>
+                <a:blip r:embed="rId3"/>
+                <a:stretch>
+                  <a:fillRect/>
+                </a:stretch>
+              </a:blipFill>
+              <a:ln w="57150"/>
+            </p:spPr>
+            <p:txBody>
+              <a:bodyPr/>
+              <a:lstStyle/>
+              <a:p>
+                <a:r>
+                  <a:rPr lang="en-PH">
+                    <a:noFill/>
+                  </a:rPr>
+                  <a:t> </a:t>
+                </a:r>
+              </a:p>
+            </p:txBody>
+          </p:sp>
+        </mc:Fallback>
+      </mc:AlternateContent>
+      <p:cxnSp>
+        <p:nvCxnSpPr>
+          <p:cNvPr id="6" name="Straight Arrow Connector 5">
+            <a:extLst>
+              <a:ext uri="{FF2B5EF4-FFF2-40B4-BE49-F238E27FC236}">
+                <a16:creationId xmlns:a16="http://schemas.microsoft.com/office/drawing/2014/main" id="{E81D886A-2418-C11C-C792-B023F264C683}"/>
+              </a:ext>
+            </a:extLst>
+          </p:cNvPr>
+          <p:cNvCxnSpPr>
+            <a:cxnSpLocks/>
+            <a:stCxn id="4" idx="3"/>
+            <a:endCxn id="10" idx="1"/>
+          </p:cNvCxnSpPr>
+          <p:nvPr/>
+        </p:nvCxnSpPr>
+        <p:spPr>
+          <a:xfrm>
+            <a:off x="5300348" y="1013253"/>
+            <a:ext cx="565719" cy="0"/>
+          </a:xfrm>
+          <a:prstGeom prst="straightConnector1">
+            <a:avLst/>
+          </a:prstGeom>
+          <a:ln w="57150">
+            <a:tailEnd type="triangle"/>
+          </a:ln>
+        </p:spPr>
+        <p:style>
+          <a:lnRef idx="2">
+            <a:schemeClr val="dk1"/>
+          </a:lnRef>
+          <a:fillRef idx="0">
+            <a:schemeClr val="dk1"/>
+          </a:fillRef>
+          <a:effectRef idx="1">
+            <a:schemeClr val="dk1"/>
+          </a:effectRef>
+          <a:fontRef idx="minor">
+            <a:schemeClr val="tx1"/>
+          </a:fontRef>
+        </p:style>
+      </p:cxnSp>
+      <mc:AlternateContent xmlns:mc="http://schemas.openxmlformats.org/markup-compatibility/2006">
+        <mc:Choice xmlns:a14="http://schemas.microsoft.com/office/drawing/2010/main" Requires="a14">
+          <p:sp>
+            <p:nvSpPr>
+              <p:cNvPr id="7" name="Flowchart: Process 6">
+                <a:extLst>
+                  <a:ext uri="{FF2B5EF4-FFF2-40B4-BE49-F238E27FC236}">
+                    <a16:creationId xmlns:a16="http://schemas.microsoft.com/office/drawing/2014/main" id="{5F9C0427-75FF-E794-132E-A78D54AB1001}"/>
+                  </a:ext>
+                </a:extLst>
+              </p:cNvPr>
+              <p:cNvSpPr/>
+              <p:nvPr/>
+            </p:nvSpPr>
+            <p:spPr>
+              <a:xfrm>
+                <a:off x="8755408" y="156166"/>
+                <a:ext cx="3362455" cy="1714176"/>
+              </a:xfrm>
+              <a:prstGeom prst="flowChartProcess">
+                <a:avLst/>
+              </a:prstGeom>
+              <a:ln w="57150"/>
+            </p:spPr>
+            <p:style>
+              <a:lnRef idx="2">
+                <a:schemeClr val="dk1"/>
+              </a:lnRef>
+              <a:fillRef idx="1">
+                <a:schemeClr val="lt1"/>
+              </a:fillRef>
+              <a:effectRef idx="0">
+                <a:schemeClr val="dk1"/>
+              </a:effectRef>
+              <a:fontRef idx="minor">
+                <a:schemeClr val="dk1"/>
+              </a:fontRef>
+            </p:style>
+            <p:txBody>
+              <a:bodyPr rtlCol="0" anchor="ctr"/>
+              <a:lstStyle/>
+              <a:p>
+                <a:pPr algn="ctr"/>
+                <a:r>
+                  <a:rPr lang="en-PH" sz="3200" dirty="0"/>
+                  <a:t>Obtain probability to learn </a:t>
+                </a:r>
+                <a14:m>
+                  <m:oMath xmlns:m="http://schemas.openxmlformats.org/officeDocument/2006/math">
+                    <m:sSub>
+                      <m:sSubPr>
+                        <m:ctrlPr>
+                          <a:rPr lang="en-PH" sz="3200" b="0" i="1" smtClean="0">
+                            <a:latin typeface="Cambria Math" panose="02040503050406030204" pitchFamily="18" charset="0"/>
+                          </a:rPr>
+                        </m:ctrlPr>
+                      </m:sSubPr>
+                      <m:e>
+                        <m:r>
+                          <a:rPr lang="en-PH" sz="3200" b="0" i="1" smtClean="0">
+                            <a:latin typeface="Cambria Math" panose="02040503050406030204" pitchFamily="18" charset="0"/>
+                          </a:rPr>
+                          <m:t>𝑃</m:t>
+                        </m:r>
+                      </m:e>
+                      <m:sub>
+                        <m:r>
+                          <a:rPr lang="en-PH" sz="3200" b="0" i="1" smtClean="0">
+                            <a:latin typeface="Cambria Math" panose="02040503050406030204" pitchFamily="18" charset="0"/>
+                          </a:rPr>
+                          <m:t>𝑖</m:t>
+                        </m:r>
+                        <m:r>
+                          <a:rPr lang="en-PH" sz="3200" b="0" i="1" smtClean="0">
+                            <a:latin typeface="Cambria Math" panose="02040503050406030204" pitchFamily="18" charset="0"/>
+                          </a:rPr>
+                          <m:t>,</m:t>
+                        </m:r>
+                        <m:r>
+                          <a:rPr lang="en-PH" sz="3200" b="0" i="1" smtClean="0">
+                            <a:latin typeface="Cambria Math" panose="02040503050406030204" pitchFamily="18" charset="0"/>
+                          </a:rPr>
+                          <m:t>𝑗</m:t>
+                        </m:r>
+                      </m:sub>
+                    </m:sSub>
+                  </m:oMath>
+                </a14:m>
+                <a:endParaRPr lang="en-PH" sz="3200" dirty="0"/>
+              </a:p>
+            </p:txBody>
+          </p:sp>
+        </mc:Choice>
+        <mc:Fallback>
+          <p:sp>
+            <p:nvSpPr>
+              <p:cNvPr id="7" name="Flowchart: Process 6">
+                <a:extLst>
+                  <a:ext uri="{FF2B5EF4-FFF2-40B4-BE49-F238E27FC236}">
+                    <a16:creationId xmlns:a16="http://schemas.microsoft.com/office/drawing/2014/main" id="{5F9C0427-75FF-E794-132E-A78D54AB1001}"/>
+                  </a:ext>
+                </a:extLst>
+              </p:cNvPr>
+              <p:cNvSpPr>
+                <a:spLocks noRot="1" noChangeAspect="1" noMove="1" noResize="1" noEditPoints="1" noAdjustHandles="1" noChangeArrowheads="1" noChangeShapeType="1" noTextEdit="1"/>
+              </p:cNvSpPr>
+              <p:nvPr/>
+            </p:nvSpPr>
+            <p:spPr>
+              <a:xfrm>
+                <a:off x="8755408" y="156166"/>
+                <a:ext cx="3362455" cy="1714176"/>
+              </a:xfrm>
+              <a:prstGeom prst="flowChartProcess">
+                <a:avLst/>
+              </a:prstGeom>
+              <a:blipFill>
+                <a:blip r:embed="rId4"/>
+                <a:stretch>
+                  <a:fillRect l="-3565" r="-5348"/>
+                </a:stretch>
+              </a:blipFill>
+              <a:ln w="57150"/>
+            </p:spPr>
+            <p:txBody>
+              <a:bodyPr/>
+              <a:lstStyle/>
+              <a:p>
+                <a:r>
+                  <a:rPr lang="en-PH">
+                    <a:noFill/>
+                  </a:rPr>
+                  <a:t> </a:t>
+                </a:r>
+              </a:p>
+            </p:txBody>
+          </p:sp>
+        </mc:Fallback>
+      </mc:AlternateContent>
+      <mc:AlternateContent xmlns:mc="http://schemas.openxmlformats.org/markup-compatibility/2006">
+        <mc:Choice xmlns:a14="http://schemas.microsoft.com/office/drawing/2010/main" Requires="a14">
+          <p:sp>
+            <p:nvSpPr>
+              <p:cNvPr id="9" name="Flowchart: Decision 8">
+                <a:extLst>
+                  <a:ext uri="{FF2B5EF4-FFF2-40B4-BE49-F238E27FC236}">
+                    <a16:creationId xmlns:a16="http://schemas.microsoft.com/office/drawing/2014/main" id="{CE0E4263-3667-A2F3-ED84-35EBC2024EC5}"/>
+                  </a:ext>
+                </a:extLst>
+              </p:cNvPr>
+              <p:cNvSpPr/>
+              <p:nvPr/>
+            </p:nvSpPr>
+            <p:spPr>
+              <a:xfrm>
+                <a:off x="8691384" y="2846424"/>
+                <a:ext cx="3420167" cy="3324041"/>
+              </a:xfrm>
+              <a:prstGeom prst="flowChartDecision">
+                <a:avLst/>
+              </a:prstGeom>
+              <a:ln w="57150"/>
+            </p:spPr>
+            <p:style>
+              <a:lnRef idx="2">
+                <a:schemeClr val="dk1"/>
+              </a:lnRef>
+              <a:fillRef idx="1">
+                <a:schemeClr val="lt1"/>
+              </a:fillRef>
+              <a:effectRef idx="0">
+                <a:schemeClr val="dk1"/>
+              </a:effectRef>
+              <a:fontRef idx="minor">
+                <a:schemeClr val="dk1"/>
+              </a:fontRef>
+            </p:style>
+            <p:txBody>
+              <a:bodyPr rtlCol="0" anchor="ctr"/>
+              <a:lstStyle/>
+              <a:p>
+                <a:pPr algn="ctr"/>
+                <a14:m>
+                  <m:oMath xmlns:m="http://schemas.openxmlformats.org/officeDocument/2006/math">
+                    <m:r>
+                      <a:rPr lang="en-PH" sz="2800" b="0" i="1" smtClean="0">
+                        <a:latin typeface="Cambria Math" panose="02040503050406030204" pitchFamily="18" charset="0"/>
+                      </a:rPr>
+                      <m:t>𝜇</m:t>
+                    </m:r>
+                    <m:r>
+                      <a:rPr lang="en-PH" sz="2800" b="0" i="1" smtClean="0">
+                        <a:latin typeface="Cambria Math" panose="02040503050406030204" pitchFamily="18" charset="0"/>
+                      </a:rPr>
+                      <m:t>≤</m:t>
+                    </m:r>
+                    <m:sSub>
+                      <m:sSubPr>
+                        <m:ctrlPr>
+                          <a:rPr lang="en-PH" sz="2800" b="0" i="1" smtClean="0">
+                            <a:latin typeface="Cambria Math" panose="02040503050406030204" pitchFamily="18" charset="0"/>
+                          </a:rPr>
+                        </m:ctrlPr>
+                      </m:sSubPr>
+                      <m:e>
+                        <m:r>
+                          <a:rPr lang="en-PH" sz="2800" b="0" i="1" smtClean="0">
+                            <a:latin typeface="Cambria Math" panose="02040503050406030204" pitchFamily="18" charset="0"/>
+                          </a:rPr>
+                          <m:t>𝑃</m:t>
+                        </m:r>
+                      </m:e>
+                      <m:sub>
+                        <m:r>
+                          <a:rPr lang="en-PH" sz="2800" b="0" i="1" smtClean="0">
+                            <a:latin typeface="Cambria Math" panose="02040503050406030204" pitchFamily="18" charset="0"/>
+                          </a:rPr>
+                          <m:t>𝑖</m:t>
+                        </m:r>
+                        <m:r>
+                          <a:rPr lang="en-PH" sz="2800" b="0" i="1" smtClean="0">
+                            <a:latin typeface="Cambria Math" panose="02040503050406030204" pitchFamily="18" charset="0"/>
+                          </a:rPr>
+                          <m:t>,</m:t>
+                        </m:r>
+                        <m:r>
+                          <a:rPr lang="en-PH" sz="2800" b="0" i="1" smtClean="0">
+                            <a:latin typeface="Cambria Math" panose="02040503050406030204" pitchFamily="18" charset="0"/>
+                          </a:rPr>
+                          <m:t>𝑗</m:t>
+                        </m:r>
+                      </m:sub>
+                    </m:sSub>
+                  </m:oMath>
+                </a14:m>
+                <a:r>
+                  <a:rPr lang="en-PH" sz="2800" dirty="0"/>
+                  <a:t> where </a:t>
+                </a:r>
+                <a14:m>
+                  <m:oMath xmlns:m="http://schemas.openxmlformats.org/officeDocument/2006/math">
+                    <m:r>
+                      <a:rPr lang="en-PH" sz="2800" b="0" i="1" smtClean="0">
+                        <a:latin typeface="Cambria Math" panose="02040503050406030204" pitchFamily="18" charset="0"/>
+                      </a:rPr>
+                      <m:t>𝜇</m:t>
+                    </m:r>
+                  </m:oMath>
+                </a14:m>
+                <a:r>
+                  <a:rPr lang="en-PH" sz="2800" dirty="0"/>
+                  <a:t> is a random number</a:t>
+                </a:r>
+              </a:p>
+            </p:txBody>
+          </p:sp>
+        </mc:Choice>
+        <mc:Fallback>
+          <p:sp>
+            <p:nvSpPr>
+              <p:cNvPr id="9" name="Flowchart: Decision 8">
+                <a:extLst>
+                  <a:ext uri="{FF2B5EF4-FFF2-40B4-BE49-F238E27FC236}">
+                    <a16:creationId xmlns:a16="http://schemas.microsoft.com/office/drawing/2014/main" id="{CE0E4263-3667-A2F3-ED84-35EBC2024EC5}"/>
+                  </a:ext>
+                </a:extLst>
+              </p:cNvPr>
+              <p:cNvSpPr>
+                <a:spLocks noRot="1" noChangeAspect="1" noMove="1" noResize="1" noEditPoints="1" noAdjustHandles="1" noChangeArrowheads="1" noChangeShapeType="1" noTextEdit="1"/>
+              </p:cNvSpPr>
+              <p:nvPr/>
+            </p:nvSpPr>
+            <p:spPr>
+              <a:xfrm>
+                <a:off x="8691384" y="2846424"/>
+                <a:ext cx="3420167" cy="3324041"/>
+              </a:xfrm>
+              <a:prstGeom prst="flowChartDecision">
+                <a:avLst/>
+              </a:prstGeom>
+              <a:blipFill>
+                <a:blip r:embed="rId5"/>
+                <a:stretch>
+                  <a:fillRect/>
+                </a:stretch>
+              </a:blipFill>
+              <a:ln w="57150"/>
+            </p:spPr>
+            <p:txBody>
+              <a:bodyPr/>
+              <a:lstStyle/>
+              <a:p>
+                <a:r>
+                  <a:rPr lang="en-PH">
+                    <a:noFill/>
+                  </a:rPr>
+                  <a:t> </a:t>
+                </a:r>
+              </a:p>
+            </p:txBody>
+          </p:sp>
+        </mc:Fallback>
+      </mc:AlternateContent>
+      <mc:AlternateContent xmlns:mc="http://schemas.openxmlformats.org/markup-compatibility/2006">
+        <mc:Choice xmlns:a14="http://schemas.microsoft.com/office/drawing/2010/main" Requires="a14">
+          <p:sp>
+            <p:nvSpPr>
+              <p:cNvPr id="10" name="Flowchart: Decision 9">
+                <a:extLst>
+                  <a:ext uri="{FF2B5EF4-FFF2-40B4-BE49-F238E27FC236}">
+                    <a16:creationId xmlns:a16="http://schemas.microsoft.com/office/drawing/2014/main" id="{DBF7B754-9394-B929-100E-31D2743914A7}"/>
+                  </a:ext>
+                </a:extLst>
+              </p:cNvPr>
+              <p:cNvSpPr/>
+              <p:nvPr/>
+            </p:nvSpPr>
+            <p:spPr>
+              <a:xfrm>
+                <a:off x="5866067" y="156165"/>
+                <a:ext cx="1836171" cy="1714176"/>
+              </a:xfrm>
+              <a:prstGeom prst="flowChartDecision">
+                <a:avLst/>
+              </a:prstGeom>
+              <a:ln w="57150"/>
+            </p:spPr>
+            <p:style>
+              <a:lnRef idx="2">
+                <a:schemeClr val="dk1"/>
+              </a:lnRef>
+              <a:fillRef idx="1">
+                <a:schemeClr val="lt1"/>
+              </a:fillRef>
+              <a:effectRef idx="0">
+                <a:schemeClr val="dk1"/>
+              </a:effectRef>
+              <a:fontRef idx="minor">
+                <a:schemeClr val="dk1"/>
+              </a:fontRef>
+            </p:style>
+            <p:txBody>
+              <a:bodyPr rtlCol="0" anchor="ctr"/>
+              <a:lstStyle/>
+              <a:p>
+                <a:pPr algn="ctr"/>
+                <a14:m>
+                  <m:oMathPara xmlns:m="http://schemas.openxmlformats.org/officeDocument/2006/math">
+                    <m:oMathParaPr>
+                      <m:jc m:val="centerGroup"/>
+                    </m:oMathParaPr>
+                    <m:oMath xmlns:m="http://schemas.openxmlformats.org/officeDocument/2006/math">
+                      <m:sSub>
+                        <m:sSubPr>
+                          <m:ctrlPr>
+                            <a:rPr lang="en-PH" sz="3200" b="0" i="1" smtClean="0">
+                              <a:latin typeface="Cambria Math" panose="02040503050406030204" pitchFamily="18" charset="0"/>
+                            </a:rPr>
+                          </m:ctrlPr>
+                        </m:sSubPr>
+                        <m:e>
+                          <m:r>
+                            <a:rPr lang="en-PH" sz="3200" b="0" i="1" smtClean="0">
+                              <a:latin typeface="Cambria Math" panose="02040503050406030204" pitchFamily="18" charset="0"/>
+                            </a:rPr>
+                            <m:t>𝑠</m:t>
+                          </m:r>
+                        </m:e>
+                        <m:sub>
+                          <m:r>
+                            <a:rPr lang="en-PH" sz="3200" b="0" i="1" smtClean="0">
+                              <a:latin typeface="Cambria Math" panose="02040503050406030204" pitchFamily="18" charset="0"/>
+                            </a:rPr>
+                            <m:t>𝑖</m:t>
+                          </m:r>
+                          <m:r>
+                            <a:rPr lang="en-PH" sz="3200" b="0" i="1" smtClean="0">
+                              <a:latin typeface="Cambria Math" panose="02040503050406030204" pitchFamily="18" charset="0"/>
+                            </a:rPr>
+                            <m:t>,</m:t>
+                          </m:r>
+                          <m:r>
+                            <a:rPr lang="en-PH" sz="3200" b="0" i="1" smtClean="0">
+                              <a:latin typeface="Cambria Math" panose="02040503050406030204" pitchFamily="18" charset="0"/>
+                            </a:rPr>
+                            <m:t>𝑗</m:t>
+                          </m:r>
+                        </m:sub>
+                      </m:sSub>
+                      <m:r>
+                        <a:rPr lang="en-PH" sz="3200" b="0" i="1" smtClean="0">
+                          <a:latin typeface="Cambria Math" panose="02040503050406030204" pitchFamily="18" charset="0"/>
+                        </a:rPr>
+                        <m:t>=1</m:t>
+                      </m:r>
+                    </m:oMath>
+                  </m:oMathPara>
+                </a14:m>
+                <a:endParaRPr lang="en-PH" sz="3200" dirty="0"/>
+              </a:p>
+            </p:txBody>
+          </p:sp>
+        </mc:Choice>
+        <mc:Fallback>
+          <p:sp>
+            <p:nvSpPr>
+              <p:cNvPr id="10" name="Flowchart: Decision 9">
+                <a:extLst>
+                  <a:ext uri="{FF2B5EF4-FFF2-40B4-BE49-F238E27FC236}">
+                    <a16:creationId xmlns:a16="http://schemas.microsoft.com/office/drawing/2014/main" id="{DBF7B754-9394-B929-100E-31D2743914A7}"/>
+                  </a:ext>
+                </a:extLst>
+              </p:cNvPr>
+              <p:cNvSpPr>
+                <a:spLocks noRot="1" noChangeAspect="1" noMove="1" noResize="1" noEditPoints="1" noAdjustHandles="1" noChangeArrowheads="1" noChangeShapeType="1" noTextEdit="1"/>
+              </p:cNvSpPr>
+              <p:nvPr/>
+            </p:nvSpPr>
+            <p:spPr>
+              <a:xfrm>
+                <a:off x="5866067" y="156165"/>
+                <a:ext cx="1836171" cy="1714176"/>
+              </a:xfrm>
+              <a:prstGeom prst="flowChartDecision">
+                <a:avLst/>
+              </a:prstGeom>
+              <a:blipFill>
+                <a:blip r:embed="rId6"/>
+                <a:stretch>
+                  <a:fillRect/>
+                </a:stretch>
+              </a:blipFill>
+              <a:ln w="57150"/>
+            </p:spPr>
+            <p:txBody>
+              <a:bodyPr/>
+              <a:lstStyle/>
+              <a:p>
+                <a:r>
+                  <a:rPr lang="en-PH">
+                    <a:noFill/>
+                  </a:rPr>
+                  <a:t> </a:t>
+                </a:r>
+              </a:p>
+            </p:txBody>
+          </p:sp>
+        </mc:Fallback>
+      </mc:AlternateContent>
+      <p:cxnSp>
+        <p:nvCxnSpPr>
+          <p:cNvPr id="11" name="Straight Arrow Connector 10">
+            <a:extLst>
+              <a:ext uri="{FF2B5EF4-FFF2-40B4-BE49-F238E27FC236}">
+                <a16:creationId xmlns:a16="http://schemas.microsoft.com/office/drawing/2014/main" id="{4F7CE89C-7769-4B4A-8693-94A10153DC89}"/>
+              </a:ext>
+            </a:extLst>
+          </p:cNvPr>
+          <p:cNvCxnSpPr>
+            <a:cxnSpLocks/>
+            <a:stCxn id="10" idx="3"/>
+            <a:endCxn id="7" idx="1"/>
+          </p:cNvCxnSpPr>
+          <p:nvPr/>
+        </p:nvCxnSpPr>
+        <p:spPr>
+          <a:xfrm>
+            <a:off x="7702238" y="1013253"/>
+            <a:ext cx="1053170" cy="1"/>
+          </a:xfrm>
+          <a:prstGeom prst="straightConnector1">
+            <a:avLst/>
+          </a:prstGeom>
+          <a:ln w="57150">
+            <a:tailEnd type="triangle"/>
+          </a:ln>
+        </p:spPr>
+        <p:style>
+          <a:lnRef idx="2">
+            <a:schemeClr val="dk1"/>
+          </a:lnRef>
+          <a:fillRef idx="0">
+            <a:schemeClr val="dk1"/>
+          </a:fillRef>
+          <a:effectRef idx="1">
+            <a:schemeClr val="dk1"/>
+          </a:effectRef>
+          <a:fontRef idx="minor">
+            <a:schemeClr val="tx1"/>
+          </a:fontRef>
+        </p:style>
+      </p:cxnSp>
+      <mc:AlternateContent xmlns:mc="http://schemas.openxmlformats.org/markup-compatibility/2006">
+        <mc:Choice xmlns:a14="http://schemas.microsoft.com/office/drawing/2010/main" Requires="a14">
+          <p:sp>
+            <p:nvSpPr>
+              <p:cNvPr id="12" name="Flowchart: Process 11">
+                <a:extLst>
+                  <a:ext uri="{FF2B5EF4-FFF2-40B4-BE49-F238E27FC236}">
+                    <a16:creationId xmlns:a16="http://schemas.microsoft.com/office/drawing/2014/main" id="{86EE3ECE-BFE1-1696-433C-DA9B6B538283}"/>
+                  </a:ext>
+                </a:extLst>
+              </p:cNvPr>
+              <p:cNvSpPr/>
+              <p:nvPr/>
+            </p:nvSpPr>
+            <p:spPr>
+              <a:xfrm>
+                <a:off x="5594619" y="3101842"/>
+                <a:ext cx="2379067" cy="2838730"/>
+              </a:xfrm>
+              <a:prstGeom prst="flowChartProcess">
+                <a:avLst/>
+              </a:prstGeom>
+              <a:ln w="57150"/>
+            </p:spPr>
+            <p:style>
+              <a:lnRef idx="2">
+                <a:schemeClr val="dk1"/>
+              </a:lnRef>
+              <a:fillRef idx="1">
+                <a:schemeClr val="lt1"/>
+              </a:fillRef>
+              <a:effectRef idx="0">
+                <a:schemeClr val="dk1"/>
+              </a:effectRef>
+              <a:fontRef idx="minor">
+                <a:schemeClr val="dk1"/>
+              </a:fontRef>
+            </p:style>
+            <p:txBody>
+              <a:bodyPr rtlCol="0" anchor="ctr"/>
+              <a:lstStyle/>
+              <a:p>
+                <a:pPr algn="ctr"/>
+                <a14:m>
+                  <m:oMath xmlns:m="http://schemas.openxmlformats.org/officeDocument/2006/math">
+                    <m:sSubSup>
+                      <m:sSubSupPr>
+                        <m:ctrlPr>
+                          <a:rPr lang="en-PH" sz="2800" b="0" i="1" smtClean="0">
+                            <a:latin typeface="Cambria Math" panose="02040503050406030204" pitchFamily="18" charset="0"/>
+                          </a:rPr>
+                        </m:ctrlPr>
+                      </m:sSubSupPr>
+                      <m:e>
+                        <m:r>
+                          <a:rPr lang="en-PH" sz="2800" b="0" i="1" smtClean="0">
+                            <a:latin typeface="Cambria Math" panose="02040503050406030204" pitchFamily="18" charset="0"/>
+                          </a:rPr>
+                          <m:t>𝑠</m:t>
+                        </m:r>
+                      </m:e>
+                      <m:sub>
+                        <m:r>
+                          <a:rPr lang="en-PH" sz="2800" b="0" i="1" smtClean="0">
+                            <a:latin typeface="Cambria Math" panose="02040503050406030204" pitchFamily="18" charset="0"/>
+                          </a:rPr>
+                          <m:t>𝑖</m:t>
+                        </m:r>
+                        <m:r>
+                          <a:rPr lang="en-PH" sz="2800" b="0" i="1" smtClean="0">
+                            <a:latin typeface="Cambria Math" panose="02040503050406030204" pitchFamily="18" charset="0"/>
+                          </a:rPr>
+                          <m:t>,</m:t>
+                        </m:r>
+                        <m:r>
+                          <a:rPr lang="en-PH" sz="2800" b="0" i="1" smtClean="0">
+                            <a:latin typeface="Cambria Math" panose="02040503050406030204" pitchFamily="18" charset="0"/>
+                          </a:rPr>
+                          <m:t>𝑗</m:t>
+                        </m:r>
+                      </m:sub>
+                      <m:sup>
+                        <m:r>
+                          <a:rPr lang="en-PH" sz="2800" b="0" i="1" smtClean="0">
+                            <a:latin typeface="Cambria Math" panose="02040503050406030204" pitchFamily="18" charset="0"/>
+                          </a:rPr>
+                          <m:t>′</m:t>
+                        </m:r>
+                      </m:sup>
+                    </m:sSubSup>
+                    <m:r>
+                      <a:rPr lang="en-PH" sz="2800" b="0" i="1" smtClean="0">
+                        <a:latin typeface="Cambria Math" panose="02040503050406030204" pitchFamily="18" charset="0"/>
+                      </a:rPr>
+                      <m:t>=1</m:t>
+                    </m:r>
+                  </m:oMath>
+                </a14:m>
+                <a:r>
+                  <a:rPr lang="en-PH" sz="2800" dirty="0"/>
+                  <a:t> where </a:t>
+                </a:r>
+                <a14:m>
+                  <m:oMath xmlns:m="http://schemas.openxmlformats.org/officeDocument/2006/math">
+                    <m:sSubSup>
+                      <m:sSubSupPr>
+                        <m:ctrlPr>
+                          <a:rPr lang="en-PH" sz="2800" b="0" i="1" smtClean="0">
+                            <a:latin typeface="Cambria Math" panose="02040503050406030204" pitchFamily="18" charset="0"/>
+                          </a:rPr>
+                        </m:ctrlPr>
+                      </m:sSubSupPr>
+                      <m:e>
+                        <m:r>
+                          <a:rPr lang="en-PH" sz="2800" b="0" i="1" smtClean="0">
+                            <a:latin typeface="Cambria Math" panose="02040503050406030204" pitchFamily="18" charset="0"/>
+                          </a:rPr>
+                          <m:t>𝑠</m:t>
+                        </m:r>
+                      </m:e>
+                      <m:sub>
+                        <m:r>
+                          <a:rPr lang="en-PH" sz="2800" b="0" i="1" smtClean="0">
+                            <a:latin typeface="Cambria Math" panose="02040503050406030204" pitchFamily="18" charset="0"/>
+                          </a:rPr>
+                          <m:t>𝑖</m:t>
+                        </m:r>
+                        <m:r>
+                          <a:rPr lang="en-PH" sz="2800" b="0" i="1" smtClean="0">
+                            <a:latin typeface="Cambria Math" panose="02040503050406030204" pitchFamily="18" charset="0"/>
+                          </a:rPr>
+                          <m:t>,</m:t>
+                        </m:r>
+                        <m:r>
+                          <a:rPr lang="en-PH" sz="2800" b="0" i="1" smtClean="0">
+                            <a:latin typeface="Cambria Math" panose="02040503050406030204" pitchFamily="18" charset="0"/>
+                          </a:rPr>
+                          <m:t>𝑗</m:t>
+                        </m:r>
+                      </m:sub>
+                      <m:sup>
+                        <m:r>
+                          <a:rPr lang="en-PH" sz="2800" b="0" i="1" smtClean="0">
+                            <a:latin typeface="Cambria Math" panose="02040503050406030204" pitchFamily="18" charset="0"/>
+                          </a:rPr>
+                          <m:t>′</m:t>
+                        </m:r>
+                      </m:sup>
+                    </m:sSubSup>
+                  </m:oMath>
+                </a14:m>
+                <a:r>
+                  <a:rPr lang="en-PH" sz="2800" dirty="0"/>
+                  <a:t> is the state of student </a:t>
+                </a:r>
+                <a14:m>
+                  <m:oMath xmlns:m="http://schemas.openxmlformats.org/officeDocument/2006/math">
+                    <m:sSub>
+                      <m:sSubPr>
+                        <m:ctrlPr>
+                          <a:rPr lang="en-PH" sz="2800" b="0" i="1" smtClean="0">
+                            <a:latin typeface="Cambria Math" panose="02040503050406030204" pitchFamily="18" charset="0"/>
+                          </a:rPr>
+                        </m:ctrlPr>
+                      </m:sSubPr>
+                      <m:e>
+                        <m:r>
+                          <a:rPr lang="en-PH" sz="2800" b="0" i="1" smtClean="0">
+                            <a:latin typeface="Cambria Math" panose="02040503050406030204" pitchFamily="18" charset="0"/>
+                          </a:rPr>
+                          <m:t>𝑐</m:t>
+                        </m:r>
+                      </m:e>
+                      <m:sub>
+                        <m:r>
+                          <a:rPr lang="en-PH" sz="2800" b="0" i="1" smtClean="0">
+                            <a:latin typeface="Cambria Math" panose="02040503050406030204" pitchFamily="18" charset="0"/>
+                          </a:rPr>
+                          <m:t>𝑖</m:t>
+                        </m:r>
+                        <m:r>
+                          <a:rPr lang="en-PH" sz="2800" b="0" i="1" smtClean="0">
+                            <a:latin typeface="Cambria Math" panose="02040503050406030204" pitchFamily="18" charset="0"/>
+                          </a:rPr>
+                          <m:t>,</m:t>
+                        </m:r>
+                        <m:r>
+                          <a:rPr lang="en-PH" sz="2800" b="0" i="1" smtClean="0">
+                            <a:latin typeface="Cambria Math" panose="02040503050406030204" pitchFamily="18" charset="0"/>
+                          </a:rPr>
+                          <m:t>𝑗</m:t>
+                        </m:r>
+                      </m:sub>
+                    </m:sSub>
+                  </m:oMath>
+                </a14:m>
+                <a:r>
+                  <a:rPr lang="en-PH" sz="2800" dirty="0"/>
+                  <a:t> in the next time step</a:t>
+                </a:r>
+              </a:p>
+            </p:txBody>
+          </p:sp>
+        </mc:Choice>
+        <mc:Fallback>
+          <p:sp>
+            <p:nvSpPr>
+              <p:cNvPr id="12" name="Flowchart: Process 11">
+                <a:extLst>
+                  <a:ext uri="{FF2B5EF4-FFF2-40B4-BE49-F238E27FC236}">
+                    <a16:creationId xmlns:a16="http://schemas.microsoft.com/office/drawing/2014/main" id="{86EE3ECE-BFE1-1696-433C-DA9B6B538283}"/>
+                  </a:ext>
+                </a:extLst>
+              </p:cNvPr>
+              <p:cNvSpPr>
+                <a:spLocks noRot="1" noChangeAspect="1" noMove="1" noResize="1" noEditPoints="1" noAdjustHandles="1" noChangeArrowheads="1" noChangeShapeType="1" noTextEdit="1"/>
+              </p:cNvSpPr>
+              <p:nvPr/>
+            </p:nvSpPr>
+            <p:spPr>
+              <a:xfrm>
+                <a:off x="5594619" y="3101842"/>
+                <a:ext cx="2379067" cy="2838730"/>
+              </a:xfrm>
+              <a:prstGeom prst="flowChartProcess">
+                <a:avLst/>
+              </a:prstGeom>
+              <a:blipFill>
+                <a:blip r:embed="rId7"/>
+                <a:stretch>
+                  <a:fillRect l="-1504" t="-211" r="-5263" b="-3579"/>
+                </a:stretch>
+              </a:blipFill>
+              <a:ln w="57150"/>
+            </p:spPr>
+            <p:txBody>
+              <a:bodyPr/>
+              <a:lstStyle/>
+              <a:p>
+                <a:r>
+                  <a:rPr lang="en-PH">
+                    <a:noFill/>
+                  </a:rPr>
+                  <a:t> </a:t>
+                </a:r>
+              </a:p>
+            </p:txBody>
+          </p:sp>
+        </mc:Fallback>
+      </mc:AlternateContent>
+      <mc:AlternateContent xmlns:mc="http://schemas.openxmlformats.org/markup-compatibility/2006">
+        <mc:Choice xmlns:a14="http://schemas.microsoft.com/office/drawing/2010/main" Requires="a14">
+          <p:sp>
+            <p:nvSpPr>
+              <p:cNvPr id="13" name="Flowchart: Process 12">
+                <a:extLst>
+                  <a:ext uri="{FF2B5EF4-FFF2-40B4-BE49-F238E27FC236}">
+                    <a16:creationId xmlns:a16="http://schemas.microsoft.com/office/drawing/2014/main" id="{BA73112E-0592-F68B-E2B5-E64CDD8BC116}"/>
+                  </a:ext>
+                </a:extLst>
+              </p:cNvPr>
+              <p:cNvSpPr/>
+              <p:nvPr/>
+            </p:nvSpPr>
+            <p:spPr>
+              <a:xfrm>
+                <a:off x="794746" y="4196739"/>
+                <a:ext cx="2379067" cy="2086004"/>
+              </a:xfrm>
+              <a:prstGeom prst="flowChartProcess">
+                <a:avLst/>
+              </a:prstGeom>
+              <a:ln w="57150"/>
+            </p:spPr>
+            <p:style>
+              <a:lnRef idx="2">
+                <a:schemeClr val="dk1"/>
+              </a:lnRef>
+              <a:fillRef idx="1">
+                <a:schemeClr val="lt1"/>
+              </a:fillRef>
+              <a:effectRef idx="0">
+                <a:schemeClr val="dk1"/>
+              </a:effectRef>
+              <a:fontRef idx="minor">
+                <a:schemeClr val="dk1"/>
+              </a:fontRef>
+            </p:style>
+            <p:txBody>
+              <a:bodyPr rtlCol="0" anchor="ctr"/>
+              <a:lstStyle/>
+              <a:p>
+                <a:pPr algn="ctr"/>
+                <a14:m>
+                  <m:oMath xmlns:m="http://schemas.openxmlformats.org/officeDocument/2006/math">
+                    <m:sSubSup>
+                      <m:sSubSupPr>
+                        <m:ctrlPr>
+                          <a:rPr lang="en-PH" sz="2400" b="0" i="1" smtClean="0">
+                            <a:latin typeface="Cambria Math" panose="02040503050406030204" pitchFamily="18" charset="0"/>
+                          </a:rPr>
+                        </m:ctrlPr>
+                      </m:sSubSupPr>
+                      <m:e>
+                        <m:r>
+                          <a:rPr lang="en-PH" sz="2400" b="0" i="1" smtClean="0">
+                            <a:latin typeface="Cambria Math" panose="02040503050406030204" pitchFamily="18" charset="0"/>
+                          </a:rPr>
+                          <m:t>𝑠</m:t>
+                        </m:r>
+                      </m:e>
+                      <m:sub>
+                        <m:r>
+                          <a:rPr lang="en-PH" sz="2400" b="0" i="1" smtClean="0">
+                            <a:latin typeface="Cambria Math" panose="02040503050406030204" pitchFamily="18" charset="0"/>
+                          </a:rPr>
+                          <m:t>𝑖</m:t>
+                        </m:r>
+                        <m:r>
+                          <a:rPr lang="en-PH" sz="2400" b="0" i="1" smtClean="0">
+                            <a:latin typeface="Cambria Math" panose="02040503050406030204" pitchFamily="18" charset="0"/>
+                          </a:rPr>
+                          <m:t>,</m:t>
+                        </m:r>
+                        <m:r>
+                          <a:rPr lang="en-PH" sz="2400" b="0" i="1" smtClean="0">
+                            <a:latin typeface="Cambria Math" panose="02040503050406030204" pitchFamily="18" charset="0"/>
+                          </a:rPr>
+                          <m:t>𝑗</m:t>
+                        </m:r>
+                      </m:sub>
+                      <m:sup>
+                        <m:r>
+                          <a:rPr lang="en-PH" sz="2400" b="0" i="1" smtClean="0">
+                            <a:latin typeface="Cambria Math" panose="02040503050406030204" pitchFamily="18" charset="0"/>
+                          </a:rPr>
+                          <m:t>′</m:t>
+                        </m:r>
+                      </m:sup>
+                    </m:sSubSup>
+                    <m:r>
+                      <a:rPr lang="en-PH" sz="2400" b="0" i="1" smtClean="0">
+                        <a:latin typeface="Cambria Math" panose="02040503050406030204" pitchFamily="18" charset="0"/>
+                      </a:rPr>
+                      <m:t>=0</m:t>
+                    </m:r>
+                  </m:oMath>
+                </a14:m>
+                <a:r>
+                  <a:rPr lang="en-PH" sz="2400" dirty="0"/>
+                  <a:t> where </a:t>
+                </a:r>
+                <a14:m>
+                  <m:oMath xmlns:m="http://schemas.openxmlformats.org/officeDocument/2006/math">
+                    <m:sSubSup>
+                      <m:sSubSupPr>
+                        <m:ctrlPr>
+                          <a:rPr lang="en-PH" sz="2400" b="0" i="1" smtClean="0">
+                            <a:latin typeface="Cambria Math" panose="02040503050406030204" pitchFamily="18" charset="0"/>
+                          </a:rPr>
+                        </m:ctrlPr>
+                      </m:sSubSupPr>
+                      <m:e>
+                        <m:r>
+                          <a:rPr lang="en-PH" sz="2400" b="0" i="1" smtClean="0">
+                            <a:latin typeface="Cambria Math" panose="02040503050406030204" pitchFamily="18" charset="0"/>
+                          </a:rPr>
+                          <m:t>𝑠</m:t>
+                        </m:r>
+                      </m:e>
+                      <m:sub>
+                        <m:r>
+                          <a:rPr lang="en-PH" sz="2400" b="0" i="1" smtClean="0">
+                            <a:latin typeface="Cambria Math" panose="02040503050406030204" pitchFamily="18" charset="0"/>
+                          </a:rPr>
+                          <m:t>𝑖</m:t>
+                        </m:r>
+                        <m:r>
+                          <a:rPr lang="en-PH" sz="2400" b="0" i="1" smtClean="0">
+                            <a:latin typeface="Cambria Math" panose="02040503050406030204" pitchFamily="18" charset="0"/>
+                          </a:rPr>
+                          <m:t>,</m:t>
+                        </m:r>
+                        <m:r>
+                          <a:rPr lang="en-PH" sz="2400" b="0" i="1" smtClean="0">
+                            <a:latin typeface="Cambria Math" panose="02040503050406030204" pitchFamily="18" charset="0"/>
+                          </a:rPr>
+                          <m:t>𝑗</m:t>
+                        </m:r>
+                      </m:sub>
+                      <m:sup>
+                        <m:r>
+                          <a:rPr lang="en-PH" sz="2400" b="0" i="1" smtClean="0">
+                            <a:latin typeface="Cambria Math" panose="02040503050406030204" pitchFamily="18" charset="0"/>
+                          </a:rPr>
+                          <m:t>′</m:t>
+                        </m:r>
+                      </m:sup>
+                    </m:sSubSup>
+                  </m:oMath>
+                </a14:m>
+                <a:r>
+                  <a:rPr lang="en-PH" sz="2400" dirty="0"/>
+                  <a:t> is the state of student </a:t>
+                </a:r>
+                <a14:m>
+                  <m:oMath xmlns:m="http://schemas.openxmlformats.org/officeDocument/2006/math">
+                    <m:sSub>
+                      <m:sSubPr>
+                        <m:ctrlPr>
+                          <a:rPr lang="en-PH" sz="2400" b="0" i="1" smtClean="0">
+                            <a:latin typeface="Cambria Math" panose="02040503050406030204" pitchFamily="18" charset="0"/>
+                          </a:rPr>
+                        </m:ctrlPr>
+                      </m:sSubPr>
+                      <m:e>
+                        <m:r>
+                          <a:rPr lang="en-PH" sz="2400" b="0" i="1" smtClean="0">
+                            <a:latin typeface="Cambria Math" panose="02040503050406030204" pitchFamily="18" charset="0"/>
+                          </a:rPr>
+                          <m:t>𝑐</m:t>
+                        </m:r>
+                      </m:e>
+                      <m:sub>
+                        <m:r>
+                          <a:rPr lang="en-PH" sz="2400" b="0" i="1" smtClean="0">
+                            <a:latin typeface="Cambria Math" panose="02040503050406030204" pitchFamily="18" charset="0"/>
+                          </a:rPr>
+                          <m:t>𝑖</m:t>
+                        </m:r>
+                        <m:r>
+                          <a:rPr lang="en-PH" sz="2400" b="0" i="1" smtClean="0">
+                            <a:latin typeface="Cambria Math" panose="02040503050406030204" pitchFamily="18" charset="0"/>
+                          </a:rPr>
+                          <m:t>,</m:t>
+                        </m:r>
+                        <m:r>
+                          <a:rPr lang="en-PH" sz="2400" b="0" i="1" smtClean="0">
+                            <a:latin typeface="Cambria Math" panose="02040503050406030204" pitchFamily="18" charset="0"/>
+                          </a:rPr>
+                          <m:t>𝑗</m:t>
+                        </m:r>
+                      </m:sub>
+                    </m:sSub>
+                  </m:oMath>
+                </a14:m>
+                <a:r>
+                  <a:rPr lang="en-PH" sz="2400" dirty="0"/>
+                  <a:t> in the next time step</a:t>
+                </a:r>
+              </a:p>
+            </p:txBody>
+          </p:sp>
+        </mc:Choice>
+        <mc:Fallback>
+          <p:sp>
+            <p:nvSpPr>
+              <p:cNvPr id="13" name="Flowchart: Process 12">
+                <a:extLst>
+                  <a:ext uri="{FF2B5EF4-FFF2-40B4-BE49-F238E27FC236}">
+                    <a16:creationId xmlns:a16="http://schemas.microsoft.com/office/drawing/2014/main" id="{BA73112E-0592-F68B-E2B5-E64CDD8BC116}"/>
+                  </a:ext>
+                </a:extLst>
+              </p:cNvPr>
+              <p:cNvSpPr>
+                <a:spLocks noRot="1" noChangeAspect="1" noMove="1" noResize="1" noEditPoints="1" noAdjustHandles="1" noChangeArrowheads="1" noChangeShapeType="1" noTextEdit="1"/>
+              </p:cNvSpPr>
+              <p:nvPr/>
+            </p:nvSpPr>
+            <p:spPr>
+              <a:xfrm>
+                <a:off x="794746" y="4196739"/>
+                <a:ext cx="2379067" cy="2086004"/>
+              </a:xfrm>
+              <a:prstGeom prst="flowChartProcess">
+                <a:avLst/>
+              </a:prstGeom>
+              <a:blipFill>
+                <a:blip r:embed="rId8"/>
+                <a:stretch>
+                  <a:fillRect l="-750" r="-2750" b="-3977"/>
+                </a:stretch>
+              </a:blipFill>
+              <a:ln w="57150"/>
+            </p:spPr>
+            <p:txBody>
+              <a:bodyPr/>
+              <a:lstStyle/>
+              <a:p>
+                <a:r>
+                  <a:rPr lang="en-PH">
+                    <a:noFill/>
+                  </a:rPr>
+                  <a:t> </a:t>
+                </a:r>
+              </a:p>
+            </p:txBody>
+          </p:sp>
+        </mc:Fallback>
+      </mc:AlternateContent>
+      <p:sp>
+        <p:nvSpPr>
+          <p:cNvPr id="14" name="TextBox 13">
+            <a:extLst>
+              <a:ext uri="{FF2B5EF4-FFF2-40B4-BE49-F238E27FC236}">
+                <a16:creationId xmlns:a16="http://schemas.microsoft.com/office/drawing/2014/main" id="{D417782A-8516-DADC-359B-7BD2E2EB416A}"/>
+              </a:ext>
+            </a:extLst>
+          </p:cNvPr>
+          <p:cNvSpPr txBox="1"/>
+          <p:nvPr/>
+        </p:nvSpPr>
+        <p:spPr>
+          <a:xfrm>
+            <a:off x="7657158" y="1013251"/>
+            <a:ext cx="1143329" cy="523220"/>
+          </a:xfrm>
+          <a:prstGeom prst="rect">
+            <a:avLst/>
+          </a:prstGeom>
+          <a:noFill/>
+        </p:spPr>
+        <p:txBody>
+          <a:bodyPr wrap="square" rtlCol="0">
+            <a:spAutoFit/>
+          </a:bodyPr>
+          <a:lstStyle/>
+          <a:p>
+            <a:r>
+              <a:rPr lang="en-PH" sz="2800" dirty="0"/>
+              <a:t>False</a:t>
+            </a:r>
+          </a:p>
+        </p:txBody>
+      </p:sp>
+      <p:cxnSp>
+        <p:nvCxnSpPr>
+          <p:cNvPr id="15" name="Straight Arrow Connector 14">
+            <a:extLst>
+              <a:ext uri="{FF2B5EF4-FFF2-40B4-BE49-F238E27FC236}">
+                <a16:creationId xmlns:a16="http://schemas.microsoft.com/office/drawing/2014/main" id="{5A649764-06BA-293C-E408-9CDF596936E2}"/>
+              </a:ext>
+            </a:extLst>
+          </p:cNvPr>
+          <p:cNvCxnSpPr>
+            <a:cxnSpLocks/>
+            <a:stCxn id="7" idx="2"/>
+            <a:endCxn id="9" idx="0"/>
+          </p:cNvCxnSpPr>
+          <p:nvPr/>
+        </p:nvCxnSpPr>
+        <p:spPr>
+          <a:xfrm flipH="1">
+            <a:off x="10401468" y="1870342"/>
+            <a:ext cx="35168" cy="976082"/>
+          </a:xfrm>
+          <a:prstGeom prst="straightConnector1">
+            <a:avLst/>
+          </a:prstGeom>
+          <a:ln w="57150">
+            <a:tailEnd type="triangle"/>
+          </a:ln>
+        </p:spPr>
+        <p:style>
+          <a:lnRef idx="2">
+            <a:schemeClr val="dk1"/>
+          </a:lnRef>
+          <a:fillRef idx="0">
+            <a:schemeClr val="dk1"/>
+          </a:fillRef>
+          <a:effectRef idx="1">
+            <a:schemeClr val="dk1"/>
+          </a:effectRef>
+          <a:fontRef idx="minor">
+            <a:schemeClr val="tx1"/>
+          </a:fontRef>
+        </p:style>
+      </p:cxnSp>
+      <p:cxnSp>
+        <p:nvCxnSpPr>
+          <p:cNvPr id="16" name="Straight Arrow Connector 15">
+            <a:extLst>
+              <a:ext uri="{FF2B5EF4-FFF2-40B4-BE49-F238E27FC236}">
+                <a16:creationId xmlns:a16="http://schemas.microsoft.com/office/drawing/2014/main" id="{F5D8B071-FF3E-DAE8-B66F-1FC6FDD01685}"/>
+              </a:ext>
+            </a:extLst>
+          </p:cNvPr>
+          <p:cNvCxnSpPr>
+            <a:cxnSpLocks/>
+            <a:stCxn id="10" idx="2"/>
+            <a:endCxn id="12" idx="0"/>
+          </p:cNvCxnSpPr>
+          <p:nvPr/>
+        </p:nvCxnSpPr>
+        <p:spPr>
+          <a:xfrm>
+            <a:off x="6784153" y="1870341"/>
+            <a:ext cx="0" cy="1231501"/>
+          </a:xfrm>
+          <a:prstGeom prst="straightConnector1">
+            <a:avLst/>
+          </a:prstGeom>
+          <a:ln w="57150">
+            <a:tailEnd type="triangle"/>
+          </a:ln>
+        </p:spPr>
+        <p:style>
+          <a:lnRef idx="2">
+            <a:schemeClr val="dk1"/>
+          </a:lnRef>
+          <a:fillRef idx="0">
+            <a:schemeClr val="dk1"/>
+          </a:fillRef>
+          <a:effectRef idx="1">
+            <a:schemeClr val="dk1"/>
+          </a:effectRef>
+          <a:fontRef idx="minor">
+            <a:schemeClr val="tx1"/>
+          </a:fontRef>
+        </p:style>
+      </p:cxnSp>
+      <p:cxnSp>
+        <p:nvCxnSpPr>
+          <p:cNvPr id="17" name="Straight Arrow Connector 16">
+            <a:extLst>
+              <a:ext uri="{FF2B5EF4-FFF2-40B4-BE49-F238E27FC236}">
+                <a16:creationId xmlns:a16="http://schemas.microsoft.com/office/drawing/2014/main" id="{CA49C09E-0E6B-0A28-A168-6CD9008AFC7D}"/>
+              </a:ext>
+            </a:extLst>
+          </p:cNvPr>
+          <p:cNvCxnSpPr>
+            <a:cxnSpLocks/>
+            <a:stCxn id="9" idx="1"/>
+            <a:endCxn id="12" idx="3"/>
+          </p:cNvCxnSpPr>
+          <p:nvPr/>
+        </p:nvCxnSpPr>
+        <p:spPr>
+          <a:xfrm flipH="1">
+            <a:off x="7973686" y="4508445"/>
+            <a:ext cx="717698" cy="12762"/>
+          </a:xfrm>
+          <a:prstGeom prst="straightConnector1">
+            <a:avLst/>
+          </a:prstGeom>
+          <a:ln w="57150">
+            <a:tailEnd type="triangle"/>
+          </a:ln>
+        </p:spPr>
+        <p:style>
+          <a:lnRef idx="2">
+            <a:schemeClr val="dk1"/>
+          </a:lnRef>
+          <a:fillRef idx="0">
+            <a:schemeClr val="dk1"/>
+          </a:fillRef>
+          <a:effectRef idx="1">
+            <a:schemeClr val="dk1"/>
+          </a:effectRef>
+          <a:fontRef idx="minor">
+            <a:schemeClr val="tx1"/>
+          </a:fontRef>
+        </p:style>
+      </p:cxnSp>
+      <p:sp>
+        <p:nvSpPr>
+          <p:cNvPr id="18" name="TextBox 17">
+            <a:extLst>
+              <a:ext uri="{FF2B5EF4-FFF2-40B4-BE49-F238E27FC236}">
+                <a16:creationId xmlns:a16="http://schemas.microsoft.com/office/drawing/2014/main" id="{6A5B2EB9-22E9-35B7-31D9-4055D43EDC5E}"/>
+              </a:ext>
+            </a:extLst>
+          </p:cNvPr>
+          <p:cNvSpPr txBox="1"/>
+          <p:nvPr/>
+        </p:nvSpPr>
+        <p:spPr>
+          <a:xfrm>
+            <a:off x="6797422" y="2434960"/>
+            <a:ext cx="910217" cy="523220"/>
+          </a:xfrm>
+          <a:prstGeom prst="rect">
+            <a:avLst/>
+          </a:prstGeom>
+          <a:noFill/>
+        </p:spPr>
+        <p:txBody>
+          <a:bodyPr wrap="square" rtlCol="0">
+            <a:spAutoFit/>
+          </a:bodyPr>
+          <a:lstStyle/>
+          <a:p>
+            <a:r>
+              <a:rPr lang="en-PH" sz="2800" dirty="0"/>
+              <a:t>True</a:t>
+            </a:r>
+          </a:p>
+        </p:txBody>
+      </p:sp>
+      <p:sp>
+        <p:nvSpPr>
+          <p:cNvPr id="19" name="TextBox 18">
+            <a:extLst>
+              <a:ext uri="{FF2B5EF4-FFF2-40B4-BE49-F238E27FC236}">
+                <a16:creationId xmlns:a16="http://schemas.microsoft.com/office/drawing/2014/main" id="{5E8CB58F-1A4B-D28D-0A66-12F94290F3BD}"/>
+              </a:ext>
+            </a:extLst>
+          </p:cNvPr>
+          <p:cNvSpPr txBox="1"/>
+          <p:nvPr/>
+        </p:nvSpPr>
+        <p:spPr>
+          <a:xfrm>
+            <a:off x="8137185" y="4546687"/>
+            <a:ext cx="910217" cy="523220"/>
+          </a:xfrm>
+          <a:prstGeom prst="rect">
+            <a:avLst/>
+          </a:prstGeom>
+          <a:noFill/>
+        </p:spPr>
+        <p:txBody>
+          <a:bodyPr wrap="square" rtlCol="0">
+            <a:spAutoFit/>
+          </a:bodyPr>
+          <a:lstStyle/>
+          <a:p>
+            <a:r>
+              <a:rPr lang="en-PH" sz="2800" dirty="0"/>
+              <a:t>True</a:t>
+            </a:r>
+          </a:p>
+        </p:txBody>
+      </p:sp>
+      <p:cxnSp>
+        <p:nvCxnSpPr>
+          <p:cNvPr id="20" name="Connector: Elbow 19">
+            <a:extLst>
+              <a:ext uri="{FF2B5EF4-FFF2-40B4-BE49-F238E27FC236}">
+                <a16:creationId xmlns:a16="http://schemas.microsoft.com/office/drawing/2014/main" id="{48AED5B3-9A8A-59C6-7BBB-DEA0C47E9EA4}"/>
+              </a:ext>
+            </a:extLst>
+          </p:cNvPr>
+          <p:cNvCxnSpPr>
+            <a:cxnSpLocks/>
+            <a:stCxn id="9" idx="2"/>
+            <a:endCxn id="13" idx="2"/>
+          </p:cNvCxnSpPr>
+          <p:nvPr/>
+        </p:nvCxnSpPr>
+        <p:spPr>
+          <a:xfrm rot="5400000">
+            <a:off x="6136735" y="2018010"/>
+            <a:ext cx="112278" cy="8417188"/>
+          </a:xfrm>
+          <a:prstGeom prst="bentConnector3">
+            <a:avLst>
+              <a:gd name="adj1" fmla="val 478118"/>
+            </a:avLst>
+          </a:prstGeom>
+          <a:ln w="57150">
+            <a:tailEnd type="triangle"/>
+          </a:ln>
+        </p:spPr>
+        <p:style>
+          <a:lnRef idx="2">
+            <a:schemeClr val="dk1"/>
+          </a:lnRef>
+          <a:fillRef idx="0">
+            <a:schemeClr val="dk1"/>
+          </a:fillRef>
+          <a:effectRef idx="1">
+            <a:schemeClr val="dk1"/>
+          </a:effectRef>
+          <a:fontRef idx="minor">
+            <a:schemeClr val="tx1"/>
+          </a:fontRef>
+        </p:style>
+      </p:cxnSp>
+      <p:cxnSp>
+        <p:nvCxnSpPr>
+          <p:cNvPr id="21" name="Connector: Elbow 20">
+            <a:extLst>
+              <a:ext uri="{FF2B5EF4-FFF2-40B4-BE49-F238E27FC236}">
+                <a16:creationId xmlns:a16="http://schemas.microsoft.com/office/drawing/2014/main" id="{1C0DD4B5-E800-399E-DCFA-A5C269F0EEC2}"/>
+              </a:ext>
+            </a:extLst>
+          </p:cNvPr>
+          <p:cNvCxnSpPr>
+            <a:cxnSpLocks/>
+            <a:stCxn id="13" idx="3"/>
+            <a:endCxn id="34" idx="2"/>
+          </p:cNvCxnSpPr>
+          <p:nvPr/>
+        </p:nvCxnSpPr>
+        <p:spPr>
+          <a:xfrm flipV="1">
+            <a:off x="3173813" y="4070644"/>
+            <a:ext cx="896335" cy="1169097"/>
+          </a:xfrm>
+          <a:prstGeom prst="bentConnector2">
+            <a:avLst/>
+          </a:prstGeom>
+          <a:ln w="57150">
+            <a:tailEnd type="triangle"/>
+          </a:ln>
+        </p:spPr>
+        <p:style>
+          <a:lnRef idx="2">
+            <a:schemeClr val="dk1"/>
+          </a:lnRef>
+          <a:fillRef idx="0">
+            <a:schemeClr val="dk1"/>
+          </a:fillRef>
+          <a:effectRef idx="1">
+            <a:schemeClr val="dk1"/>
+          </a:effectRef>
+          <a:fontRef idx="minor">
+            <a:schemeClr val="tx1"/>
+          </a:fontRef>
+        </p:style>
+      </p:cxnSp>
+      <p:cxnSp>
+        <p:nvCxnSpPr>
+          <p:cNvPr id="22" name="Connector: Elbow 21">
+            <a:extLst>
+              <a:ext uri="{FF2B5EF4-FFF2-40B4-BE49-F238E27FC236}">
+                <a16:creationId xmlns:a16="http://schemas.microsoft.com/office/drawing/2014/main" id="{863D097E-701B-BA78-FF78-7B15DEA2BDC1}"/>
+              </a:ext>
+            </a:extLst>
+          </p:cNvPr>
+          <p:cNvCxnSpPr>
+            <a:cxnSpLocks/>
+            <a:stCxn id="12" idx="1"/>
+            <a:endCxn id="34" idx="2"/>
+          </p:cNvCxnSpPr>
+          <p:nvPr/>
+        </p:nvCxnSpPr>
+        <p:spPr>
+          <a:xfrm rot="10800000">
+            <a:off x="4070149" y="4070645"/>
+            <a:ext cx="1524471" cy="450563"/>
+          </a:xfrm>
+          <a:prstGeom prst="bentConnector2">
+            <a:avLst/>
+          </a:prstGeom>
+          <a:ln w="57150">
+            <a:tailEnd type="triangle"/>
+          </a:ln>
+        </p:spPr>
+        <p:style>
+          <a:lnRef idx="2">
+            <a:schemeClr val="dk1"/>
+          </a:lnRef>
+          <a:fillRef idx="0">
+            <a:schemeClr val="dk1"/>
+          </a:fillRef>
+          <a:effectRef idx="1">
+            <a:schemeClr val="dk1"/>
+          </a:effectRef>
+          <a:fontRef idx="minor">
+            <a:schemeClr val="tx1"/>
+          </a:fontRef>
+        </p:style>
+      </p:cxnSp>
+      <p:sp>
+        <p:nvSpPr>
+          <p:cNvPr id="23" name="TextBox 22">
+            <a:extLst>
+              <a:ext uri="{FF2B5EF4-FFF2-40B4-BE49-F238E27FC236}">
+                <a16:creationId xmlns:a16="http://schemas.microsoft.com/office/drawing/2014/main" id="{3D25A8B2-A2B8-5596-A523-13431F4A0046}"/>
+              </a:ext>
+            </a:extLst>
+          </p:cNvPr>
+          <p:cNvSpPr txBox="1"/>
+          <p:nvPr/>
+        </p:nvSpPr>
+        <p:spPr>
+          <a:xfrm>
+            <a:off x="9258138" y="6185059"/>
+            <a:ext cx="1143329" cy="523220"/>
+          </a:xfrm>
+          <a:prstGeom prst="rect">
+            <a:avLst/>
+          </a:prstGeom>
+          <a:noFill/>
+        </p:spPr>
+        <p:txBody>
+          <a:bodyPr wrap="square" rtlCol="0">
+            <a:spAutoFit/>
+          </a:bodyPr>
+          <a:lstStyle/>
+          <a:p>
+            <a:r>
+              <a:rPr lang="en-PH" sz="2800" dirty="0"/>
+              <a:t>False</a:t>
+            </a:r>
+          </a:p>
+        </p:txBody>
+      </p:sp>
+      <mc:AlternateContent xmlns:mc="http://schemas.openxmlformats.org/markup-compatibility/2006">
+        <mc:Choice xmlns:a14="http://schemas.microsoft.com/office/drawing/2010/main" Requires="a14">
+          <p:sp>
+            <p:nvSpPr>
+              <p:cNvPr id="34" name="Flowchart: Decision 33">
+                <a:extLst>
+                  <a:ext uri="{FF2B5EF4-FFF2-40B4-BE49-F238E27FC236}">
+                    <a16:creationId xmlns:a16="http://schemas.microsoft.com/office/drawing/2014/main" id="{779F8355-A256-55A5-EBB1-1BEC3B216927}"/>
+                  </a:ext>
+                </a:extLst>
+              </p:cNvPr>
+              <p:cNvSpPr/>
+              <p:nvPr/>
+            </p:nvSpPr>
+            <p:spPr>
+              <a:xfrm>
+                <a:off x="2988933" y="2051887"/>
+                <a:ext cx="2162429" cy="2018757"/>
+              </a:xfrm>
+              <a:prstGeom prst="flowChartDecision">
+                <a:avLst/>
+              </a:prstGeom>
+              <a:ln w="57150"/>
+            </p:spPr>
+            <p:style>
+              <a:lnRef idx="2">
+                <a:schemeClr val="dk1"/>
+              </a:lnRef>
+              <a:fillRef idx="1">
+                <a:schemeClr val="lt1"/>
+              </a:fillRef>
+              <a:effectRef idx="0">
+                <a:schemeClr val="dk1"/>
+              </a:effectRef>
+              <a:fontRef idx="minor">
+                <a:schemeClr val="dk1"/>
+              </a:fontRef>
+            </p:style>
+            <p:txBody>
+              <a:bodyPr rtlCol="0" anchor="ctr"/>
+              <a:lstStyle/>
+              <a:p>
+                <a:pPr algn="ctr"/>
+                <a:r>
+                  <a:rPr lang="en-PH" sz="2800" dirty="0"/>
+                  <a:t>Done for all </a:t>
+                </a:r>
+                <a14:m>
+                  <m:oMath xmlns:m="http://schemas.openxmlformats.org/officeDocument/2006/math">
+                    <m:r>
+                      <a:rPr lang="en-PH" sz="2800" b="0" i="1" smtClean="0">
+                        <a:latin typeface="Cambria Math" panose="02040503050406030204" pitchFamily="18" charset="0"/>
+                      </a:rPr>
+                      <m:t>𝑖</m:t>
+                    </m:r>
+                    <m:r>
+                      <a:rPr lang="en-PH" sz="2800" b="0" i="1" smtClean="0">
+                        <a:latin typeface="Cambria Math" panose="02040503050406030204" pitchFamily="18" charset="0"/>
+                      </a:rPr>
+                      <m:t>,</m:t>
+                    </m:r>
+                    <m:r>
+                      <a:rPr lang="en-PH" sz="2800" b="0" i="1" smtClean="0">
+                        <a:latin typeface="Cambria Math" panose="02040503050406030204" pitchFamily="18" charset="0"/>
+                      </a:rPr>
+                      <m:t>𝑗</m:t>
+                    </m:r>
+                  </m:oMath>
+                </a14:m>
+                <a:endParaRPr lang="en-PH" sz="2800" dirty="0"/>
+              </a:p>
+            </p:txBody>
+          </p:sp>
+        </mc:Choice>
+        <mc:Fallback>
+          <p:sp>
+            <p:nvSpPr>
+              <p:cNvPr id="34" name="Flowchart: Decision 33">
+                <a:extLst>
+                  <a:ext uri="{FF2B5EF4-FFF2-40B4-BE49-F238E27FC236}">
+                    <a16:creationId xmlns:a16="http://schemas.microsoft.com/office/drawing/2014/main" id="{779F8355-A256-55A5-EBB1-1BEC3B216927}"/>
+                  </a:ext>
+                </a:extLst>
+              </p:cNvPr>
+              <p:cNvSpPr>
+                <a:spLocks noRot="1" noChangeAspect="1" noMove="1" noResize="1" noEditPoints="1" noAdjustHandles="1" noChangeArrowheads="1" noChangeShapeType="1" noTextEdit="1"/>
+              </p:cNvSpPr>
+              <p:nvPr/>
+            </p:nvSpPr>
+            <p:spPr>
+              <a:xfrm>
+                <a:off x="2988933" y="2051887"/>
+                <a:ext cx="2162429" cy="2018757"/>
+              </a:xfrm>
+              <a:prstGeom prst="flowChartDecision">
+                <a:avLst/>
+              </a:prstGeom>
+              <a:blipFill>
+                <a:blip r:embed="rId9"/>
+                <a:stretch>
+                  <a:fillRect/>
+                </a:stretch>
+              </a:blipFill>
+              <a:ln w="57150"/>
+            </p:spPr>
+            <p:txBody>
+              <a:bodyPr/>
+              <a:lstStyle/>
+              <a:p>
+                <a:r>
+                  <a:rPr lang="en-PH">
+                    <a:noFill/>
+                  </a:rPr>
+                  <a:t> </a:t>
+                </a:r>
+              </a:p>
+            </p:txBody>
+          </p:sp>
+        </mc:Fallback>
+      </mc:AlternateContent>
+      <p:sp>
+        <p:nvSpPr>
+          <p:cNvPr id="35" name="Oval 34">
+            <a:extLst>
+              <a:ext uri="{FF2B5EF4-FFF2-40B4-BE49-F238E27FC236}">
+                <a16:creationId xmlns:a16="http://schemas.microsoft.com/office/drawing/2014/main" id="{DE21BB8B-9476-D517-5651-9B6FB72BC50F}"/>
+              </a:ext>
+            </a:extLst>
+          </p:cNvPr>
+          <p:cNvSpPr/>
+          <p:nvPr/>
+        </p:nvSpPr>
+        <p:spPr>
+          <a:xfrm>
+            <a:off x="-6798086" y="319882"/>
+            <a:ext cx="1767010" cy="1386739"/>
+          </a:xfrm>
+          <a:prstGeom prst="ellipse">
+            <a:avLst/>
+          </a:prstGeom>
+          <a:solidFill>
+            <a:schemeClr val="bg1"/>
+          </a:solidFill>
+          <a:ln w="57150">
+            <a:solidFill>
+              <a:schemeClr val="tx1"/>
+            </a:solidFill>
+          </a:ln>
+        </p:spPr>
+        <p:style>
+          <a:lnRef idx="2">
+            <a:schemeClr val="accent6"/>
+          </a:lnRef>
+          <a:fillRef idx="1">
+            <a:schemeClr val="lt1"/>
+          </a:fillRef>
+          <a:effectRef idx="0">
+            <a:schemeClr val="accent6"/>
+          </a:effectRef>
+          <a:fontRef idx="minor">
+            <a:schemeClr val="dk1"/>
+          </a:fontRef>
+        </p:style>
+        <p:txBody>
+          <a:bodyPr rtlCol="0" anchor="ctr"/>
+          <a:lstStyle/>
+          <a:p>
+            <a:pPr algn="ctr"/>
+            <a:r>
+              <a:rPr lang="en-PH" sz="2800" dirty="0"/>
+              <a:t>Begin</a:t>
+            </a:r>
+          </a:p>
+        </p:txBody>
+      </p:sp>
+      <p:cxnSp>
+        <p:nvCxnSpPr>
+          <p:cNvPr id="44" name="Straight Arrow Connector 43">
+            <a:extLst>
+              <a:ext uri="{FF2B5EF4-FFF2-40B4-BE49-F238E27FC236}">
+                <a16:creationId xmlns:a16="http://schemas.microsoft.com/office/drawing/2014/main" id="{528E2522-BE11-2350-6C50-D98F8474DAE9}"/>
+              </a:ext>
+            </a:extLst>
+          </p:cNvPr>
+          <p:cNvCxnSpPr>
+            <a:cxnSpLocks/>
+            <a:stCxn id="34" idx="0"/>
+            <a:endCxn id="4" idx="2"/>
+          </p:cNvCxnSpPr>
+          <p:nvPr/>
+        </p:nvCxnSpPr>
+        <p:spPr>
+          <a:xfrm flipV="1">
+            <a:off x="4070148" y="1644849"/>
+            <a:ext cx="0" cy="407038"/>
+          </a:xfrm>
+          <a:prstGeom prst="straightConnector1">
+            <a:avLst/>
+          </a:prstGeom>
+          <a:ln w="57150">
+            <a:solidFill>
+              <a:schemeClr val="tx1"/>
+            </a:solidFill>
+            <a:tailEnd type="triangle"/>
+          </a:ln>
+        </p:spPr>
+        <p:style>
+          <a:lnRef idx="2">
+            <a:schemeClr val="accent1"/>
+          </a:lnRef>
+          <a:fillRef idx="0">
+            <a:schemeClr val="accent1"/>
+          </a:fillRef>
+          <a:effectRef idx="1">
+            <a:schemeClr val="accent1"/>
+          </a:effectRef>
+          <a:fontRef idx="minor">
+            <a:schemeClr val="tx1"/>
+          </a:fontRef>
+        </p:style>
+      </p:cxnSp>
+      <p:sp>
+        <p:nvSpPr>
+          <p:cNvPr id="45" name="TextBox 44">
+            <a:extLst>
+              <a:ext uri="{FF2B5EF4-FFF2-40B4-BE49-F238E27FC236}">
+                <a16:creationId xmlns:a16="http://schemas.microsoft.com/office/drawing/2014/main" id="{08FAEB32-145B-58DF-F602-F549CF3D3FCD}"/>
+              </a:ext>
+            </a:extLst>
+          </p:cNvPr>
+          <p:cNvSpPr txBox="1"/>
+          <p:nvPr/>
+        </p:nvSpPr>
+        <p:spPr>
+          <a:xfrm>
+            <a:off x="4083533" y="1674552"/>
+            <a:ext cx="1143329" cy="523220"/>
+          </a:xfrm>
+          <a:prstGeom prst="rect">
+            <a:avLst/>
+          </a:prstGeom>
+          <a:noFill/>
+        </p:spPr>
+        <p:txBody>
+          <a:bodyPr wrap="square" rtlCol="0">
+            <a:spAutoFit/>
+          </a:bodyPr>
+          <a:lstStyle/>
+          <a:p>
+            <a:r>
+              <a:rPr lang="en-PH" sz="2800" dirty="0"/>
+              <a:t>False</a:t>
+            </a:r>
+          </a:p>
+        </p:txBody>
+      </p:sp>
+      <p:sp>
+        <p:nvSpPr>
+          <p:cNvPr id="49" name="TextBox 48">
+            <a:extLst>
+              <a:ext uri="{FF2B5EF4-FFF2-40B4-BE49-F238E27FC236}">
+                <a16:creationId xmlns:a16="http://schemas.microsoft.com/office/drawing/2014/main" id="{BCFC339D-CA26-6931-3602-E42F8E1A7A8C}"/>
+              </a:ext>
+            </a:extLst>
+          </p:cNvPr>
+          <p:cNvSpPr txBox="1"/>
+          <p:nvPr/>
+        </p:nvSpPr>
+        <p:spPr>
+          <a:xfrm>
+            <a:off x="2038396" y="2547954"/>
+            <a:ext cx="910217" cy="523220"/>
+          </a:xfrm>
+          <a:prstGeom prst="rect">
+            <a:avLst/>
+          </a:prstGeom>
+          <a:noFill/>
+        </p:spPr>
+        <p:txBody>
+          <a:bodyPr wrap="square" rtlCol="0">
+            <a:spAutoFit/>
+          </a:bodyPr>
+          <a:lstStyle/>
+          <a:p>
+            <a:r>
+              <a:rPr lang="en-PH" sz="2800" dirty="0"/>
+              <a:t>True</a:t>
+            </a:r>
+          </a:p>
+        </p:txBody>
+      </p:sp>
+      <p:sp>
+        <p:nvSpPr>
+          <p:cNvPr id="53" name="Flowchart: Decision 52">
+            <a:extLst>
+              <a:ext uri="{FF2B5EF4-FFF2-40B4-BE49-F238E27FC236}">
+                <a16:creationId xmlns:a16="http://schemas.microsoft.com/office/drawing/2014/main" id="{1C182E96-B40B-9825-D08A-BD264631FBBA}"/>
+              </a:ext>
+            </a:extLst>
+          </p:cNvPr>
+          <p:cNvSpPr/>
+          <p:nvPr/>
+        </p:nvSpPr>
+        <p:spPr>
+          <a:xfrm>
+            <a:off x="-3027675" y="2016029"/>
+            <a:ext cx="3376406" cy="2171625"/>
+          </a:xfrm>
+          <a:prstGeom prst="flowChartDecision">
+            <a:avLst/>
+          </a:prstGeom>
+          <a:ln w="57150"/>
+        </p:spPr>
+        <p:style>
+          <a:lnRef idx="2">
+            <a:schemeClr val="dk1"/>
+          </a:lnRef>
+          <a:fillRef idx="1">
+            <a:schemeClr val="lt1"/>
+          </a:fillRef>
+          <a:effectRef idx="0">
+            <a:schemeClr val="dk1"/>
+          </a:effectRef>
+          <a:fontRef idx="minor">
+            <a:schemeClr val="dk1"/>
+          </a:fontRef>
+        </p:style>
+        <p:txBody>
+          <a:bodyPr rtlCol="0" anchor="ctr"/>
+          <a:lstStyle/>
+          <a:p>
+            <a:pPr algn="ctr"/>
+            <a:r>
+              <a:rPr lang="en-PH" sz="2800" dirty="0"/>
+              <a:t>Steady state achieved</a:t>
+            </a:r>
+          </a:p>
+        </p:txBody>
+      </p:sp>
+      <p:cxnSp>
+        <p:nvCxnSpPr>
+          <p:cNvPr id="55" name="Straight Arrow Connector 54">
+            <a:extLst>
+              <a:ext uri="{FF2B5EF4-FFF2-40B4-BE49-F238E27FC236}">
+                <a16:creationId xmlns:a16="http://schemas.microsoft.com/office/drawing/2014/main" id="{0CE86FFD-4E63-4442-4D73-CBC83972E14A}"/>
+              </a:ext>
+            </a:extLst>
+          </p:cNvPr>
+          <p:cNvCxnSpPr>
+            <a:cxnSpLocks/>
+            <a:stCxn id="34" idx="1"/>
+            <a:endCxn id="53" idx="3"/>
+          </p:cNvCxnSpPr>
+          <p:nvPr/>
+        </p:nvCxnSpPr>
+        <p:spPr>
+          <a:xfrm flipH="1">
+            <a:off x="348731" y="3061266"/>
+            <a:ext cx="2640202" cy="40576"/>
+          </a:xfrm>
+          <a:prstGeom prst="straightConnector1">
+            <a:avLst/>
+          </a:prstGeom>
+          <a:ln w="57150">
+            <a:solidFill>
+              <a:schemeClr val="tx1"/>
+            </a:solidFill>
+            <a:tailEnd type="triangle"/>
+          </a:ln>
+        </p:spPr>
+        <p:style>
+          <a:lnRef idx="2">
+            <a:schemeClr val="accent1"/>
+          </a:lnRef>
+          <a:fillRef idx="0">
+            <a:schemeClr val="accent1"/>
+          </a:fillRef>
+          <a:effectRef idx="1">
+            <a:schemeClr val="accent1"/>
+          </a:effectRef>
+          <a:fontRef idx="minor">
+            <a:schemeClr val="tx1"/>
+          </a:fontRef>
+        </p:style>
+      </p:cxnSp>
+      <p:cxnSp>
+        <p:nvCxnSpPr>
+          <p:cNvPr id="58" name="Straight Arrow Connector 57">
+            <a:extLst>
+              <a:ext uri="{FF2B5EF4-FFF2-40B4-BE49-F238E27FC236}">
+                <a16:creationId xmlns:a16="http://schemas.microsoft.com/office/drawing/2014/main" id="{18FBA621-267B-1C08-FFFF-4799BB236CB5}"/>
+              </a:ext>
+            </a:extLst>
+          </p:cNvPr>
+          <p:cNvCxnSpPr>
+            <a:cxnSpLocks/>
+            <a:stCxn id="53" idx="0"/>
+          </p:cNvCxnSpPr>
+          <p:nvPr/>
+        </p:nvCxnSpPr>
+        <p:spPr>
+          <a:xfrm flipV="1">
+            <a:off x="-1339472" y="1013252"/>
+            <a:ext cx="16031" cy="1002777"/>
+          </a:xfrm>
+          <a:prstGeom prst="straightConnector1">
+            <a:avLst/>
+          </a:prstGeom>
+          <a:ln w="57150">
+            <a:tailEnd type="triangle"/>
+          </a:ln>
+        </p:spPr>
+        <p:style>
+          <a:lnRef idx="2">
+            <a:schemeClr val="dk1"/>
+          </a:lnRef>
+          <a:fillRef idx="0">
+            <a:schemeClr val="dk1"/>
+          </a:fillRef>
+          <a:effectRef idx="1">
+            <a:schemeClr val="dk1"/>
+          </a:effectRef>
+          <a:fontRef idx="minor">
+            <a:schemeClr val="tx1"/>
+          </a:fontRef>
+        </p:style>
+      </p:cxnSp>
+      <p:sp>
+        <p:nvSpPr>
+          <p:cNvPr id="60" name="TextBox 59">
+            <a:extLst>
+              <a:ext uri="{FF2B5EF4-FFF2-40B4-BE49-F238E27FC236}">
+                <a16:creationId xmlns:a16="http://schemas.microsoft.com/office/drawing/2014/main" id="{5F95A007-DFF0-213D-B950-51F45FE0C095}"/>
+              </a:ext>
+            </a:extLst>
+          </p:cNvPr>
+          <p:cNvSpPr txBox="1"/>
+          <p:nvPr/>
+        </p:nvSpPr>
+        <p:spPr>
+          <a:xfrm>
+            <a:off x="-1311432" y="1439863"/>
+            <a:ext cx="1143329" cy="523220"/>
+          </a:xfrm>
+          <a:prstGeom prst="rect">
+            <a:avLst/>
+          </a:prstGeom>
+          <a:noFill/>
+        </p:spPr>
+        <p:txBody>
+          <a:bodyPr wrap="square" rtlCol="0">
+            <a:spAutoFit/>
+          </a:bodyPr>
+          <a:lstStyle/>
+          <a:p>
+            <a:r>
+              <a:rPr lang="en-PH" sz="2800" dirty="0"/>
+              <a:t>False</a:t>
+            </a:r>
+          </a:p>
+        </p:txBody>
+      </p:sp>
+      <p:sp>
+        <p:nvSpPr>
+          <p:cNvPr id="61" name="TextBox 60">
+            <a:extLst>
+              <a:ext uri="{FF2B5EF4-FFF2-40B4-BE49-F238E27FC236}">
+                <a16:creationId xmlns:a16="http://schemas.microsoft.com/office/drawing/2014/main" id="{DEC61A45-7C92-99B7-F4E2-5A7D0C84C926}"/>
+              </a:ext>
+            </a:extLst>
+          </p:cNvPr>
+          <p:cNvSpPr txBox="1"/>
+          <p:nvPr/>
+        </p:nvSpPr>
+        <p:spPr>
+          <a:xfrm>
+            <a:off x="-4024690" y="2593268"/>
+            <a:ext cx="910217" cy="523220"/>
+          </a:xfrm>
+          <a:prstGeom prst="rect">
+            <a:avLst/>
+          </a:prstGeom>
+          <a:noFill/>
+        </p:spPr>
+        <p:txBody>
+          <a:bodyPr wrap="square" rtlCol="0">
+            <a:spAutoFit/>
+          </a:bodyPr>
+          <a:lstStyle/>
+          <a:p>
+            <a:r>
+              <a:rPr lang="en-PH" sz="2800" dirty="0"/>
+              <a:t>True</a:t>
+            </a:r>
+          </a:p>
+        </p:txBody>
+      </p:sp>
+      <p:sp>
+        <p:nvSpPr>
+          <p:cNvPr id="62" name="Oval 61">
+            <a:extLst>
+              <a:ext uri="{FF2B5EF4-FFF2-40B4-BE49-F238E27FC236}">
+                <a16:creationId xmlns:a16="http://schemas.microsoft.com/office/drawing/2014/main" id="{A710FF80-0572-A61A-96FD-0EAA0922B5C1}"/>
+              </a:ext>
+            </a:extLst>
+          </p:cNvPr>
+          <p:cNvSpPr/>
+          <p:nvPr/>
+        </p:nvSpPr>
+        <p:spPr>
+          <a:xfrm>
+            <a:off x="-6842619" y="2388184"/>
+            <a:ext cx="1767010" cy="1386739"/>
+          </a:xfrm>
+          <a:prstGeom prst="ellipse">
+            <a:avLst/>
+          </a:prstGeom>
+          <a:solidFill>
+            <a:schemeClr val="bg1"/>
+          </a:solidFill>
+          <a:ln w="57150">
+            <a:solidFill>
+              <a:schemeClr val="tx1"/>
+            </a:solidFill>
+          </a:ln>
+        </p:spPr>
+        <p:style>
+          <a:lnRef idx="2">
+            <a:schemeClr val="accent6"/>
+          </a:lnRef>
+          <a:fillRef idx="1">
+            <a:schemeClr val="lt1"/>
+          </a:fillRef>
+          <a:effectRef idx="0">
+            <a:schemeClr val="accent6"/>
+          </a:effectRef>
+          <a:fontRef idx="minor">
+            <a:schemeClr val="dk1"/>
+          </a:fontRef>
+        </p:style>
+        <p:txBody>
+          <a:bodyPr rtlCol="0" anchor="ctr"/>
+          <a:lstStyle/>
+          <a:p>
+            <a:pPr algn="ctr"/>
+            <a:r>
+              <a:rPr lang="en-PH" sz="2800" dirty="0"/>
+              <a:t>End</a:t>
+            </a:r>
+          </a:p>
+        </p:txBody>
+      </p:sp>
+      <p:cxnSp>
+        <p:nvCxnSpPr>
+          <p:cNvPr id="64" name="Straight Arrow Connector 63">
+            <a:extLst>
+              <a:ext uri="{FF2B5EF4-FFF2-40B4-BE49-F238E27FC236}">
+                <a16:creationId xmlns:a16="http://schemas.microsoft.com/office/drawing/2014/main" id="{00C49729-275F-F229-57B3-40EACE11203C}"/>
+              </a:ext>
+            </a:extLst>
+          </p:cNvPr>
+          <p:cNvCxnSpPr>
+            <a:cxnSpLocks/>
+            <a:stCxn id="53" idx="1"/>
+            <a:endCxn id="62" idx="6"/>
+          </p:cNvCxnSpPr>
+          <p:nvPr/>
+        </p:nvCxnSpPr>
+        <p:spPr>
+          <a:xfrm flipH="1" flipV="1">
+            <a:off x="-5075609" y="3081554"/>
+            <a:ext cx="2047934" cy="20288"/>
+          </a:xfrm>
+          <a:prstGeom prst="straightConnector1">
+            <a:avLst/>
+          </a:prstGeom>
+          <a:ln w="57150">
+            <a:solidFill>
+              <a:schemeClr val="tx1"/>
+            </a:solidFill>
+            <a:tailEnd type="triangle"/>
+          </a:ln>
+        </p:spPr>
+        <p:style>
+          <a:lnRef idx="2">
+            <a:schemeClr val="accent1"/>
+          </a:lnRef>
+          <a:fillRef idx="0">
+            <a:schemeClr val="accent1"/>
+          </a:fillRef>
+          <a:effectRef idx="1">
+            <a:schemeClr val="accent1"/>
+          </a:effectRef>
+          <a:fontRef idx="minor">
+            <a:schemeClr val="tx1"/>
+          </a:fontRef>
+        </p:style>
+      </p:cxnSp>
+      <p:cxnSp>
+        <p:nvCxnSpPr>
+          <p:cNvPr id="66" name="Straight Arrow Connector 65">
+            <a:extLst>
+              <a:ext uri="{FF2B5EF4-FFF2-40B4-BE49-F238E27FC236}">
+                <a16:creationId xmlns:a16="http://schemas.microsoft.com/office/drawing/2014/main" id="{8DAAEF1F-138A-C383-6845-9C61AB15161B}"/>
+              </a:ext>
+            </a:extLst>
+          </p:cNvPr>
+          <p:cNvCxnSpPr>
+            <a:cxnSpLocks/>
+            <a:stCxn id="35" idx="6"/>
+            <a:endCxn id="2" idx="1"/>
+          </p:cNvCxnSpPr>
+          <p:nvPr/>
+        </p:nvCxnSpPr>
+        <p:spPr>
+          <a:xfrm>
+            <a:off x="-5031076" y="1013252"/>
+            <a:ext cx="483694" cy="0"/>
+          </a:xfrm>
+          <a:prstGeom prst="straightConnector1">
+            <a:avLst/>
+          </a:prstGeom>
+          <a:ln w="57150">
+            <a:tailEnd type="triangle"/>
+          </a:ln>
+        </p:spPr>
+        <p:style>
+          <a:lnRef idx="2">
+            <a:schemeClr val="dk1"/>
+          </a:lnRef>
+          <a:fillRef idx="0">
+            <a:schemeClr val="dk1"/>
+          </a:fillRef>
+          <a:effectRef idx="1">
+            <a:schemeClr val="dk1"/>
+          </a:effectRef>
+          <a:fontRef idx="minor">
+            <a:schemeClr val="tx1"/>
+          </a:fontRef>
+        </p:style>
+      </p:cxnSp>
+      <p:sp>
+        <p:nvSpPr>
+          <p:cNvPr id="67" name="TextBox 66">
+            <a:extLst>
+              <a:ext uri="{FF2B5EF4-FFF2-40B4-BE49-F238E27FC236}">
+                <a16:creationId xmlns:a16="http://schemas.microsoft.com/office/drawing/2014/main" id="{E2FB7560-08BE-80AE-69FA-FFAEA6FBFC65}"/>
+              </a:ext>
+            </a:extLst>
+          </p:cNvPr>
+          <p:cNvSpPr txBox="1"/>
+          <p:nvPr/>
+        </p:nvSpPr>
+        <p:spPr>
+          <a:xfrm>
+            <a:off x="721279" y="6958860"/>
+            <a:ext cx="2526001" cy="523220"/>
+          </a:xfrm>
+          <a:prstGeom prst="rect">
+            <a:avLst/>
+          </a:prstGeom>
+          <a:noFill/>
+        </p:spPr>
+        <p:txBody>
+          <a:bodyPr wrap="square" rtlCol="0">
+            <a:spAutoFit/>
+          </a:bodyPr>
+          <a:lstStyle/>
+          <a:p>
+            <a:pPr algn="ctr"/>
+            <a:r>
+              <a:rPr lang="en-PH" sz="2800" dirty="0"/>
+              <a:t>One time step</a:t>
+            </a:r>
+          </a:p>
+        </p:txBody>
+      </p:sp>
+    </p:spTree>
+    <p:extLst>
+      <p:ext uri="{BB962C8B-B14F-4D97-AF65-F5344CB8AC3E}">
+        <p14:creationId xmlns:p14="http://schemas.microsoft.com/office/powerpoint/2010/main" val="2981562498"/>
+      </p:ext>
+    </p:extLst>
+  </p:cSld>
+  <p:clrMapOvr>
+    <a:masterClrMapping/>
+  </p:clrMapOvr>
+</p:sld>
+</file>
+
+<file path=ppt/slides/slide8.xml><?xml version="1.0" encoding="utf-8"?>
+<p:sld xmlns:a="http://schemas.openxmlformats.org/drawingml/2006/main" xmlns:r="http://schemas.openxmlformats.org/officeDocument/2006/relationships" xmlns:p="http://schemas.openxmlformats.org/presentationml/2006/main">
+  <p:cSld>
+    <p:spTree>
+      <p:nvGrpSpPr>
+        <p:cNvPr id="1" name="">
+          <a:extLst>
+            <a:ext uri="{FF2B5EF4-FFF2-40B4-BE49-F238E27FC236}">
               <a16:creationId xmlns:a16="http://schemas.microsoft.com/office/drawing/2014/main" id="{02432322-544A-50F3-7F79-5360E446656F}"/>
             </a:ext>
           </a:extLst>
@@ -13659,8 +16178,8 @@
           </a:p>
         </p:txBody>
       </p:sp>
-      <mc:AlternateContent xmlns:mc="http://schemas.openxmlformats.org/markup-compatibility/2006">
-        <mc:Choice xmlns:a14="http://schemas.microsoft.com/office/drawing/2010/main" Requires="a14">
+      <mc:AlternateContent xmlns:mc="http://schemas.openxmlformats.org/markup-compatibility/2006" xmlns:a14="http://schemas.microsoft.com/office/drawing/2010/main">
+        <mc:Choice Requires="a14">
           <p:sp>
             <p:nvSpPr>
               <p:cNvPr id="2" name="Flowchart: Process 1">
@@ -13749,7 +16268,7 @@
             </p:txBody>
           </p:sp>
         </mc:Choice>
-        <mc:Fallback>
+        <mc:Fallback xmlns="">
           <p:sp>
             <p:nvSpPr>
               <p:cNvPr id="2" name="Flowchart: Process 1">
@@ -13838,8 +16357,8 @@
           </a:fontRef>
         </p:style>
       </p:cxnSp>
-      <mc:AlternateContent xmlns:mc="http://schemas.openxmlformats.org/markup-compatibility/2006">
-        <mc:Choice xmlns:a14="http://schemas.microsoft.com/office/drawing/2010/main" Requires="a14">
+      <mc:AlternateContent xmlns:mc="http://schemas.openxmlformats.org/markup-compatibility/2006" xmlns:a14="http://schemas.microsoft.com/office/drawing/2010/main">
+        <mc:Choice Requires="a14">
           <p:sp>
             <p:nvSpPr>
               <p:cNvPr id="4" name="Flowchart: Process 3">
@@ -13931,7 +16450,7 @@
             </p:txBody>
           </p:sp>
         </mc:Choice>
-        <mc:Fallback>
+        <mc:Fallback xmlns="">
           <p:sp>
             <p:nvSpPr>
               <p:cNvPr id="4" name="Flowchart: Process 3">
@@ -14020,8 +16539,8 @@
           </a:fontRef>
         </p:style>
       </p:cxnSp>
-      <mc:AlternateContent xmlns:mc="http://schemas.openxmlformats.org/markup-compatibility/2006">
-        <mc:Choice xmlns:a14="http://schemas.microsoft.com/office/drawing/2010/main" Requires="a14">
+      <mc:AlternateContent xmlns:mc="http://schemas.openxmlformats.org/markup-compatibility/2006" xmlns:a14="http://schemas.microsoft.com/office/drawing/2010/main">
+        <mc:Choice Requires="a14">
           <p:sp>
             <p:nvSpPr>
               <p:cNvPr id="9" name="Flowchart: Decision 8">
@@ -14138,7 +16657,7 @@
             </p:txBody>
           </p:sp>
         </mc:Choice>
-        <mc:Fallback>
+        <mc:Fallback xmlns="">
           <p:sp>
             <p:nvSpPr>
               <p:cNvPr id="9" name="Flowchart: Decision 8">
@@ -14184,8 +16703,8 @@
           </p:sp>
         </mc:Fallback>
       </mc:AlternateContent>
-      <mc:AlternateContent xmlns:mc="http://schemas.openxmlformats.org/markup-compatibility/2006">
-        <mc:Choice xmlns:a14="http://schemas.microsoft.com/office/drawing/2010/main" Requires="a14">
+      <mc:AlternateContent xmlns:mc="http://schemas.openxmlformats.org/markup-compatibility/2006" xmlns:a14="http://schemas.microsoft.com/office/drawing/2010/main">
+        <mc:Choice Requires="a14">
           <p:sp>
             <p:nvSpPr>
               <p:cNvPr id="10" name="Flowchart: Decision 9">
@@ -14284,7 +16803,7 @@
             </p:txBody>
           </p:sp>
         </mc:Choice>
-        <mc:Fallback>
+        <mc:Fallback xmlns="">
           <p:sp>
             <p:nvSpPr>
               <p:cNvPr id="10" name="Flowchart: Decision 9">
@@ -14373,8 +16892,8 @@
           </a:fontRef>
         </p:style>
       </p:cxnSp>
-      <mc:AlternateContent xmlns:mc="http://schemas.openxmlformats.org/markup-compatibility/2006">
-        <mc:Choice xmlns:a14="http://schemas.microsoft.com/office/drawing/2010/main" Requires="a14">
+      <mc:AlternateContent xmlns:mc="http://schemas.openxmlformats.org/markup-compatibility/2006" xmlns:a14="http://schemas.microsoft.com/office/drawing/2010/main">
+        <mc:Choice Requires="a14">
           <p:sp>
             <p:nvSpPr>
               <p:cNvPr id="12" name="Flowchart: Process 11">
@@ -14577,7 +17096,7 @@
             </p:txBody>
           </p:sp>
         </mc:Choice>
-        <mc:Fallback>
+        <mc:Fallback xmlns="">
           <p:sp>
             <p:nvSpPr>
               <p:cNvPr id="12" name="Flowchart: Process 11">
@@ -14623,8 +17142,8 @@
           </p:sp>
         </mc:Fallback>
       </mc:AlternateContent>
-      <mc:AlternateContent xmlns:mc="http://schemas.openxmlformats.org/markup-compatibility/2006">
-        <mc:Choice xmlns:a14="http://schemas.microsoft.com/office/drawing/2010/main" Requires="a14">
+      <mc:AlternateContent xmlns:mc="http://schemas.openxmlformats.org/markup-compatibility/2006" xmlns:a14="http://schemas.microsoft.com/office/drawing/2010/main">
+        <mc:Choice Requires="a14">
           <p:sp>
             <p:nvSpPr>
               <p:cNvPr id="13" name="Flowchart: Process 12">
@@ -14827,7 +17346,7 @@
             </p:txBody>
           </p:sp>
         </mc:Choice>
-        <mc:Fallback>
+        <mc:Fallback xmlns="">
           <p:sp>
             <p:nvSpPr>
               <p:cNvPr id="13" name="Flowchart: Process 12">
@@ -15242,8 +17761,8 @@
           </a:p>
         </p:txBody>
       </p:sp>
-      <mc:AlternateContent xmlns:mc="http://schemas.openxmlformats.org/markup-compatibility/2006">
-        <mc:Choice xmlns:a14="http://schemas.microsoft.com/office/drawing/2010/main" Requires="a14">
+      <mc:AlternateContent xmlns:mc="http://schemas.openxmlformats.org/markup-compatibility/2006" xmlns:a14="http://schemas.microsoft.com/office/drawing/2010/main">
+        <mc:Choice Requires="a14">
           <p:sp>
             <p:nvSpPr>
               <p:cNvPr id="34" name="Flowchart: Decision 33">
@@ -15316,7 +17835,7 @@
             </p:txBody>
           </p:sp>
         </mc:Choice>
-        <mc:Fallback>
+        <mc:Fallback xmlns="">
           <p:sp>
             <p:nvSpPr>
               <p:cNvPr id="34" name="Flowchart: Decision 33">
@@ -15934,8 +18453,8 @@
           </a:p>
         </p:txBody>
       </p:sp>
-      <mc:AlternateContent xmlns:mc="http://schemas.openxmlformats.org/markup-compatibility/2006">
-        <mc:Choice xmlns:a14="http://schemas.microsoft.com/office/drawing/2010/main" Requires="a14">
+      <mc:AlternateContent xmlns:mc="http://schemas.openxmlformats.org/markup-compatibility/2006" xmlns:a14="http://schemas.microsoft.com/office/drawing/2010/main">
+        <mc:Choice Requires="a14">
           <p:sp>
             <p:nvSpPr>
               <p:cNvPr id="28" name="Flowchart: Process 27">
@@ -16173,7 +18692,7 @@
             </p:txBody>
           </p:sp>
         </mc:Choice>
-        <mc:Fallback>
+        <mc:Fallback xmlns="">
           <p:sp>
             <p:nvSpPr>
               <p:cNvPr id="28" name="Flowchart: Process 27">
@@ -16219,8 +18738,8 @@
           </p:sp>
         </mc:Fallback>
       </mc:AlternateContent>
-      <mc:AlternateContent xmlns:mc="http://schemas.openxmlformats.org/markup-compatibility/2006">
-        <mc:Choice xmlns:a14="http://schemas.microsoft.com/office/drawing/2010/main" Requires="a14">
+      <mc:AlternateContent xmlns:mc="http://schemas.openxmlformats.org/markup-compatibility/2006" xmlns:a14="http://schemas.microsoft.com/office/drawing/2010/main">
+        <mc:Choice Requires="a14">
           <p:sp>
             <p:nvSpPr>
               <p:cNvPr id="29" name="Flowchart: Process 28">
@@ -16564,7 +19083,7 @@
             </p:txBody>
           </p:sp>
         </mc:Choice>
-        <mc:Fallback>
+        <mc:Fallback xmlns="">
           <p:sp>
             <p:nvSpPr>
               <p:cNvPr id="29" name="Flowchart: Process 28">

</xml_diff>

<commit_message>
Edit plots for PRPE paper
</commit_message>
<xml_diff>
--- a/documents/Figures editing.pptx
+++ b/documents/Figures editing.pptx
@@ -13,6 +13,8 @@
     <p:sldId id="260" r:id="rId7"/>
     <p:sldId id="263" r:id="rId8"/>
     <p:sldId id="262" r:id="rId9"/>
+    <p:sldId id="264" r:id="rId10"/>
+    <p:sldId id="265" r:id="rId11"/>
   </p:sldIdLst>
   <p:sldSz cx="12192000" cy="6858000"/>
   <p:notesSz cx="6858000" cy="9144000"/>
@@ -268,7 +270,7 @@
           <a:p>
             <a:fld id="{F6E9F5A1-C99C-41F9-B991-61D99245B2FF}" type="datetimeFigureOut">
               <a:rPr lang="en-PH" smtClean="0"/>
-              <a:t>04/04/2025</a:t>
+              <a:t>04/06/2025</a:t>
             </a:fld>
             <a:endParaRPr lang="en-PH"/>
           </a:p>
@@ -468,7 +470,7 @@
           <a:p>
             <a:fld id="{F6E9F5A1-C99C-41F9-B991-61D99245B2FF}" type="datetimeFigureOut">
               <a:rPr lang="en-PH" smtClean="0"/>
-              <a:t>04/04/2025</a:t>
+              <a:t>04/06/2025</a:t>
             </a:fld>
             <a:endParaRPr lang="en-PH"/>
           </a:p>
@@ -678,7 +680,7 @@
           <a:p>
             <a:fld id="{F6E9F5A1-C99C-41F9-B991-61D99245B2FF}" type="datetimeFigureOut">
               <a:rPr lang="en-PH" smtClean="0"/>
-              <a:t>04/04/2025</a:t>
+              <a:t>04/06/2025</a:t>
             </a:fld>
             <a:endParaRPr lang="en-PH"/>
           </a:p>
@@ -878,7 +880,7 @@
           <a:p>
             <a:fld id="{F6E9F5A1-C99C-41F9-B991-61D99245B2FF}" type="datetimeFigureOut">
               <a:rPr lang="en-PH" smtClean="0"/>
-              <a:t>04/04/2025</a:t>
+              <a:t>04/06/2025</a:t>
             </a:fld>
             <a:endParaRPr lang="en-PH"/>
           </a:p>
@@ -1154,7 +1156,7 @@
           <a:p>
             <a:fld id="{F6E9F5A1-C99C-41F9-B991-61D99245B2FF}" type="datetimeFigureOut">
               <a:rPr lang="en-PH" smtClean="0"/>
-              <a:t>04/04/2025</a:t>
+              <a:t>04/06/2025</a:t>
             </a:fld>
             <a:endParaRPr lang="en-PH"/>
           </a:p>
@@ -1422,7 +1424,7 @@
           <a:p>
             <a:fld id="{F6E9F5A1-C99C-41F9-B991-61D99245B2FF}" type="datetimeFigureOut">
               <a:rPr lang="en-PH" smtClean="0"/>
-              <a:t>04/04/2025</a:t>
+              <a:t>04/06/2025</a:t>
             </a:fld>
             <a:endParaRPr lang="en-PH"/>
           </a:p>
@@ -1837,7 +1839,7 @@
           <a:p>
             <a:fld id="{F6E9F5A1-C99C-41F9-B991-61D99245B2FF}" type="datetimeFigureOut">
               <a:rPr lang="en-PH" smtClean="0"/>
-              <a:t>04/04/2025</a:t>
+              <a:t>04/06/2025</a:t>
             </a:fld>
             <a:endParaRPr lang="en-PH"/>
           </a:p>
@@ -1979,7 +1981,7 @@
           <a:p>
             <a:fld id="{F6E9F5A1-C99C-41F9-B991-61D99245B2FF}" type="datetimeFigureOut">
               <a:rPr lang="en-PH" smtClean="0"/>
-              <a:t>04/04/2025</a:t>
+              <a:t>04/06/2025</a:t>
             </a:fld>
             <a:endParaRPr lang="en-PH"/>
           </a:p>
@@ -2092,7 +2094,7 @@
           <a:p>
             <a:fld id="{F6E9F5A1-C99C-41F9-B991-61D99245B2FF}" type="datetimeFigureOut">
               <a:rPr lang="en-PH" smtClean="0"/>
-              <a:t>04/04/2025</a:t>
+              <a:t>04/06/2025</a:t>
             </a:fld>
             <a:endParaRPr lang="en-PH"/>
           </a:p>
@@ -2405,7 +2407,7 @@
           <a:p>
             <a:fld id="{F6E9F5A1-C99C-41F9-B991-61D99245B2FF}" type="datetimeFigureOut">
               <a:rPr lang="en-PH" smtClean="0"/>
-              <a:t>04/04/2025</a:t>
+              <a:t>04/06/2025</a:t>
             </a:fld>
             <a:endParaRPr lang="en-PH"/>
           </a:p>
@@ -2694,7 +2696,7 @@
           <a:p>
             <a:fld id="{F6E9F5A1-C99C-41F9-B991-61D99245B2FF}" type="datetimeFigureOut">
               <a:rPr lang="en-PH" smtClean="0"/>
-              <a:t>04/04/2025</a:t>
+              <a:t>04/06/2025</a:t>
             </a:fld>
             <a:endParaRPr lang="en-PH"/>
           </a:p>
@@ -2937,7 +2939,7 @@
           <a:p>
             <a:fld id="{F6E9F5A1-C99C-41F9-B991-61D99245B2FF}" type="datetimeFigureOut">
               <a:rPr lang="en-PH" smtClean="0"/>
-              <a:t>04/04/2025</a:t>
+              <a:t>04/06/2025</a:t>
             </a:fld>
             <a:endParaRPr lang="en-PH"/>
           </a:p>
@@ -4152,6 +4154,232 @@
     <p:extLst>
       <p:ext uri="{BB962C8B-B14F-4D97-AF65-F5344CB8AC3E}">
         <p14:creationId xmlns:p14="http://schemas.microsoft.com/office/powerpoint/2010/main" val="2771841543"/>
+      </p:ext>
+    </p:extLst>
+  </p:cSld>
+  <p:clrMapOvr>
+    <a:masterClrMapping/>
+  </p:clrMapOvr>
+</p:sld>
+</file>
+
+<file path=ppt/slides/slide10.xml><?xml version="1.0" encoding="utf-8"?>
+<p:sld xmlns:a="http://schemas.openxmlformats.org/drawingml/2006/main" xmlns:r="http://schemas.openxmlformats.org/officeDocument/2006/relationships" xmlns:p="http://schemas.openxmlformats.org/presentationml/2006/main">
+  <p:cSld>
+    <p:spTree>
+      <p:nvGrpSpPr>
+        <p:cNvPr id="1" name=""/>
+        <p:cNvGrpSpPr/>
+        <p:nvPr/>
+      </p:nvGrpSpPr>
+      <p:grpSpPr>
+        <a:xfrm>
+          <a:off x="0" y="0"/>
+          <a:ext cx="0" cy="0"/>
+          <a:chOff x="0" y="0"/>
+          <a:chExt cx="0" cy="0"/>
+        </a:xfrm>
+      </p:grpSpPr>
+      <p:pic>
+        <p:nvPicPr>
+          <p:cNvPr id="3" name="Picture 2" descr="A graph of a number of numbers&#10;&#10;AI-generated content may be incorrect.">
+            <a:extLst>
+              <a:ext uri="{FF2B5EF4-FFF2-40B4-BE49-F238E27FC236}">
+                <a16:creationId xmlns:a16="http://schemas.microsoft.com/office/drawing/2014/main" id="{9C85A712-B06B-1E15-6820-535F217B9983}"/>
+              </a:ext>
+            </a:extLst>
+          </p:cNvPr>
+          <p:cNvPicPr>
+            <a:picLocks noChangeAspect="1"/>
+          </p:cNvPicPr>
+          <p:nvPr/>
+        </p:nvPicPr>
+        <p:blipFill>
+          <a:blip r:embed="rId2">
+            <a:extLst>
+              <a:ext uri="{28A0092B-C50C-407E-A947-70E740481C1C}">
+                <a14:useLocalDpi xmlns:a14="http://schemas.microsoft.com/office/drawing/2010/main" val="0"/>
+              </a:ext>
+            </a:extLst>
+          </a:blip>
+          <a:stretch>
+            <a:fillRect/>
+          </a:stretch>
+        </p:blipFill>
+        <p:spPr>
+          <a:xfrm>
+            <a:off x="1245929" y="0"/>
+            <a:ext cx="9700141" cy="6858000"/>
+          </a:xfrm>
+          <a:prstGeom prst="rect">
+            <a:avLst/>
+          </a:prstGeom>
+        </p:spPr>
+      </p:pic>
+      <p:sp>
+        <p:nvSpPr>
+          <p:cNvPr id="4" name="TextBox 3">
+            <a:extLst>
+              <a:ext uri="{FF2B5EF4-FFF2-40B4-BE49-F238E27FC236}">
+                <a16:creationId xmlns:a16="http://schemas.microsoft.com/office/drawing/2014/main" id="{95766CE1-EC15-DB1F-CAB3-76E1228B7A0E}"/>
+              </a:ext>
+            </a:extLst>
+          </p:cNvPr>
+          <p:cNvSpPr txBox="1"/>
+          <p:nvPr/>
+        </p:nvSpPr>
+        <p:spPr>
+          <a:xfrm>
+            <a:off x="3525574" y="1564748"/>
+            <a:ext cx="2068402" cy="461665"/>
+          </a:xfrm>
+          <a:prstGeom prst="rect">
+            <a:avLst/>
+          </a:prstGeom>
+          <a:noFill/>
+        </p:spPr>
+        <p:txBody>
+          <a:bodyPr wrap="square" rtlCol="0">
+            <a:spAutoFit/>
+          </a:bodyPr>
+          <a:lstStyle/>
+          <a:p>
+            <a:pPr algn="ctr"/>
+            <a:r>
+              <a:rPr lang="en-PH" sz="2400" dirty="0">
+                <a:solidFill>
+                  <a:srgbClr val="0173B2"/>
+                </a:solidFill>
+              </a:rPr>
+              <a:t>L = 32, 64, 128</a:t>
+            </a:r>
+          </a:p>
+        </p:txBody>
+      </p:sp>
+      <p:sp>
+        <p:nvSpPr>
+          <p:cNvPr id="5" name="TextBox 4">
+            <a:extLst>
+              <a:ext uri="{FF2B5EF4-FFF2-40B4-BE49-F238E27FC236}">
+                <a16:creationId xmlns:a16="http://schemas.microsoft.com/office/drawing/2014/main" id="{8B6AA083-6CD1-E73A-FDA1-3696BF091CE4}"/>
+              </a:ext>
+            </a:extLst>
+          </p:cNvPr>
+          <p:cNvSpPr txBox="1"/>
+          <p:nvPr/>
+        </p:nvSpPr>
+        <p:spPr>
+          <a:xfrm>
+            <a:off x="5827059" y="2646218"/>
+            <a:ext cx="951074" cy="461665"/>
+          </a:xfrm>
+          <a:prstGeom prst="rect">
+            <a:avLst/>
+          </a:prstGeom>
+          <a:noFill/>
+        </p:spPr>
+        <p:txBody>
+          <a:bodyPr wrap="square" rtlCol="0">
+            <a:spAutoFit/>
+          </a:bodyPr>
+          <a:lstStyle/>
+          <a:p>
+            <a:pPr algn="ctr"/>
+            <a:r>
+              <a:rPr lang="en-PH" sz="2400" dirty="0">
+                <a:solidFill>
+                  <a:srgbClr val="DE8F05"/>
+                </a:solidFill>
+              </a:rPr>
+              <a:t>L = 32</a:t>
+            </a:r>
+          </a:p>
+        </p:txBody>
+      </p:sp>
+      <p:sp>
+        <p:nvSpPr>
+          <p:cNvPr id="6" name="TextBox 5">
+            <a:extLst>
+              <a:ext uri="{FF2B5EF4-FFF2-40B4-BE49-F238E27FC236}">
+                <a16:creationId xmlns:a16="http://schemas.microsoft.com/office/drawing/2014/main" id="{2874F81D-B30F-4C7F-A8CC-B73C569A0A14}"/>
+              </a:ext>
+            </a:extLst>
+          </p:cNvPr>
+          <p:cNvSpPr txBox="1"/>
+          <p:nvPr/>
+        </p:nvSpPr>
+        <p:spPr>
+          <a:xfrm>
+            <a:off x="7230932" y="1908047"/>
+            <a:ext cx="951074" cy="461665"/>
+          </a:xfrm>
+          <a:prstGeom prst="rect">
+            <a:avLst/>
+          </a:prstGeom>
+          <a:noFill/>
+        </p:spPr>
+        <p:txBody>
+          <a:bodyPr wrap="square" rtlCol="0">
+            <a:spAutoFit/>
+          </a:bodyPr>
+          <a:lstStyle/>
+          <a:p>
+            <a:pPr algn="ctr"/>
+            <a:r>
+              <a:rPr lang="en-PH" sz="2400" dirty="0">
+                <a:solidFill>
+                  <a:srgbClr val="DE8F05"/>
+                </a:solidFill>
+              </a:rPr>
+              <a:t>L = 64</a:t>
+            </a:r>
+          </a:p>
+        </p:txBody>
+      </p:sp>
+      <p:sp>
+        <p:nvSpPr>
+          <p:cNvPr id="7" name="TextBox 6">
+            <a:extLst>
+              <a:ext uri="{FF2B5EF4-FFF2-40B4-BE49-F238E27FC236}">
+                <a16:creationId xmlns:a16="http://schemas.microsoft.com/office/drawing/2014/main" id="{2AC6606B-8645-83B1-B116-ED57FFBDE65A}"/>
+              </a:ext>
+            </a:extLst>
+          </p:cNvPr>
+          <p:cNvSpPr txBox="1"/>
+          <p:nvPr/>
+        </p:nvSpPr>
+        <p:spPr>
+          <a:xfrm>
+            <a:off x="8424867" y="1209615"/>
+            <a:ext cx="1217896" cy="461665"/>
+          </a:xfrm>
+          <a:prstGeom prst="rect">
+            <a:avLst/>
+          </a:prstGeom>
+          <a:noFill/>
+        </p:spPr>
+        <p:txBody>
+          <a:bodyPr wrap="square" rtlCol="0">
+            <a:spAutoFit/>
+          </a:bodyPr>
+          <a:lstStyle/>
+          <a:p>
+            <a:pPr algn="ctr"/>
+            <a:r>
+              <a:rPr lang="en-PH" sz="2400" dirty="0">
+                <a:solidFill>
+                  <a:srgbClr val="DE8F05"/>
+                </a:solidFill>
+              </a:rPr>
+              <a:t>L = 128</a:t>
+            </a:r>
+          </a:p>
+        </p:txBody>
+      </p:sp>
+    </p:spTree>
+    <p:extLst>
+      <p:ext uri="{BB962C8B-B14F-4D97-AF65-F5344CB8AC3E}">
+        <p14:creationId xmlns:p14="http://schemas.microsoft.com/office/powerpoint/2010/main" val="1080307861"/>
       </p:ext>
     </p:extLst>
   </p:cSld>
@@ -13660,8 +13888,8 @@
           </a:p>
         </p:txBody>
       </p:sp>
-      <mc:AlternateContent xmlns:mc="http://schemas.openxmlformats.org/markup-compatibility/2006">
-        <mc:Choice xmlns:a14="http://schemas.microsoft.com/office/drawing/2010/main" Requires="a14">
+      <mc:AlternateContent xmlns:mc="http://schemas.openxmlformats.org/markup-compatibility/2006" xmlns:a14="http://schemas.microsoft.com/office/drawing/2010/main">
+        <mc:Choice Requires="a14">
           <p:sp>
             <p:nvSpPr>
               <p:cNvPr id="2" name="Flowchart: Process 1">
@@ -13750,7 +13978,7 @@
             </p:txBody>
           </p:sp>
         </mc:Choice>
-        <mc:Fallback>
+        <mc:Fallback xmlns="">
           <p:sp>
             <p:nvSpPr>
               <p:cNvPr id="2" name="Flowchart: Process 1">
@@ -13839,8 +14067,8 @@
           </a:fontRef>
         </p:style>
       </p:cxnSp>
-      <mc:AlternateContent xmlns:mc="http://schemas.openxmlformats.org/markup-compatibility/2006">
-        <mc:Choice xmlns:a14="http://schemas.microsoft.com/office/drawing/2010/main" Requires="a14">
+      <mc:AlternateContent xmlns:mc="http://schemas.openxmlformats.org/markup-compatibility/2006" xmlns:a14="http://schemas.microsoft.com/office/drawing/2010/main">
+        <mc:Choice Requires="a14">
           <p:sp>
             <p:nvSpPr>
               <p:cNvPr id="4" name="Flowchart: Process 3">
@@ -13932,7 +14160,7 @@
             </p:txBody>
           </p:sp>
         </mc:Choice>
-        <mc:Fallback>
+        <mc:Fallback xmlns="">
           <p:sp>
             <p:nvSpPr>
               <p:cNvPr id="4" name="Flowchart: Process 3">
@@ -14021,8 +14249,8 @@
           </a:fontRef>
         </p:style>
       </p:cxnSp>
-      <mc:AlternateContent xmlns:mc="http://schemas.openxmlformats.org/markup-compatibility/2006">
-        <mc:Choice xmlns:a14="http://schemas.microsoft.com/office/drawing/2010/main" Requires="a14">
+      <mc:AlternateContent xmlns:mc="http://schemas.openxmlformats.org/markup-compatibility/2006" xmlns:a14="http://schemas.microsoft.com/office/drawing/2010/main">
+        <mc:Choice Requires="a14">
           <p:sp>
             <p:nvSpPr>
               <p:cNvPr id="7" name="Flowchart: Process 6">
@@ -14114,7 +14342,7 @@
             </p:txBody>
           </p:sp>
         </mc:Choice>
-        <mc:Fallback>
+        <mc:Fallback xmlns="">
           <p:sp>
             <p:nvSpPr>
               <p:cNvPr id="7" name="Flowchart: Process 6">
@@ -14160,8 +14388,8 @@
           </p:sp>
         </mc:Fallback>
       </mc:AlternateContent>
-      <mc:AlternateContent xmlns:mc="http://schemas.openxmlformats.org/markup-compatibility/2006">
-        <mc:Choice xmlns:a14="http://schemas.microsoft.com/office/drawing/2010/main" Requires="a14">
+      <mc:AlternateContent xmlns:mc="http://schemas.openxmlformats.org/markup-compatibility/2006" xmlns:a14="http://schemas.microsoft.com/office/drawing/2010/main">
+        <mc:Choice Requires="a14">
           <p:sp>
             <p:nvSpPr>
               <p:cNvPr id="9" name="Flowchart: Decision 8">
@@ -14278,7 +14506,7 @@
             </p:txBody>
           </p:sp>
         </mc:Choice>
-        <mc:Fallback>
+        <mc:Fallback xmlns="">
           <p:sp>
             <p:nvSpPr>
               <p:cNvPr id="9" name="Flowchart: Decision 8">
@@ -14324,8 +14552,8 @@
           </p:sp>
         </mc:Fallback>
       </mc:AlternateContent>
-      <mc:AlternateContent xmlns:mc="http://schemas.openxmlformats.org/markup-compatibility/2006">
-        <mc:Choice xmlns:a14="http://schemas.microsoft.com/office/drawing/2010/main" Requires="a14">
+      <mc:AlternateContent xmlns:mc="http://schemas.openxmlformats.org/markup-compatibility/2006" xmlns:a14="http://schemas.microsoft.com/office/drawing/2010/main">
+        <mc:Choice Requires="a14">
           <p:sp>
             <p:nvSpPr>
               <p:cNvPr id="10" name="Flowchart: Decision 9">
@@ -14424,7 +14652,7 @@
             </p:txBody>
           </p:sp>
         </mc:Choice>
-        <mc:Fallback>
+        <mc:Fallback xmlns="">
           <p:sp>
             <p:nvSpPr>
               <p:cNvPr id="10" name="Flowchart: Decision 9">
@@ -14513,8 +14741,8 @@
           </a:fontRef>
         </p:style>
       </p:cxnSp>
-      <mc:AlternateContent xmlns:mc="http://schemas.openxmlformats.org/markup-compatibility/2006">
-        <mc:Choice xmlns:a14="http://schemas.microsoft.com/office/drawing/2010/main" Requires="a14">
+      <mc:AlternateContent xmlns:mc="http://schemas.openxmlformats.org/markup-compatibility/2006" xmlns:a14="http://schemas.microsoft.com/office/drawing/2010/main">
+        <mc:Choice Requires="a14">
           <p:sp>
             <p:nvSpPr>
               <p:cNvPr id="12" name="Flowchart: Process 11">
@@ -14717,7 +14945,7 @@
             </p:txBody>
           </p:sp>
         </mc:Choice>
-        <mc:Fallback>
+        <mc:Fallback xmlns="">
           <p:sp>
             <p:nvSpPr>
               <p:cNvPr id="12" name="Flowchart: Process 11">
@@ -14763,8 +14991,8 @@
           </p:sp>
         </mc:Fallback>
       </mc:AlternateContent>
-      <mc:AlternateContent xmlns:mc="http://schemas.openxmlformats.org/markup-compatibility/2006">
-        <mc:Choice xmlns:a14="http://schemas.microsoft.com/office/drawing/2010/main" Requires="a14">
+      <mc:AlternateContent xmlns:mc="http://schemas.openxmlformats.org/markup-compatibility/2006" xmlns:a14="http://schemas.microsoft.com/office/drawing/2010/main">
+        <mc:Choice Requires="a14">
           <p:sp>
             <p:nvSpPr>
               <p:cNvPr id="13" name="Flowchart: Process 12">
@@ -14967,7 +15195,7 @@
             </p:txBody>
           </p:sp>
         </mc:Choice>
-        <mc:Fallback>
+        <mc:Fallback xmlns="">
           <p:sp>
             <p:nvSpPr>
               <p:cNvPr id="13" name="Flowchart: Process 12">
@@ -15413,8 +15641,8 @@
           </a:p>
         </p:txBody>
       </p:sp>
-      <mc:AlternateContent xmlns:mc="http://schemas.openxmlformats.org/markup-compatibility/2006">
-        <mc:Choice xmlns:a14="http://schemas.microsoft.com/office/drawing/2010/main" Requires="a14">
+      <mc:AlternateContent xmlns:mc="http://schemas.openxmlformats.org/markup-compatibility/2006" xmlns:a14="http://schemas.microsoft.com/office/drawing/2010/main">
+        <mc:Choice Requires="a14">
           <p:sp>
             <p:nvSpPr>
               <p:cNvPr id="34" name="Flowchart: Decision 33">
@@ -15487,7 +15715,7 @@
             </p:txBody>
           </p:sp>
         </mc:Choice>
-        <mc:Fallback>
+        <mc:Fallback xmlns="">
           <p:sp>
             <p:nvSpPr>
               <p:cNvPr id="34" name="Flowchart: Decision 33">
@@ -19228,6 +19456,291 @@
 </p:sld>
 </file>
 
+<file path=ppt/slides/slide9.xml><?xml version="1.0" encoding="utf-8"?>
+<p:sld xmlns:a="http://schemas.openxmlformats.org/drawingml/2006/main" xmlns:r="http://schemas.openxmlformats.org/officeDocument/2006/relationships" xmlns:p="http://schemas.openxmlformats.org/presentationml/2006/main">
+  <p:cSld>
+    <p:spTree>
+      <p:nvGrpSpPr>
+        <p:cNvPr id="1" name=""/>
+        <p:cNvGrpSpPr/>
+        <p:nvPr/>
+      </p:nvGrpSpPr>
+      <p:grpSpPr>
+        <a:xfrm>
+          <a:off x="0" y="0"/>
+          <a:ext cx="0" cy="0"/>
+          <a:chOff x="0" y="0"/>
+          <a:chExt cx="0" cy="0"/>
+        </a:xfrm>
+      </p:grpSpPr>
+      <p:grpSp>
+        <p:nvGrpSpPr>
+          <p:cNvPr id="9" name="Group 8">
+            <a:extLst>
+              <a:ext uri="{FF2B5EF4-FFF2-40B4-BE49-F238E27FC236}">
+                <a16:creationId xmlns:a16="http://schemas.microsoft.com/office/drawing/2014/main" id="{6B2C83B3-CB12-FCDE-4512-87348B07FE8B}"/>
+              </a:ext>
+            </a:extLst>
+          </p:cNvPr>
+          <p:cNvGrpSpPr/>
+          <p:nvPr/>
+        </p:nvGrpSpPr>
+        <p:grpSpPr>
+          <a:xfrm>
+            <a:off x="1296729" y="401320"/>
+            <a:ext cx="9700141" cy="6151880"/>
+            <a:chOff x="1245929" y="0"/>
+            <a:chExt cx="9700141" cy="6151880"/>
+          </a:xfrm>
+        </p:grpSpPr>
+        <p:pic>
+          <p:nvPicPr>
+            <p:cNvPr id="3" name="Picture 2" descr="A graph of a number of steps&#10;&#10;AI-generated content may be incorrect.">
+              <a:extLst>
+                <a:ext uri="{FF2B5EF4-FFF2-40B4-BE49-F238E27FC236}">
+                  <a16:creationId xmlns:a16="http://schemas.microsoft.com/office/drawing/2014/main" id="{71C94A44-0499-0139-EF14-60124B7F92B9}"/>
+                </a:ext>
+              </a:extLst>
+            </p:cNvPr>
+            <p:cNvPicPr>
+              <a:picLocks noChangeAspect="1"/>
+            </p:cNvPicPr>
+            <p:nvPr/>
+          </p:nvPicPr>
+          <p:blipFill>
+            <a:blip r:embed="rId2">
+              <a:extLst>
+                <a:ext uri="{28A0092B-C50C-407E-A947-70E740481C1C}">
+                  <a14:useLocalDpi xmlns:a14="http://schemas.microsoft.com/office/drawing/2010/main" val="0"/>
+                </a:ext>
+              </a:extLst>
+            </a:blip>
+            <a:srcRect b="10296"/>
+            <a:stretch/>
+          </p:blipFill>
+          <p:spPr>
+            <a:xfrm>
+              <a:off x="1245929" y="0"/>
+              <a:ext cx="9700141" cy="6151880"/>
+            </a:xfrm>
+            <a:prstGeom prst="rect">
+              <a:avLst/>
+            </a:prstGeom>
+          </p:spPr>
+        </p:pic>
+        <p:sp>
+          <p:nvSpPr>
+            <p:cNvPr id="4" name="TextBox 3">
+              <a:extLst>
+                <a:ext uri="{FF2B5EF4-FFF2-40B4-BE49-F238E27FC236}">
+                  <a16:creationId xmlns:a16="http://schemas.microsoft.com/office/drawing/2014/main" id="{6F75358F-434C-A7AB-A82F-938B5FF6CAF8}"/>
+                </a:ext>
+              </a:extLst>
+            </p:cNvPr>
+            <p:cNvSpPr txBox="1"/>
+            <p:nvPr/>
+          </p:nvSpPr>
+          <p:spPr>
+            <a:xfrm>
+              <a:off x="2772539" y="2967335"/>
+              <a:ext cx="1608759" cy="461665"/>
+            </a:xfrm>
+            <a:prstGeom prst="rect">
+              <a:avLst/>
+            </a:prstGeom>
+            <a:noFill/>
+          </p:spPr>
+          <p:txBody>
+            <a:bodyPr wrap="square" rtlCol="0">
+              <a:spAutoFit/>
+            </a:bodyPr>
+            <a:lstStyle/>
+            <a:p>
+              <a:r>
+                <a:rPr lang="en-PH" sz="2400" dirty="0">
+                  <a:solidFill>
+                    <a:srgbClr val="479AC8"/>
+                  </a:solidFill>
+                </a:rPr>
+                <a:t>Traditional</a:t>
+              </a:r>
+            </a:p>
+          </p:txBody>
+        </p:sp>
+        <p:sp>
+          <p:nvSpPr>
+            <p:cNvPr id="5" name="TextBox 4">
+              <a:extLst>
+                <a:ext uri="{FF2B5EF4-FFF2-40B4-BE49-F238E27FC236}">
+                  <a16:creationId xmlns:a16="http://schemas.microsoft.com/office/drawing/2014/main" id="{74A532B5-628F-C998-D5EF-E29E0A2839C2}"/>
+                </a:ext>
+              </a:extLst>
+            </p:cNvPr>
+            <p:cNvSpPr txBox="1"/>
+            <p:nvPr/>
+          </p:nvSpPr>
+          <p:spPr>
+            <a:xfrm>
+              <a:off x="6728419" y="1397695"/>
+              <a:ext cx="1208774" cy="830997"/>
+            </a:xfrm>
+            <a:prstGeom prst="rect">
+              <a:avLst/>
+            </a:prstGeom>
+            <a:noFill/>
+          </p:spPr>
+          <p:txBody>
+            <a:bodyPr wrap="square" rtlCol="0">
+              <a:spAutoFit/>
+            </a:bodyPr>
+            <a:lstStyle/>
+            <a:p>
+              <a:pPr algn="ctr"/>
+              <a:r>
+                <a:rPr lang="en-PH" sz="2400" dirty="0">
+                  <a:solidFill>
+                    <a:srgbClr val="E5A83D"/>
+                  </a:solidFill>
+                </a:rPr>
+                <a:t>Inner Corner</a:t>
+              </a:r>
+            </a:p>
+          </p:txBody>
+        </p:sp>
+        <p:sp>
+          <p:nvSpPr>
+            <p:cNvPr id="6" name="TextBox 5">
+              <a:extLst>
+                <a:ext uri="{FF2B5EF4-FFF2-40B4-BE49-F238E27FC236}">
+                  <a16:creationId xmlns:a16="http://schemas.microsoft.com/office/drawing/2014/main" id="{057741A2-1752-968F-1A88-0A944C3CC834}"/>
+                </a:ext>
+              </a:extLst>
+            </p:cNvPr>
+            <p:cNvSpPr txBox="1"/>
+            <p:nvPr/>
+          </p:nvSpPr>
+          <p:spPr>
+            <a:xfrm>
+              <a:off x="8393389" y="3679885"/>
+              <a:ext cx="1208774" cy="830997"/>
+            </a:xfrm>
+            <a:prstGeom prst="rect">
+              <a:avLst/>
+            </a:prstGeom>
+            <a:noFill/>
+          </p:spPr>
+          <p:txBody>
+            <a:bodyPr wrap="square" rtlCol="0">
+              <a:spAutoFit/>
+            </a:bodyPr>
+            <a:lstStyle/>
+            <a:p>
+              <a:pPr algn="ctr"/>
+              <a:r>
+                <a:rPr lang="en-PH" sz="2400" dirty="0">
+                  <a:solidFill>
+                    <a:srgbClr val="3BB493"/>
+                  </a:solidFill>
+                </a:rPr>
+                <a:t>Outer Corner</a:t>
+              </a:r>
+            </a:p>
+          </p:txBody>
+        </p:sp>
+        <p:sp>
+          <p:nvSpPr>
+            <p:cNvPr id="7" name="TextBox 6">
+              <a:extLst>
+                <a:ext uri="{FF2B5EF4-FFF2-40B4-BE49-F238E27FC236}">
+                  <a16:creationId xmlns:a16="http://schemas.microsoft.com/office/drawing/2014/main" id="{DC077492-1A05-3BFC-E234-E54B21677F74}"/>
+                </a:ext>
+              </a:extLst>
+            </p:cNvPr>
+            <p:cNvSpPr txBox="1"/>
+            <p:nvPr/>
+          </p:nvSpPr>
+          <p:spPr>
+            <a:xfrm>
+              <a:off x="9088616" y="2136338"/>
+              <a:ext cx="1208774" cy="461665"/>
+            </a:xfrm>
+            <a:prstGeom prst="rect">
+              <a:avLst/>
+            </a:prstGeom>
+            <a:noFill/>
+          </p:spPr>
+          <p:txBody>
+            <a:bodyPr wrap="square" rtlCol="0">
+              <a:spAutoFit/>
+            </a:bodyPr>
+            <a:lstStyle/>
+            <a:p>
+              <a:pPr algn="ctr"/>
+              <a:r>
+                <a:rPr lang="en-PH" sz="2400" dirty="0">
+                  <a:solidFill>
+                    <a:srgbClr val="DF833A"/>
+                  </a:solidFill>
+                </a:rPr>
+                <a:t>Center</a:t>
+              </a:r>
+            </a:p>
+          </p:txBody>
+        </p:sp>
+        <p:sp>
+          <p:nvSpPr>
+            <p:cNvPr id="8" name="TextBox 7">
+              <a:extLst>
+                <a:ext uri="{FF2B5EF4-FFF2-40B4-BE49-F238E27FC236}">
+                  <a16:creationId xmlns:a16="http://schemas.microsoft.com/office/drawing/2014/main" id="{4DAB3222-9999-B157-8454-FB50BE36C125}"/>
+                </a:ext>
+              </a:extLst>
+            </p:cNvPr>
+            <p:cNvSpPr txBox="1"/>
+            <p:nvPr/>
+          </p:nvSpPr>
+          <p:spPr>
+            <a:xfrm>
+              <a:off x="9523886" y="1054456"/>
+              <a:ext cx="1320585" cy="461665"/>
+            </a:xfrm>
+            <a:prstGeom prst="rect">
+              <a:avLst/>
+            </a:prstGeom>
+            <a:noFill/>
+          </p:spPr>
+          <p:txBody>
+            <a:bodyPr wrap="square" rtlCol="0">
+              <a:spAutoFit/>
+            </a:bodyPr>
+            <a:lstStyle/>
+            <a:p>
+              <a:pPr algn="ctr"/>
+              <a:r>
+                <a:rPr lang="en-PH" sz="2400" dirty="0">
+                  <a:solidFill>
+                    <a:srgbClr val="D797CC"/>
+                  </a:solidFill>
+                </a:rPr>
+                <a:t>Random</a:t>
+              </a:r>
+            </a:p>
+          </p:txBody>
+        </p:sp>
+      </p:grpSp>
+    </p:spTree>
+    <p:extLst>
+      <p:ext uri="{BB962C8B-B14F-4D97-AF65-F5344CB8AC3E}">
+        <p14:creationId xmlns:p14="http://schemas.microsoft.com/office/powerpoint/2010/main" val="3655925873"/>
+      </p:ext>
+    </p:extLst>
+  </p:cSld>
+  <p:clrMapOvr>
+    <a:masterClrMapping/>
+  </p:clrMapOvr>
+</p:sld>
+</file>
+
 <file path=ppt/theme/theme1.xml><?xml version="1.0" encoding="utf-8"?>
 <a:theme xmlns:a="http://schemas.openxmlformats.org/drawingml/2006/main" name="Office Theme">
   <a:themeElements>

</xml_diff>

<commit_message>
Updated plots and PRPE paper
Updated with 20 runs per parameter set instead of 5
</commit_message>
<xml_diff>
--- a/documents/Figures editing.pptx
+++ b/documents/Figures editing.pptx
@@ -277,7 +277,7 @@
           <a:p>
             <a:fld id="{F6E9F5A1-C99C-41F9-B991-61D99245B2FF}" type="datetimeFigureOut">
               <a:rPr lang="en-PH" smtClean="0"/>
-              <a:t>04/10/2025</a:t>
+              <a:t>04/23/2025</a:t>
             </a:fld>
             <a:endParaRPr lang="en-PH"/>
           </a:p>
@@ -477,7 +477,7 @@
           <a:p>
             <a:fld id="{F6E9F5A1-C99C-41F9-B991-61D99245B2FF}" type="datetimeFigureOut">
               <a:rPr lang="en-PH" smtClean="0"/>
-              <a:t>04/10/2025</a:t>
+              <a:t>04/23/2025</a:t>
             </a:fld>
             <a:endParaRPr lang="en-PH"/>
           </a:p>
@@ -687,7 +687,7 @@
           <a:p>
             <a:fld id="{F6E9F5A1-C99C-41F9-B991-61D99245B2FF}" type="datetimeFigureOut">
               <a:rPr lang="en-PH" smtClean="0"/>
-              <a:t>04/10/2025</a:t>
+              <a:t>04/23/2025</a:t>
             </a:fld>
             <a:endParaRPr lang="en-PH"/>
           </a:p>
@@ -887,7 +887,7 @@
           <a:p>
             <a:fld id="{F6E9F5A1-C99C-41F9-B991-61D99245B2FF}" type="datetimeFigureOut">
               <a:rPr lang="en-PH" smtClean="0"/>
-              <a:t>04/10/2025</a:t>
+              <a:t>04/23/2025</a:t>
             </a:fld>
             <a:endParaRPr lang="en-PH"/>
           </a:p>
@@ -1163,7 +1163,7 @@
           <a:p>
             <a:fld id="{F6E9F5A1-C99C-41F9-B991-61D99245B2FF}" type="datetimeFigureOut">
               <a:rPr lang="en-PH" smtClean="0"/>
-              <a:t>04/10/2025</a:t>
+              <a:t>04/23/2025</a:t>
             </a:fld>
             <a:endParaRPr lang="en-PH"/>
           </a:p>
@@ -1431,7 +1431,7 @@
           <a:p>
             <a:fld id="{F6E9F5A1-C99C-41F9-B991-61D99245B2FF}" type="datetimeFigureOut">
               <a:rPr lang="en-PH" smtClean="0"/>
-              <a:t>04/10/2025</a:t>
+              <a:t>04/23/2025</a:t>
             </a:fld>
             <a:endParaRPr lang="en-PH"/>
           </a:p>
@@ -1846,7 +1846,7 @@
           <a:p>
             <a:fld id="{F6E9F5A1-C99C-41F9-B991-61D99245B2FF}" type="datetimeFigureOut">
               <a:rPr lang="en-PH" smtClean="0"/>
-              <a:t>04/10/2025</a:t>
+              <a:t>04/23/2025</a:t>
             </a:fld>
             <a:endParaRPr lang="en-PH"/>
           </a:p>
@@ -1988,7 +1988,7 @@
           <a:p>
             <a:fld id="{F6E9F5A1-C99C-41F9-B991-61D99245B2FF}" type="datetimeFigureOut">
               <a:rPr lang="en-PH" smtClean="0"/>
-              <a:t>04/10/2025</a:t>
+              <a:t>04/23/2025</a:t>
             </a:fld>
             <a:endParaRPr lang="en-PH"/>
           </a:p>
@@ -2101,7 +2101,7 @@
           <a:p>
             <a:fld id="{F6E9F5A1-C99C-41F9-B991-61D99245B2FF}" type="datetimeFigureOut">
               <a:rPr lang="en-PH" smtClean="0"/>
-              <a:t>04/10/2025</a:t>
+              <a:t>04/23/2025</a:t>
             </a:fld>
             <a:endParaRPr lang="en-PH"/>
           </a:p>
@@ -2414,7 +2414,7 @@
           <a:p>
             <a:fld id="{F6E9F5A1-C99C-41F9-B991-61D99245B2FF}" type="datetimeFigureOut">
               <a:rPr lang="en-PH" smtClean="0"/>
-              <a:t>04/10/2025</a:t>
+              <a:t>04/23/2025</a:t>
             </a:fld>
             <a:endParaRPr lang="en-PH"/>
           </a:p>
@@ -2703,7 +2703,7 @@
           <a:p>
             <a:fld id="{F6E9F5A1-C99C-41F9-B991-61D99245B2FF}" type="datetimeFigureOut">
               <a:rPr lang="en-PH" smtClean="0"/>
-              <a:t>04/10/2025</a:t>
+              <a:t>04/23/2025</a:t>
             </a:fld>
             <a:endParaRPr lang="en-PH"/>
           </a:p>
@@ -2946,7 +2946,7 @@
           <a:p>
             <a:fld id="{F6E9F5A1-C99C-41F9-B991-61D99245B2FF}" type="datetimeFigureOut">
               <a:rPr lang="en-PH" smtClean="0"/>
-              <a:t>04/10/2025</a:t>
+              <a:t>04/23/2025</a:t>
             </a:fld>
             <a:endParaRPr lang="en-PH"/>
           </a:p>
@@ -4189,10 +4189,10 @@
       </p:grpSpPr>
       <p:pic>
         <p:nvPicPr>
-          <p:cNvPr id="12" name="Picture 11" descr="A line graph with different colored lines&#10;&#10;AI-generated content may be incorrect.">
+          <p:cNvPr id="3" name="Picture 2">
             <a:extLst>
               <a:ext uri="{FF2B5EF4-FFF2-40B4-BE49-F238E27FC236}">
-                <a16:creationId xmlns:a16="http://schemas.microsoft.com/office/drawing/2014/main" id="{9DFE61CA-E3CA-0269-8C11-296F5CCC1E22}"/>
+                <a16:creationId xmlns:a16="http://schemas.microsoft.com/office/drawing/2014/main" id="{449EA148-DE7A-1B03-6D37-2F9EE7141852}"/>
               </a:ext>
             </a:extLst>
           </p:cNvPr>
@@ -4280,7 +4280,7 @@
         </p:nvSpPr>
         <p:spPr>
           <a:xfrm>
-            <a:off x="6913582" y="3060632"/>
+            <a:off x="6819314" y="3079485"/>
             <a:ext cx="951074" cy="461665"/>
           </a:xfrm>
           <a:prstGeom prst="rect">
@@ -4323,7 +4323,7 @@
         </p:nvSpPr>
         <p:spPr>
           <a:xfrm>
-            <a:off x="8161469" y="2521476"/>
+            <a:off x="8114335" y="2257915"/>
             <a:ext cx="951074" cy="461665"/>
           </a:xfrm>
           <a:prstGeom prst="rect">
@@ -4366,7 +4366,7 @@
         </p:nvSpPr>
         <p:spPr>
           <a:xfrm>
-            <a:off x="9500631" y="1796250"/>
+            <a:off x="9481777" y="1440336"/>
             <a:ext cx="1217896" cy="461665"/>
           </a:xfrm>
           <a:prstGeom prst="rect">
@@ -4427,10 +4427,10 @@
       </p:grpSpPr>
       <p:pic>
         <p:nvPicPr>
-          <p:cNvPr id="12" name="Picture 11" descr="A graph of a line graph&#10;&#10;AI-generated content may be incorrect.">
+          <p:cNvPr id="3" name="Picture 2">
             <a:extLst>
               <a:ext uri="{FF2B5EF4-FFF2-40B4-BE49-F238E27FC236}">
-                <a16:creationId xmlns:a16="http://schemas.microsoft.com/office/drawing/2014/main" id="{818B3FD8-106A-2A9D-B73F-22AA58DFD092}"/>
+                <a16:creationId xmlns:a16="http://schemas.microsoft.com/office/drawing/2014/main" id="{DC59A6B3-D1FE-42F3-3A16-2C379F4D7425}"/>
               </a:ext>
             </a:extLst>
           </p:cNvPr>
@@ -4569,7 +4569,7 @@
         </p:nvSpPr>
         <p:spPr>
           <a:xfrm>
-            <a:off x="5995694" y="1209780"/>
+            <a:off x="5995694" y="1113320"/>
             <a:ext cx="1277646" cy="461665"/>
           </a:xfrm>
           <a:prstGeom prst="rect">
@@ -4975,10 +4975,10 @@
       </p:grpSpPr>
       <p:pic>
         <p:nvPicPr>
-          <p:cNvPr id="13" name="Picture 12" descr="A graph of different colored lines&#10;&#10;AI-generated content may be incorrect.">
+          <p:cNvPr id="3" name="Picture 2">
             <a:extLst>
               <a:ext uri="{FF2B5EF4-FFF2-40B4-BE49-F238E27FC236}">
-                <a16:creationId xmlns:a16="http://schemas.microsoft.com/office/drawing/2014/main" id="{E4007CA9-8350-70DD-1757-261BDC9326BD}"/>
+                <a16:creationId xmlns:a16="http://schemas.microsoft.com/office/drawing/2014/main" id="{F52CBD7E-3446-F8CC-AF83-1E9EC6B19EBA}"/>
               </a:ext>
             </a:extLst>
           </p:cNvPr>
@@ -5118,7 +5118,7 @@
         </p:nvSpPr>
         <p:spPr>
           <a:xfrm>
-            <a:off x="4362905" y="3048565"/>
+            <a:off x="4259050" y="3052775"/>
             <a:ext cx="1149112" cy="461665"/>
           </a:xfrm>
           <a:prstGeom prst="rect">
@@ -5216,7 +5216,7 @@
         </p:nvSpPr>
         <p:spPr>
           <a:xfrm>
-            <a:off x="3756293" y="4361152"/>
+            <a:off x="3641462" y="4480588"/>
             <a:ext cx="1149112" cy="461665"/>
           </a:xfrm>
           <a:prstGeom prst="rect">
@@ -5314,7 +5314,7 @@
         </p:nvSpPr>
         <p:spPr>
           <a:xfrm>
-            <a:off x="5271030" y="1880823"/>
+            <a:off x="5176762" y="2024222"/>
             <a:ext cx="1149112" cy="461665"/>
           </a:xfrm>
           <a:prstGeom prst="rect">
@@ -5411,7 +5411,7 @@
         </p:nvSpPr>
         <p:spPr>
           <a:xfrm>
-            <a:off x="6679985" y="3198167"/>
+            <a:off x="6519730" y="3514440"/>
             <a:ext cx="1149112" cy="461665"/>
           </a:xfrm>
           <a:prstGeom prst="rect">
@@ -5509,7 +5509,7 @@
         </p:nvSpPr>
         <p:spPr>
           <a:xfrm>
-            <a:off x="7980731" y="4361152"/>
+            <a:off x="7990158" y="4249755"/>
             <a:ext cx="1149112" cy="461665"/>
           </a:xfrm>
           <a:prstGeom prst="rect">
@@ -6345,8 +6345,8 @@
                 </a:p>
               </p:txBody>
             </p:sp>
-            <mc:AlternateContent xmlns:mc="http://schemas.openxmlformats.org/markup-compatibility/2006">
-              <mc:Choice xmlns:a14="http://schemas.microsoft.com/office/drawing/2010/main" Requires="a14">
+            <mc:AlternateContent xmlns:mc="http://schemas.openxmlformats.org/markup-compatibility/2006" xmlns:a14="http://schemas.microsoft.com/office/drawing/2010/main">
+              <mc:Choice Requires="a14">
                 <p:sp>
                   <p:nvSpPr>
                     <p:cNvPr id="17" name="TextBox 16">
@@ -6375,6 +6375,7 @@
                     </a:bodyPr>
                     <a:lstStyle/>
                     <a:p>
+                      <a:pPr/>
                       <a14:m>
                         <m:oMathPara xmlns:m="http://schemas.openxmlformats.org/officeDocument/2006/math">
                           <m:oMathParaPr>
@@ -6401,7 +6402,7 @@
                   </p:txBody>
                 </p:sp>
               </mc:Choice>
-              <mc:Fallback>
+              <mc:Fallback xmlns="">
                 <p:sp>
                   <p:nvSpPr>
                     <p:cNvPr id="17" name="TextBox 16">
@@ -6446,8 +6447,8 @@
                 </p:sp>
               </mc:Fallback>
             </mc:AlternateContent>
-            <mc:AlternateContent xmlns:mc="http://schemas.openxmlformats.org/markup-compatibility/2006">
-              <mc:Choice xmlns:a14="http://schemas.microsoft.com/office/drawing/2010/main" Requires="a14">
+            <mc:AlternateContent xmlns:mc="http://schemas.openxmlformats.org/markup-compatibility/2006" xmlns:a14="http://schemas.microsoft.com/office/drawing/2010/main">
+              <mc:Choice Requires="a14">
                 <p:sp>
                   <p:nvSpPr>
                     <p:cNvPr id="18" name="TextBox 17">
@@ -6476,6 +6477,7 @@
                     </a:bodyPr>
                     <a:lstStyle/>
                     <a:p>
+                      <a:pPr/>
                       <a14:m>
                         <m:oMathPara xmlns:m="http://schemas.openxmlformats.org/officeDocument/2006/math">
                           <m:oMathParaPr>
@@ -6502,7 +6504,7 @@
                   </p:txBody>
                 </p:sp>
               </mc:Choice>
-              <mc:Fallback>
+              <mc:Fallback xmlns="">
                 <p:sp>
                   <p:nvSpPr>
                     <p:cNvPr id="18" name="TextBox 17">
@@ -6547,8 +6549,8 @@
                 </p:sp>
               </mc:Fallback>
             </mc:AlternateContent>
-            <mc:AlternateContent xmlns:mc="http://schemas.openxmlformats.org/markup-compatibility/2006">
-              <mc:Choice xmlns:a14="http://schemas.microsoft.com/office/drawing/2010/main" Requires="a14">
+            <mc:AlternateContent xmlns:mc="http://schemas.openxmlformats.org/markup-compatibility/2006" xmlns:a14="http://schemas.microsoft.com/office/drawing/2010/main">
+              <mc:Choice Requires="a14">
                 <p:sp>
                   <p:nvSpPr>
                     <p:cNvPr id="19" name="TextBox 18">
@@ -6577,6 +6579,7 @@
                     </a:bodyPr>
                     <a:lstStyle/>
                     <a:p>
+                      <a:pPr/>
                       <a14:m>
                         <m:oMathPara xmlns:m="http://schemas.openxmlformats.org/officeDocument/2006/math">
                           <m:oMathParaPr>
@@ -6603,7 +6606,7 @@
                   </p:txBody>
                 </p:sp>
               </mc:Choice>
-              <mc:Fallback>
+              <mc:Fallback xmlns="">
                 <p:sp>
                   <p:nvSpPr>
                     <p:cNvPr id="19" name="TextBox 18">
@@ -6648,8 +6651,8 @@
                 </p:sp>
               </mc:Fallback>
             </mc:AlternateContent>
-            <mc:AlternateContent xmlns:mc="http://schemas.openxmlformats.org/markup-compatibility/2006">
-              <mc:Choice xmlns:a14="http://schemas.microsoft.com/office/drawing/2010/main" Requires="a14">
+            <mc:AlternateContent xmlns:mc="http://schemas.openxmlformats.org/markup-compatibility/2006" xmlns:a14="http://schemas.microsoft.com/office/drawing/2010/main">
+              <mc:Choice Requires="a14">
                 <p:sp>
                   <p:nvSpPr>
                     <p:cNvPr id="20" name="TextBox 19">
@@ -6678,6 +6681,7 @@
                     </a:bodyPr>
                     <a:lstStyle/>
                     <a:p>
+                      <a:pPr/>
                       <a14:m>
                         <m:oMathPara xmlns:m="http://schemas.openxmlformats.org/officeDocument/2006/math">
                           <m:oMathParaPr>
@@ -6704,7 +6708,7 @@
                   </p:txBody>
                 </p:sp>
               </mc:Choice>
-              <mc:Fallback>
+              <mc:Fallback xmlns="">
                 <p:sp>
                   <p:nvSpPr>
                     <p:cNvPr id="20" name="TextBox 19">
@@ -6749,8 +6753,8 @@
                 </p:sp>
               </mc:Fallback>
             </mc:AlternateContent>
-            <mc:AlternateContent xmlns:mc="http://schemas.openxmlformats.org/markup-compatibility/2006">
-              <mc:Choice xmlns:a14="http://schemas.microsoft.com/office/drawing/2010/main" Requires="a14">
+            <mc:AlternateContent xmlns:mc="http://schemas.openxmlformats.org/markup-compatibility/2006" xmlns:a14="http://schemas.microsoft.com/office/drawing/2010/main">
+              <mc:Choice Requires="a14">
                 <p:sp>
                   <p:nvSpPr>
                     <p:cNvPr id="21" name="TextBox 20">
@@ -6779,6 +6783,7 @@
                     </a:bodyPr>
                     <a:lstStyle/>
                     <a:p>
+                      <a:pPr/>
                       <a14:m>
                         <m:oMathPara xmlns:m="http://schemas.openxmlformats.org/officeDocument/2006/math">
                           <m:oMathParaPr>
@@ -6805,7 +6810,7 @@
                   </p:txBody>
                 </p:sp>
               </mc:Choice>
-              <mc:Fallback>
+              <mc:Fallback xmlns="">
                 <p:sp>
                   <p:nvSpPr>
                     <p:cNvPr id="21" name="TextBox 20">
@@ -7109,8 +7114,8 @@
                 </a:p>
               </p:txBody>
             </p:sp>
-            <mc:AlternateContent xmlns:mc="http://schemas.openxmlformats.org/markup-compatibility/2006">
-              <mc:Choice xmlns:a14="http://schemas.microsoft.com/office/drawing/2010/main" Requires="a14">
+            <mc:AlternateContent xmlns:mc="http://schemas.openxmlformats.org/markup-compatibility/2006" xmlns:a14="http://schemas.microsoft.com/office/drawing/2010/main">
+              <mc:Choice Requires="a14">
                 <p:sp>
                   <p:nvSpPr>
                     <p:cNvPr id="22" name="TextBox 21">
@@ -7139,6 +7144,7 @@
                     </a:bodyPr>
                     <a:lstStyle/>
                     <a:p>
+                      <a:pPr/>
                       <a14:m>
                         <m:oMathPara xmlns:m="http://schemas.openxmlformats.org/officeDocument/2006/math">
                           <m:oMathParaPr>
@@ -7165,7 +7171,7 @@
                   </p:txBody>
                 </p:sp>
               </mc:Choice>
-              <mc:Fallback>
+              <mc:Fallback xmlns="">
                 <p:sp>
                   <p:nvSpPr>
                     <p:cNvPr id="22" name="TextBox 21">
@@ -7210,8 +7216,8 @@
                 </p:sp>
               </mc:Fallback>
             </mc:AlternateContent>
-            <mc:AlternateContent xmlns:mc="http://schemas.openxmlformats.org/markup-compatibility/2006">
-              <mc:Choice xmlns:a14="http://schemas.microsoft.com/office/drawing/2010/main" Requires="a14">
+            <mc:AlternateContent xmlns:mc="http://schemas.openxmlformats.org/markup-compatibility/2006" xmlns:a14="http://schemas.microsoft.com/office/drawing/2010/main">
+              <mc:Choice Requires="a14">
                 <p:sp>
                   <p:nvSpPr>
                     <p:cNvPr id="23" name="TextBox 22">
@@ -7240,6 +7246,7 @@
                     </a:bodyPr>
                     <a:lstStyle/>
                     <a:p>
+                      <a:pPr/>
                       <a14:m>
                         <m:oMathPara xmlns:m="http://schemas.openxmlformats.org/officeDocument/2006/math">
                           <m:oMathParaPr>
@@ -7266,7 +7273,7 @@
                   </p:txBody>
                 </p:sp>
               </mc:Choice>
-              <mc:Fallback>
+              <mc:Fallback xmlns="">
                 <p:sp>
                   <p:nvSpPr>
                     <p:cNvPr id="23" name="TextBox 22">
@@ -7311,8 +7318,8 @@
                 </p:sp>
               </mc:Fallback>
             </mc:AlternateContent>
-            <mc:AlternateContent xmlns:mc="http://schemas.openxmlformats.org/markup-compatibility/2006">
-              <mc:Choice xmlns:a14="http://schemas.microsoft.com/office/drawing/2010/main" Requires="a14">
+            <mc:AlternateContent xmlns:mc="http://schemas.openxmlformats.org/markup-compatibility/2006" xmlns:a14="http://schemas.microsoft.com/office/drawing/2010/main">
+              <mc:Choice Requires="a14">
                 <p:sp>
                   <p:nvSpPr>
                     <p:cNvPr id="24" name="TextBox 23">
@@ -7341,6 +7348,7 @@
                     </a:bodyPr>
                     <a:lstStyle/>
                     <a:p>
+                      <a:pPr/>
                       <a14:m>
                         <m:oMathPara xmlns:m="http://schemas.openxmlformats.org/officeDocument/2006/math">
                           <m:oMathParaPr>
@@ -7367,7 +7375,7 @@
                   </p:txBody>
                 </p:sp>
               </mc:Choice>
-              <mc:Fallback>
+              <mc:Fallback xmlns="">
                 <p:sp>
                   <p:nvSpPr>
                     <p:cNvPr id="24" name="TextBox 23">
@@ -7412,8 +7420,8 @@
                 </p:sp>
               </mc:Fallback>
             </mc:AlternateContent>
-            <mc:AlternateContent xmlns:mc="http://schemas.openxmlformats.org/markup-compatibility/2006">
-              <mc:Choice xmlns:a14="http://schemas.microsoft.com/office/drawing/2010/main" Requires="a14">
+            <mc:AlternateContent xmlns:mc="http://schemas.openxmlformats.org/markup-compatibility/2006" xmlns:a14="http://schemas.microsoft.com/office/drawing/2010/main">
+              <mc:Choice Requires="a14">
                 <p:sp>
                   <p:nvSpPr>
                     <p:cNvPr id="25" name="TextBox 24">
@@ -7442,6 +7450,7 @@
                     </a:bodyPr>
                     <a:lstStyle/>
                     <a:p>
+                      <a:pPr/>
                       <a14:m>
                         <m:oMathPara xmlns:m="http://schemas.openxmlformats.org/officeDocument/2006/math">
                           <m:oMathParaPr>
@@ -7468,7 +7477,7 @@
                   </p:txBody>
                 </p:sp>
               </mc:Choice>
-              <mc:Fallback>
+              <mc:Fallback xmlns="">
                 <p:sp>
                   <p:nvSpPr>
                     <p:cNvPr id="25" name="TextBox 24">
@@ -7513,8 +7522,8 @@
                 </p:sp>
               </mc:Fallback>
             </mc:AlternateContent>
-            <mc:AlternateContent xmlns:mc="http://schemas.openxmlformats.org/markup-compatibility/2006">
-              <mc:Choice xmlns:a14="http://schemas.microsoft.com/office/drawing/2010/main" Requires="a14">
+            <mc:AlternateContent xmlns:mc="http://schemas.openxmlformats.org/markup-compatibility/2006" xmlns:a14="http://schemas.microsoft.com/office/drawing/2010/main">
+              <mc:Choice Requires="a14">
                 <p:sp>
                   <p:nvSpPr>
                     <p:cNvPr id="26" name="TextBox 25">
@@ -7543,6 +7552,7 @@
                     </a:bodyPr>
                     <a:lstStyle/>
                     <a:p>
+                      <a:pPr/>
                       <a14:m>
                         <m:oMathPara xmlns:m="http://schemas.openxmlformats.org/officeDocument/2006/math">
                           <m:oMathParaPr>
@@ -7569,7 +7579,7 @@
                   </p:txBody>
                 </p:sp>
               </mc:Choice>
-              <mc:Fallback>
+              <mc:Fallback xmlns="">
                 <p:sp>
                   <p:nvSpPr>
                     <p:cNvPr id="26" name="TextBox 25">
@@ -7830,10 +7840,10 @@
       </p:grpSpPr>
       <p:pic>
         <p:nvPicPr>
-          <p:cNvPr id="10" name="Picture 9" descr="A graph of a function&#10;&#10;AI-generated content may be incorrect.">
+          <p:cNvPr id="3" name="Picture 2">
             <a:extLst>
               <a:ext uri="{FF2B5EF4-FFF2-40B4-BE49-F238E27FC236}">
-                <a16:creationId xmlns:a16="http://schemas.microsoft.com/office/drawing/2014/main" id="{42DDB831-42AD-366F-F88F-8D49665B662B}"/>
+                <a16:creationId xmlns:a16="http://schemas.microsoft.com/office/drawing/2014/main" id="{3A5008E0-DE59-3B45-7CC0-1076E8A0475A}"/>
               </a:ext>
             </a:extLst>
           </p:cNvPr>
@@ -8105,7 +8115,25 @@
                         </a:solidFill>
                         <a:latin typeface="Cambria Math" panose="02040503050406030204" pitchFamily="18" charset="0"/>
                       </a:rPr>
-                      <m:t>=0.547 </m:t>
+                      <m:t>=0.54</m:t>
+                    </m:r>
+                    <m:r>
+                      <a:rPr lang="en-PH" sz="2400" b="0" i="1" smtClean="0">
+                        <a:solidFill>
+                          <a:srgbClr val="0173B2"/>
+                        </a:solidFill>
+                        <a:latin typeface="Cambria Math" panose="02040503050406030204" pitchFamily="18" charset="0"/>
+                      </a:rPr>
+                      <m:t>8</m:t>
+                    </m:r>
+                    <m:r>
+                      <a:rPr lang="en-PH" sz="2400" b="0" i="1" smtClean="0">
+                        <a:solidFill>
+                          <a:srgbClr val="0173B2"/>
+                        </a:solidFill>
+                        <a:latin typeface="Cambria Math" panose="02040503050406030204" pitchFamily="18" charset="0"/>
+                      </a:rPr>
+                      <m:t> </m:t>
                     </m:r>
                     <m:sSub>
                       <m:sSubPr>
@@ -8261,7 +8289,6 @@
                 </a:r>
               </a:p>
               <a:p>
-                <a:pPr/>
                 <a14:m>
                   <m:oMath xmlns:m="http://schemas.openxmlformats.org/officeDocument/2006/math">
                     <m:sSub>
@@ -8305,7 +8332,25 @@
                         </a:solidFill>
                         <a:latin typeface="Cambria Math" panose="02040503050406030204" pitchFamily="18" charset="0"/>
                       </a:rPr>
-                      <m:t>=−0.62 </m:t>
+                      <m:t>=−0.6</m:t>
+                    </m:r>
+                    <m:r>
+                      <a:rPr lang="en-PH" sz="2400" b="0" i="1" smtClean="0">
+                        <a:solidFill>
+                          <a:srgbClr val="DE8F05"/>
+                        </a:solidFill>
+                        <a:latin typeface="Cambria Math" panose="02040503050406030204" pitchFamily="18" charset="0"/>
+                      </a:rPr>
+                      <m:t>05</m:t>
+                    </m:r>
+                    <m:r>
+                      <a:rPr lang="en-PH" sz="2400" b="0" i="1" smtClean="0">
+                        <a:solidFill>
+                          <a:srgbClr val="DE8F05"/>
+                        </a:solidFill>
+                        <a:latin typeface="Cambria Math" panose="02040503050406030204" pitchFamily="18" charset="0"/>
+                      </a:rPr>
+                      <m:t> </m:t>
                     </m:r>
                     <m:sSubSup>
                       <m:sSubSupPr>
@@ -8368,7 +8413,25 @@
                         </a:solidFill>
                         <a:latin typeface="Cambria Math" panose="02040503050406030204" pitchFamily="18" charset="0"/>
                       </a:rPr>
-                      <m:t>+1.608 </m:t>
+                      <m:t>+1.</m:t>
+                    </m:r>
+                    <m:r>
+                      <a:rPr lang="en-PH" sz="2400" b="0" i="1" smtClean="0">
+                        <a:solidFill>
+                          <a:srgbClr val="DE8F05"/>
+                        </a:solidFill>
+                        <a:latin typeface="Cambria Math" panose="02040503050406030204" pitchFamily="18" charset="0"/>
+                      </a:rPr>
+                      <m:t>595</m:t>
+                    </m:r>
+                    <m:r>
+                      <a:rPr lang="en-PH" sz="2400" b="0" i="1" smtClean="0">
+                        <a:solidFill>
+                          <a:srgbClr val="DE8F05"/>
+                        </a:solidFill>
+                        <a:latin typeface="Cambria Math" panose="02040503050406030204" pitchFamily="18" charset="0"/>
+                      </a:rPr>
+                      <m:t> </m:t>
                     </m:r>
                     <m:sSub>
                       <m:sSubPr>
@@ -8481,8 +8544,8 @@
           </p:sp>
         </mc:Fallback>
       </mc:AlternateContent>
-      <mc:AlternateContent xmlns:mc="http://schemas.openxmlformats.org/markup-compatibility/2006">
-        <mc:Choice xmlns:a14="http://schemas.microsoft.com/office/drawing/2010/main" Requires="a14">
+      <mc:AlternateContent xmlns:mc="http://schemas.openxmlformats.org/markup-compatibility/2006" xmlns:a14="http://schemas.microsoft.com/office/drawing/2010/main">
+        <mc:Choice Requires="a14">
           <p:sp>
             <p:nvSpPr>
               <p:cNvPr id="12" name="TextBox 11">
@@ -8739,7 +8802,7 @@
             </p:txBody>
           </p:sp>
         </mc:Choice>
-        <mc:Fallback>
+        <mc:Fallback xmlns="">
           <p:sp>
             <p:nvSpPr>
               <p:cNvPr id="12" name="TextBox 11">
@@ -8816,10 +8879,10 @@
       </p:grpSpPr>
       <p:pic>
         <p:nvPicPr>
-          <p:cNvPr id="3" name="Picture 2" descr="A graph of a curve&#10;&#10;AI-generated content may be incorrect.">
+          <p:cNvPr id="7" name="Picture 6">
             <a:extLst>
               <a:ext uri="{FF2B5EF4-FFF2-40B4-BE49-F238E27FC236}">
-                <a16:creationId xmlns:a16="http://schemas.microsoft.com/office/drawing/2014/main" id="{0C6218E5-5078-288E-37B9-4B760B3C8975}"/>
+                <a16:creationId xmlns:a16="http://schemas.microsoft.com/office/drawing/2014/main" id="{2FE496AB-2459-A966-5B76-6E68622E8391}"/>
               </a:ext>
             </a:extLst>
           </p:cNvPr>
@@ -8850,8 +8913,8 @@
           </a:prstGeom>
         </p:spPr>
       </p:pic>
-      <mc:AlternateContent xmlns:mc="http://schemas.openxmlformats.org/markup-compatibility/2006">
-        <mc:Choice xmlns:a14="http://schemas.microsoft.com/office/drawing/2010/main" Requires="a14">
+      <mc:AlternateContent xmlns:mc="http://schemas.openxmlformats.org/markup-compatibility/2006" xmlns:a14="http://schemas.microsoft.com/office/drawing/2010/main">
+        <mc:Choice Requires="a14">
           <p:sp>
             <p:nvSpPr>
               <p:cNvPr id="4" name="TextBox 3">
@@ -9006,7 +9069,7 @@
             </p:txBody>
           </p:sp>
         </mc:Choice>
-        <mc:Fallback>
+        <mc:Fallback xmlns="">
           <p:sp>
             <p:nvSpPr>
               <p:cNvPr id="4" name="TextBox 3">
@@ -9051,8 +9114,8 @@
           </p:sp>
         </mc:Fallback>
       </mc:AlternateContent>
-      <mc:AlternateContent xmlns:mc="http://schemas.openxmlformats.org/markup-compatibility/2006">
-        <mc:Choice xmlns:a14="http://schemas.microsoft.com/office/drawing/2010/main" Requires="a14">
+      <mc:AlternateContent xmlns:mc="http://schemas.openxmlformats.org/markup-compatibility/2006" xmlns:a14="http://schemas.microsoft.com/office/drawing/2010/main">
+        <mc:Choice Requires="a14">
           <p:sp>
             <p:nvSpPr>
               <p:cNvPr id="5" name="TextBox 4">
@@ -9273,7 +9336,7 @@
             </p:txBody>
           </p:sp>
         </mc:Choice>
-        <mc:Fallback>
+        <mc:Fallback xmlns="">
           <p:sp>
             <p:nvSpPr>
               <p:cNvPr id="5" name="TextBox 4">
@@ -9318,8 +9381,8 @@
           </p:sp>
         </mc:Fallback>
       </mc:AlternateContent>
-      <mc:AlternateContent xmlns:mc="http://schemas.openxmlformats.org/markup-compatibility/2006">
-        <mc:Choice xmlns:a14="http://schemas.microsoft.com/office/drawing/2010/main" Requires="a14">
+      <mc:AlternateContent xmlns:mc="http://schemas.openxmlformats.org/markup-compatibility/2006" xmlns:a14="http://schemas.microsoft.com/office/drawing/2010/main">
+        <mc:Choice Requires="a14">
           <p:sp>
             <p:nvSpPr>
               <p:cNvPr id="6" name="TextBox 5">
@@ -9578,7 +9641,7 @@
             </p:txBody>
           </p:sp>
         </mc:Choice>
-        <mc:Fallback>
+        <mc:Fallback xmlns="">
           <p:sp>
             <p:nvSpPr>
               <p:cNvPr id="6" name="TextBox 5">
@@ -24722,10 +24785,10 @@
       </p:grpSpPr>
       <p:pic>
         <p:nvPicPr>
-          <p:cNvPr id="10" name="Picture 9" descr="A graph of a line graph&#10;&#10;AI-generated content may be incorrect.">
+          <p:cNvPr id="3" name="Picture 2">
             <a:extLst>
               <a:ext uri="{FF2B5EF4-FFF2-40B4-BE49-F238E27FC236}">
-                <a16:creationId xmlns:a16="http://schemas.microsoft.com/office/drawing/2014/main" id="{429D3CAD-8760-A971-AB66-EE025DF5698B}"/>
+                <a16:creationId xmlns:a16="http://schemas.microsoft.com/office/drawing/2014/main" id="{C9E1BEDB-ABB7-93BA-BF07-96AC0A2F7749}"/>
               </a:ext>
             </a:extLst>
           </p:cNvPr>

</xml_diff>